<commit_message>
Slide Unit 1: Correlation analysis (completed)
</commit_message>
<xml_diff>
--- a/Data Science resources/Introduction to Machine Learning/Slides/Slide Unit 1/4. Correlation analysis.pptx
+++ b/Data Science resources/Introduction to Machine Learning/Slides/Slide Unit 1/4. Correlation analysis.pptx
@@ -2,8 +2,8 @@
 <file path=ppt/presentation.xml><?xml version="1.0" encoding="utf-8"?>
 <p:presentation xmlns:a="http://schemas.openxmlformats.org/drawingml/2006/main" xmlns:r="http://schemas.openxmlformats.org/officeDocument/2006/relationships" xmlns:p="http://schemas.openxmlformats.org/presentationml/2006/main" saveSubsetFonts="1">
   <p:sldMasterIdLst>
-    <p:sldMasterId id="2147483660" r:id="rId4"/>
-    <p:sldMasterId id="2147483668" r:id="rId5"/>
+    <p:sldMasterId id="2147483668" r:id="rId4"/>
+    <p:sldMasterId id="2147483675" r:id="rId5"/>
   </p:sldMasterIdLst>
   <p:notesMasterIdLst>
     <p:notesMasterId r:id="rId15"/>
@@ -253,7 +253,7 @@
           <a:p>
             <a:fld id="{E4DABB7E-5FD5-4FD4-8200-24B5A1924914}" type="datetimeFigureOut">
               <a:rPr lang="en-US" smtClean="0"/>
-              <a:t>08-Sep-21</a:t>
+              <a:t>03-May-24</a:t>
             </a:fld>
             <a:endParaRPr lang="en-US"/>
           </a:p>
@@ -430,7 +430,7 @@
           <a:p>
             <a:fld id="{9BDC6C4C-B340-4EE6-8690-61E4F94D1E11}" type="datetimeFigureOut">
               <a:rPr lang="en-US" smtClean="0"/>
-              <a:t>08-Sep-21</a:t>
+              <a:t>03-May-24</a:t>
             </a:fld>
             <a:endParaRPr lang="en-US"/>
           </a:p>
@@ -1694,12 +1694,9 @@
 <p:sldLayout xmlns:a="http://schemas.openxmlformats.org/drawingml/2006/main" xmlns:r="http://schemas.openxmlformats.org/officeDocument/2006/relationships" xmlns:p="http://schemas.openxmlformats.org/presentationml/2006/main" type="title" preserve="1">
   <p:cSld name="Title Slide">
     <p:bg>
-      <p:bgPr>
-        <a:solidFill>
-          <a:srgbClr val="F8F9F7"/>
-        </a:solidFill>
-        <a:effectLst/>
-      </p:bgPr>
+      <p:bgRef idx="1001">
+        <a:schemeClr val="bg1"/>
+      </p:bgRef>
     </p:bg>
     <p:spTree>
       <p:nvGrpSpPr>
@@ -1723,7 +1720,7 @@
           </p:cNvGraphicFramePr>
           <p:nvPr userDrawn="1">
             <p:custDataLst>
-              <p:tags r:id="rId1"/>
+              <p:tags r:id="rId2"/>
             </p:custDataLst>
           </p:nvPr>
         </p:nvGraphicFramePr>
@@ -1735,12 +1732,12 @@
           <a:graphicData uri="http://schemas.openxmlformats.org/presentationml/2006/ole">
             <mc:AlternateContent xmlns:mc="http://schemas.openxmlformats.org/markup-compatibility/2006">
               <mc:Choice xmlns:v="urn:schemas-microsoft-com:vml" Requires="v">
-                <p:oleObj name="think-cell Slide" r:id="rId3" imgW="425" imgH="426" progId="TCLayout.ActiveDocument.1">
+                <p:oleObj spid="_x0000_s6146" name="think-cell Slide" r:id="rId4" imgW="425" imgH="426" progId="TCLayout.ActiveDocument.1">
                   <p:embed/>
                 </p:oleObj>
               </mc:Choice>
               <mc:Fallback>
-                <p:oleObj name="think-cell Slide" r:id="rId3" imgW="425" imgH="426" progId="TCLayout.ActiveDocument.1">
+                <p:oleObj name="think-cell Slide" r:id="rId4" imgW="425" imgH="426" progId="TCLayout.ActiveDocument.1">
                   <p:embed/>
                   <p:pic>
                     <p:nvPicPr>
@@ -1749,7 +1746,7 @@
                       <p:nvPr/>
                     </p:nvPicPr>
                     <p:blipFill>
-                      <a:blip r:embed="rId4"/>
+                      <a:blip r:embed="rId5"/>
                       <a:stretch>
                         <a:fillRect/>
                       </a:stretch>
@@ -1943,45 +1940,231 @@
       </p:sp>
       <p:pic>
         <p:nvPicPr>
-          <p:cNvPr id="9" name="Picture 8">
+          <p:cNvPr id="6" name="Picture 5">
             <a:extLst>
               <a:ext uri="{FF2B5EF4-FFF2-40B4-BE49-F238E27FC236}">
-                <a16:creationId xmlns:a16="http://schemas.microsoft.com/office/drawing/2014/main" id="{CDF206B8-267D-4DDA-BFAC-7BB3AA75D2B2}"/>
+                <a16:creationId xmlns:a16="http://schemas.microsoft.com/office/drawing/2014/main" id="{63B9E0E4-20BD-4579-A955-2C90C2BD54B8}"/>
               </a:ext>
             </a:extLst>
           </p:cNvPr>
-          <p:cNvPicPr/>
+          <p:cNvPicPr>
+            <a:picLocks noChangeAspect="1"/>
+          </p:cNvPicPr>
           <p:nvPr userDrawn="1"/>
         </p:nvPicPr>
-        <p:blipFill rotWithShape="1">
-          <a:blip r:embed="rId5">
-            <a:extLst>
-              <a:ext uri="{28A0092B-C50C-407E-A947-70E740481C1C}">
-                <a14:useLocalDpi xmlns:a14="http://schemas.microsoft.com/office/drawing/2010/main" val="0"/>
-              </a:ext>
-            </a:extLst>
-          </a:blip>
-          <a:srcRect l="4423" t="4333" r="3217" b="7247"/>
-          <a:stretch/>
+        <p:blipFill>
+          <a:blip r:embed="rId6"/>
+          <a:stretch>
+            <a:fillRect/>
+          </a:stretch>
         </p:blipFill>
-        <p:spPr bwMode="auto">
+        <p:spPr>
           <a:xfrm>
-            <a:off x="928914" y="899880"/>
-            <a:ext cx="10000343" cy="4107543"/>
+            <a:off x="0" y="273056"/>
+            <a:ext cx="5991225" cy="6000750"/>
           </a:xfrm>
           <a:prstGeom prst="rect">
             <a:avLst/>
           </a:prstGeom>
-          <a:noFill/>
-          <a:ln>
-            <a:noFill/>
-          </a:ln>
         </p:spPr>
       </p:pic>
     </p:spTree>
     <p:extLst>
       <p:ext uri="{BB962C8B-B14F-4D97-AF65-F5344CB8AC3E}">
-        <p14:creationId xmlns:p14="http://schemas.microsoft.com/office/powerpoint/2010/main" val="438620834"/>
+        <p14:creationId xmlns:p14="http://schemas.microsoft.com/office/powerpoint/2010/main" val="2450602093"/>
+      </p:ext>
+    </p:extLst>
+  </p:cSld>
+  <p:clrMapOvr>
+    <a:overrideClrMapping bg1="lt1" tx1="dk1" bg2="lt2" tx2="dk2" accent1="accent1" accent2="accent2" accent3="accent3" accent4="accent4" accent5="accent5" accent6="accent6" hlink="hlink" folHlink="folHlink"/>
+  </p:clrMapOvr>
+</p:sldLayout>
+</file>
+
+<file path=ppt/slideLayouts/slideLayout10.xml><?xml version="1.0" encoding="utf-8"?>
+<p:sldLayout xmlns:a="http://schemas.openxmlformats.org/drawingml/2006/main" xmlns:r="http://schemas.openxmlformats.org/officeDocument/2006/relationships" xmlns:p="http://schemas.openxmlformats.org/presentationml/2006/main" type="titleOnly">
+  <p:cSld name="Title Only">
+    <p:spTree>
+      <p:nvGrpSpPr>
+        <p:cNvPr id="1" name=""/>
+        <p:cNvGrpSpPr/>
+        <p:nvPr/>
+      </p:nvGrpSpPr>
+      <p:grpSpPr>
+        <a:xfrm>
+          <a:off x="0" y="0"/>
+          <a:ext cx="0" cy="0"/>
+          <a:chOff x="0" y="0"/>
+          <a:chExt cx="0" cy="0"/>
+        </a:xfrm>
+      </p:grpSpPr>
+      <p:graphicFrame>
+        <p:nvGraphicFramePr>
+          <p:cNvPr id="6" name="Object 5" hidden="1">
+            <a:extLst>
+              <a:ext uri="{FF2B5EF4-FFF2-40B4-BE49-F238E27FC236}">
+                <a16:creationId xmlns:a16="http://schemas.microsoft.com/office/drawing/2014/main" id="{FD46B626-92F4-449F-9587-B342F55F9C4B}"/>
+              </a:ext>
+            </a:extLst>
+          </p:cNvPr>
+          <p:cNvGraphicFramePr>
+            <a:graphicFrameLocks noChangeAspect="1"/>
+          </p:cNvGraphicFramePr>
+          <p:nvPr userDrawn="1">
+            <p:custDataLst>
+              <p:tags r:id="rId2"/>
+            </p:custDataLst>
+          </p:nvPr>
+        </p:nvGraphicFramePr>
+        <p:xfrm>
+          <a:off x="1588" y="1588"/>
+          <a:ext cx="1587" cy="1587"/>
+        </p:xfrm>
+        <a:graphic>
+          <a:graphicData uri="http://schemas.openxmlformats.org/presentationml/2006/ole">
+            <mc:AlternateContent xmlns:mc="http://schemas.openxmlformats.org/markup-compatibility/2006">
+              <mc:Choice xmlns:v="urn:schemas-microsoft-com:vml" Requires="v">
+                <p:oleObj spid="_x0000_s11266" name="think-cell Slide" r:id="rId4" imgW="347" imgH="348" progId="TCLayout.ActiveDocument.1">
+                  <p:embed/>
+                </p:oleObj>
+              </mc:Choice>
+              <mc:Fallback>
+                <p:oleObj name="think-cell Slide" r:id="rId4" imgW="347" imgH="348" progId="TCLayout.ActiveDocument.1">
+                  <p:embed/>
+                  <p:pic>
+                    <p:nvPicPr>
+                      <p:cNvPr id="6" name="Object 5" hidden="1">
+                        <a:extLst>
+                          <a:ext uri="{FF2B5EF4-FFF2-40B4-BE49-F238E27FC236}">
+                            <a16:creationId xmlns:a16="http://schemas.microsoft.com/office/drawing/2014/main" id="{FD46B626-92F4-449F-9587-B342F55F9C4B}"/>
+                          </a:ext>
+                        </a:extLst>
+                      </p:cNvPr>
+                      <p:cNvPicPr/>
+                      <p:nvPr/>
+                    </p:nvPicPr>
+                    <p:blipFill>
+                      <a:blip r:embed="rId5"/>
+                      <a:stretch>
+                        <a:fillRect/>
+                      </a:stretch>
+                    </p:blipFill>
+                    <p:spPr>
+                      <a:xfrm>
+                        <a:off x="1588" y="1588"/>
+                        <a:ext cx="1587" cy="1587"/>
+                      </a:xfrm>
+                      <a:prstGeom prst="rect">
+                        <a:avLst/>
+                      </a:prstGeom>
+                    </p:spPr>
+                  </p:pic>
+                </p:oleObj>
+              </mc:Fallback>
+            </mc:AlternateContent>
+          </a:graphicData>
+        </a:graphic>
+      </p:graphicFrame>
+      <p:sp>
+        <p:nvSpPr>
+          <p:cNvPr id="2" name="Title 1"/>
+          <p:cNvSpPr>
+            <a:spLocks noGrp="1"/>
+          </p:cNvSpPr>
+          <p:nvPr>
+            <p:ph type="title"/>
+          </p:nvPr>
+        </p:nvSpPr>
+        <p:spPr/>
+        <p:txBody>
+          <a:bodyPr/>
+          <a:lstStyle/>
+          <a:p>
+            <a:r>
+              <a:rPr lang="en-US" dirty="0"/>
+              <a:t>Click to edit Master title style</a:t>
+            </a:r>
+            <a:endParaRPr lang="en-GB" dirty="0"/>
+          </a:p>
+        </p:txBody>
+      </p:sp>
+      <p:sp>
+        <p:nvSpPr>
+          <p:cNvPr id="3" name="Date Placeholder 2"/>
+          <p:cNvSpPr>
+            <a:spLocks noGrp="1"/>
+          </p:cNvSpPr>
+          <p:nvPr>
+            <p:ph type="dt" sz="half" idx="10"/>
+          </p:nvPr>
+        </p:nvSpPr>
+        <p:spPr/>
+        <p:txBody>
+          <a:bodyPr/>
+          <a:lstStyle/>
+          <a:p>
+            <a:fld id="{92F64031-640B-4962-8CF9-EAD8AB4A604D}" type="datetimeFigureOut">
+              <a:rPr lang="en-GB" smtClean="0"/>
+              <a:t>03/05/2024</a:t>
+            </a:fld>
+            <a:endParaRPr lang="en-GB"/>
+          </a:p>
+        </p:txBody>
+      </p:sp>
+      <p:sp>
+        <p:nvSpPr>
+          <p:cNvPr id="4" name="Footer Placeholder 3"/>
+          <p:cNvSpPr>
+            <a:spLocks noGrp="1"/>
+          </p:cNvSpPr>
+          <p:nvPr>
+            <p:ph type="ftr" sz="quarter" idx="11"/>
+          </p:nvPr>
+        </p:nvSpPr>
+        <p:spPr/>
+        <p:txBody>
+          <a:bodyPr/>
+          <a:lstStyle/>
+          <a:p>
+            <a:endParaRPr lang="en-GB"/>
+          </a:p>
+        </p:txBody>
+      </p:sp>
+      <p:sp>
+        <p:nvSpPr>
+          <p:cNvPr id="5" name="Slide Number Placeholder 4"/>
+          <p:cNvSpPr>
+            <a:spLocks noGrp="1"/>
+          </p:cNvSpPr>
+          <p:nvPr>
+            <p:ph type="sldNum" sz="quarter" idx="12"/>
+          </p:nvPr>
+        </p:nvSpPr>
+        <p:spPr>
+          <a:xfrm>
+            <a:off x="8610600" y="6356350"/>
+            <a:ext cx="2743200" cy="365125"/>
+          </a:xfrm>
+          <a:prstGeom prst="rect">
+            <a:avLst/>
+          </a:prstGeom>
+        </p:spPr>
+        <p:txBody>
+          <a:bodyPr/>
+          <a:lstStyle/>
+          <a:p>
+            <a:fld id="{0D8F0A42-4B1E-4613-8C4D-AAA004DCF1D5}" type="slidenum">
+              <a:rPr lang="en-GB" smtClean="0"/>
+              <a:t>‹#›</a:t>
+            </a:fld>
+            <a:endParaRPr lang="en-GB"/>
+          </a:p>
+        </p:txBody>
+      </p:sp>
+    </p:spTree>
+    <p:extLst>
+      <p:ext uri="{BB962C8B-B14F-4D97-AF65-F5344CB8AC3E}">
+        <p14:creationId xmlns:p14="http://schemas.microsoft.com/office/powerpoint/2010/main" val="738244242"/>
       </p:ext>
     </p:extLst>
   </p:cSld>
@@ -1991,7 +2174,384 @@
 </p:sldLayout>
 </file>
 
-<file path=ppt/slideLayouts/slideLayout10.xml><?xml version="1.0" encoding="utf-8"?>
+<file path=ppt/slideLayouts/slideLayout2.xml><?xml version="1.0" encoding="utf-8"?>
+<p:sldLayout xmlns:a="http://schemas.openxmlformats.org/drawingml/2006/main" xmlns:r="http://schemas.openxmlformats.org/officeDocument/2006/relationships" xmlns:p="http://schemas.openxmlformats.org/presentationml/2006/main" preserve="1" userDrawn="1">
+  <p:cSld name="7_Title Slide">
+    <p:spTree>
+      <p:nvGrpSpPr>
+        <p:cNvPr id="1" name=""/>
+        <p:cNvGrpSpPr/>
+        <p:nvPr/>
+      </p:nvGrpSpPr>
+      <p:grpSpPr>
+        <a:xfrm>
+          <a:off x="0" y="0"/>
+          <a:ext cx="0" cy="0"/>
+          <a:chOff x="0" y="0"/>
+          <a:chExt cx="0" cy="0"/>
+        </a:xfrm>
+      </p:grpSpPr>
+      <p:sp>
+        <p:nvSpPr>
+          <p:cNvPr id="4" name="Rectangle 3">
+            <a:extLst>
+              <a:ext uri="{FF2B5EF4-FFF2-40B4-BE49-F238E27FC236}">
+                <a16:creationId xmlns:a16="http://schemas.microsoft.com/office/drawing/2014/main" id="{31C53266-8226-4323-93D8-8635471CF311}"/>
+              </a:ext>
+            </a:extLst>
+          </p:cNvPr>
+          <p:cNvSpPr/>
+          <p:nvPr userDrawn="1"/>
+        </p:nvSpPr>
+        <p:spPr>
+          <a:xfrm>
+            <a:off x="0" y="-6"/>
+            <a:ext cx="12191996" cy="6858005"/>
+          </a:xfrm>
+          <a:prstGeom prst="rect">
+            <a:avLst/>
+          </a:prstGeom>
+          <a:solidFill>
+            <a:schemeClr val="accent1"/>
+          </a:solidFill>
+          <a:ln>
+            <a:noFill/>
+          </a:ln>
+        </p:spPr>
+        <p:style>
+          <a:lnRef idx="2">
+            <a:schemeClr val="accent1">
+              <a:shade val="50000"/>
+            </a:schemeClr>
+          </a:lnRef>
+          <a:fillRef idx="1">
+            <a:schemeClr val="accent1"/>
+          </a:fillRef>
+          <a:effectRef idx="0">
+            <a:schemeClr val="accent1"/>
+          </a:effectRef>
+          <a:fontRef idx="minor">
+            <a:schemeClr val="lt1"/>
+          </a:fontRef>
+        </p:style>
+        <p:txBody>
+          <a:bodyPr rtlCol="0" anchor="ctr"/>
+          <a:lstStyle/>
+          <a:p>
+            <a:pPr algn="ctr"/>
+            <a:endParaRPr lang="en-US"/>
+          </a:p>
+        </p:txBody>
+      </p:sp>
+      <p:sp>
+        <p:nvSpPr>
+          <p:cNvPr id="38" name="Arrow: Pentagon 37">
+            <a:extLst>
+              <a:ext uri="{FF2B5EF4-FFF2-40B4-BE49-F238E27FC236}">
+                <a16:creationId xmlns:a16="http://schemas.microsoft.com/office/drawing/2014/main" id="{9787AEAF-CECE-47AD-BC55-6A8FA3B19CEE}"/>
+              </a:ext>
+            </a:extLst>
+          </p:cNvPr>
+          <p:cNvSpPr/>
+          <p:nvPr userDrawn="1"/>
+        </p:nvSpPr>
+        <p:spPr>
+          <a:xfrm flipH="1">
+            <a:off x="5511800" y="-6"/>
+            <a:ext cx="6680196" cy="6877110"/>
+          </a:xfrm>
+          <a:prstGeom prst="homePlate">
+            <a:avLst>
+              <a:gd name="adj" fmla="val 26731"/>
+            </a:avLst>
+          </a:prstGeom>
+          <a:solidFill>
+            <a:schemeClr val="accent4"/>
+          </a:solidFill>
+          <a:ln>
+            <a:noFill/>
+          </a:ln>
+          <a:effectLst>
+            <a:outerShdw blurRad="266700" dist="38100" dir="10800000" algn="r" rotWithShape="0">
+              <a:prstClr val="black">
+                <a:alpha val="77000"/>
+              </a:prstClr>
+            </a:outerShdw>
+          </a:effectLst>
+        </p:spPr>
+        <p:style>
+          <a:lnRef idx="2">
+            <a:schemeClr val="accent1">
+              <a:shade val="50000"/>
+            </a:schemeClr>
+          </a:lnRef>
+          <a:fillRef idx="1">
+            <a:schemeClr val="accent1"/>
+          </a:fillRef>
+          <a:effectRef idx="0">
+            <a:schemeClr val="accent1"/>
+          </a:effectRef>
+          <a:fontRef idx="minor">
+            <a:schemeClr val="lt1"/>
+          </a:fontRef>
+        </p:style>
+        <p:txBody>
+          <a:bodyPr rtlCol="0" anchor="ctr"/>
+          <a:lstStyle/>
+          <a:p>
+            <a:pPr algn="ctr"/>
+            <a:endParaRPr lang="en-US"/>
+          </a:p>
+        </p:txBody>
+      </p:sp>
+    </p:spTree>
+    <p:extLst>
+      <p:ext uri="{BB962C8B-B14F-4D97-AF65-F5344CB8AC3E}">
+        <p14:creationId xmlns:p14="http://schemas.microsoft.com/office/powerpoint/2010/main" val="3501480314"/>
+      </p:ext>
+    </p:extLst>
+  </p:cSld>
+  <p:clrMapOvr>
+    <a:masterClrMapping/>
+  </p:clrMapOvr>
+</p:sldLayout>
+</file>
+
+<file path=ppt/slideLayouts/slideLayout3.xml><?xml version="1.0" encoding="utf-8"?>
+<p:sldLayout xmlns:a="http://schemas.openxmlformats.org/drawingml/2006/main" xmlns:r="http://schemas.openxmlformats.org/officeDocument/2006/relationships" xmlns:p="http://schemas.openxmlformats.org/presentationml/2006/main" type="obj" preserve="1">
+  <p:cSld name="Title and Content">
+    <p:spTree>
+      <p:nvGrpSpPr>
+        <p:cNvPr id="1" name=""/>
+        <p:cNvGrpSpPr/>
+        <p:nvPr/>
+      </p:nvGrpSpPr>
+      <p:grpSpPr>
+        <a:xfrm>
+          <a:off x="0" y="0"/>
+          <a:ext cx="0" cy="0"/>
+          <a:chOff x="0" y="0"/>
+          <a:chExt cx="0" cy="0"/>
+        </a:xfrm>
+      </p:grpSpPr>
+      <p:graphicFrame>
+        <p:nvGraphicFramePr>
+          <p:cNvPr id="6" name="Object 5" hidden="1">
+            <a:extLst>
+              <a:ext uri="{FF2B5EF4-FFF2-40B4-BE49-F238E27FC236}">
+                <a16:creationId xmlns:a16="http://schemas.microsoft.com/office/drawing/2014/main" id="{262DE44B-329D-44C4-A098-54D67821F0BF}"/>
+              </a:ext>
+            </a:extLst>
+          </p:cNvPr>
+          <p:cNvGraphicFramePr>
+            <a:graphicFrameLocks noChangeAspect="1"/>
+          </p:cNvGraphicFramePr>
+          <p:nvPr userDrawn="1">
+            <p:custDataLst>
+              <p:tags r:id="rId2"/>
+            </p:custDataLst>
+          </p:nvPr>
+        </p:nvGraphicFramePr>
+        <p:xfrm>
+          <a:off x="1588" y="1588"/>
+          <a:ext cx="1587" cy="1587"/>
+        </p:xfrm>
+        <a:graphic>
+          <a:graphicData uri="http://schemas.openxmlformats.org/presentationml/2006/ole">
+            <mc:AlternateContent xmlns:mc="http://schemas.openxmlformats.org/markup-compatibility/2006">
+              <mc:Choice xmlns:v="urn:schemas-microsoft-com:vml" Requires="v">
+                <p:oleObj spid="_x0000_s7170" name="think-cell Slide" r:id="rId4" imgW="347" imgH="348" progId="TCLayout.ActiveDocument.1">
+                  <p:embed/>
+                </p:oleObj>
+              </mc:Choice>
+              <mc:Fallback>
+                <p:oleObj name="think-cell Slide" r:id="rId4" imgW="347" imgH="348" progId="TCLayout.ActiveDocument.1">
+                  <p:embed/>
+                  <p:pic>
+                    <p:nvPicPr>
+                      <p:cNvPr id="6" name="Object 5" hidden="1">
+                        <a:extLst>
+                          <a:ext uri="{FF2B5EF4-FFF2-40B4-BE49-F238E27FC236}">
+                            <a16:creationId xmlns:a16="http://schemas.microsoft.com/office/drawing/2014/main" id="{262DE44B-329D-44C4-A098-54D67821F0BF}"/>
+                          </a:ext>
+                        </a:extLst>
+                      </p:cNvPr>
+                      <p:cNvPicPr/>
+                      <p:nvPr/>
+                    </p:nvPicPr>
+                    <p:blipFill>
+                      <a:blip r:embed="rId5"/>
+                      <a:stretch>
+                        <a:fillRect/>
+                      </a:stretch>
+                    </p:blipFill>
+                    <p:spPr>
+                      <a:xfrm>
+                        <a:off x="1588" y="1588"/>
+                        <a:ext cx="1587" cy="1587"/>
+                      </a:xfrm>
+                      <a:prstGeom prst="rect">
+                        <a:avLst/>
+                      </a:prstGeom>
+                    </p:spPr>
+                  </p:pic>
+                </p:oleObj>
+              </mc:Fallback>
+            </mc:AlternateContent>
+          </a:graphicData>
+        </a:graphic>
+      </p:graphicFrame>
+      <p:sp>
+        <p:nvSpPr>
+          <p:cNvPr id="2" name="Title 1">
+            <a:extLst>
+              <a:ext uri="{FF2B5EF4-FFF2-40B4-BE49-F238E27FC236}">
+                <a16:creationId xmlns:a16="http://schemas.microsoft.com/office/drawing/2014/main" id="{5149EF36-F9CE-4647-B169-9B37B99036E8}"/>
+              </a:ext>
+            </a:extLst>
+          </p:cNvPr>
+          <p:cNvSpPr>
+            <a:spLocks noGrp="1"/>
+          </p:cNvSpPr>
+          <p:nvPr>
+            <p:ph type="title"/>
+          </p:nvPr>
+        </p:nvSpPr>
+        <p:spPr>
+          <a:xfrm>
+            <a:off x="324416" y="303636"/>
+            <a:ext cx="10470584" cy="403187"/>
+          </a:xfrm>
+        </p:spPr>
+        <p:txBody>
+          <a:bodyPr/>
+          <a:lstStyle/>
+          <a:p>
+            <a:r>
+              <a:rPr lang="en-US"/>
+              <a:t>Click to edit Master title style</a:t>
+            </a:r>
+          </a:p>
+        </p:txBody>
+      </p:sp>
+      <p:sp>
+        <p:nvSpPr>
+          <p:cNvPr id="3" name="Content Placeholder 2">
+            <a:extLst>
+              <a:ext uri="{FF2B5EF4-FFF2-40B4-BE49-F238E27FC236}">
+                <a16:creationId xmlns:a16="http://schemas.microsoft.com/office/drawing/2014/main" id="{2B1099A3-25D1-44D2-B255-78F583BF08A3}"/>
+              </a:ext>
+            </a:extLst>
+          </p:cNvPr>
+          <p:cNvSpPr>
+            <a:spLocks noGrp="1"/>
+          </p:cNvSpPr>
+          <p:nvPr>
+            <p:ph idx="1"/>
+          </p:nvPr>
+        </p:nvSpPr>
+        <p:spPr/>
+        <p:txBody>
+          <a:bodyPr/>
+          <a:lstStyle/>
+          <a:p>
+            <a:pPr lvl="0"/>
+            <a:r>
+              <a:rPr lang="en-US"/>
+              <a:t>Edit Master text styles</a:t>
+            </a:r>
+          </a:p>
+          <a:p>
+            <a:pPr lvl="1"/>
+            <a:r>
+              <a:rPr lang="en-US"/>
+              <a:t>Second level</a:t>
+            </a:r>
+          </a:p>
+          <a:p>
+            <a:pPr lvl="2"/>
+            <a:r>
+              <a:rPr lang="en-US"/>
+              <a:t>Third level</a:t>
+            </a:r>
+          </a:p>
+          <a:p>
+            <a:pPr lvl="3"/>
+            <a:r>
+              <a:rPr lang="en-US"/>
+              <a:t>Fourth level</a:t>
+            </a:r>
+          </a:p>
+        </p:txBody>
+      </p:sp>
+      <p:sp>
+        <p:nvSpPr>
+          <p:cNvPr id="4" name="Date Placeholder 3">
+            <a:extLst>
+              <a:ext uri="{FF2B5EF4-FFF2-40B4-BE49-F238E27FC236}">
+                <a16:creationId xmlns:a16="http://schemas.microsoft.com/office/drawing/2014/main" id="{4385C4C7-F6B0-48E4-ACEC-649CC0F49C64}"/>
+              </a:ext>
+            </a:extLst>
+          </p:cNvPr>
+          <p:cNvSpPr>
+            <a:spLocks noGrp="1"/>
+          </p:cNvSpPr>
+          <p:nvPr>
+            <p:ph type="dt" sz="half" idx="10"/>
+          </p:nvPr>
+        </p:nvSpPr>
+        <p:spPr/>
+        <p:txBody>
+          <a:bodyPr/>
+          <a:lstStyle/>
+          <a:p>
+            <a:fld id="{C426BC5F-09C1-43F9-92E4-3807667E7453}" type="datetimeFigureOut">
+              <a:rPr lang="en-US" smtClean="0"/>
+              <a:t>03-May-24</a:t>
+            </a:fld>
+            <a:endParaRPr lang="en-US"/>
+          </a:p>
+        </p:txBody>
+      </p:sp>
+      <p:sp>
+        <p:nvSpPr>
+          <p:cNvPr id="5" name="Footer Placeholder 4">
+            <a:extLst>
+              <a:ext uri="{FF2B5EF4-FFF2-40B4-BE49-F238E27FC236}">
+                <a16:creationId xmlns:a16="http://schemas.microsoft.com/office/drawing/2014/main" id="{ECDAD504-107D-4E14-8686-4209B335C8D1}"/>
+              </a:ext>
+            </a:extLst>
+          </p:cNvPr>
+          <p:cNvSpPr>
+            <a:spLocks noGrp="1"/>
+          </p:cNvSpPr>
+          <p:nvPr>
+            <p:ph type="ftr" sz="quarter" idx="11"/>
+          </p:nvPr>
+        </p:nvSpPr>
+        <p:spPr/>
+        <p:txBody>
+          <a:bodyPr/>
+          <a:lstStyle/>
+          <a:p>
+            <a:endParaRPr lang="en-US"/>
+          </a:p>
+        </p:txBody>
+      </p:sp>
+    </p:spTree>
+    <p:extLst>
+      <p:ext uri="{BB962C8B-B14F-4D97-AF65-F5344CB8AC3E}">
+        <p14:creationId xmlns:p14="http://schemas.microsoft.com/office/powerpoint/2010/main" val="2721967463"/>
+      </p:ext>
+    </p:extLst>
+  </p:cSld>
+  <p:clrMapOvr>
+    <a:masterClrMapping/>
+  </p:clrMapOvr>
+</p:sldLayout>
+</file>
+
+<file path=ppt/slideLayouts/slideLayout4.xml><?xml version="1.0" encoding="utf-8"?>
 <p:sldLayout xmlns:a="http://schemas.openxmlformats.org/drawingml/2006/main" xmlns:r="http://schemas.openxmlformats.org/officeDocument/2006/relationships" xmlns:p="http://schemas.openxmlformats.org/presentationml/2006/main" matchingName="Blank" type="blank">
   <p:cSld name="Blank">
     <p:spTree>
@@ -2624,7 +3184,308 @@
 </p:sldLayout>
 </file>
 
-<file path=ppt/slideLayouts/slideLayout2.xml><?xml version="1.0" encoding="utf-8"?>
+<file path=ppt/slideLayouts/slideLayout5.xml><?xml version="1.0" encoding="utf-8"?>
+<p:sldLayout xmlns:a="http://schemas.openxmlformats.org/drawingml/2006/main" xmlns:r="http://schemas.openxmlformats.org/officeDocument/2006/relationships" xmlns:p="http://schemas.openxmlformats.org/presentationml/2006/main" type="title" preserve="1">
+  <p:cSld name="Title Slide">
+    <p:bg>
+      <p:bgPr>
+        <a:solidFill>
+          <a:srgbClr val="F8F9F7"/>
+        </a:solidFill>
+        <a:effectLst/>
+      </p:bgPr>
+    </p:bg>
+    <p:spTree>
+      <p:nvGrpSpPr>
+        <p:cNvPr id="1" name=""/>
+        <p:cNvGrpSpPr/>
+        <p:nvPr/>
+      </p:nvGrpSpPr>
+      <p:grpSpPr>
+        <a:xfrm>
+          <a:off x="0" y="0"/>
+          <a:ext cx="0" cy="0"/>
+          <a:chOff x="0" y="0"/>
+          <a:chExt cx="0" cy="0"/>
+        </a:xfrm>
+      </p:grpSpPr>
+      <p:graphicFrame>
+        <p:nvGraphicFramePr>
+          <p:cNvPr id="4" name="Object 3" hidden="1"/>
+          <p:cNvGraphicFramePr>
+            <a:graphicFrameLocks noChangeAspect="1"/>
+          </p:cNvGraphicFramePr>
+          <p:nvPr userDrawn="1">
+            <p:custDataLst>
+              <p:tags r:id="rId2"/>
+            </p:custDataLst>
+          </p:nvPr>
+        </p:nvGraphicFramePr>
+        <p:xfrm>
+          <a:off x="1588" y="1588"/>
+          <a:ext cx="1587" cy="1587"/>
+        </p:xfrm>
+        <a:graphic>
+          <a:graphicData uri="http://schemas.openxmlformats.org/presentationml/2006/ole">
+            <mc:AlternateContent xmlns:mc="http://schemas.openxmlformats.org/markup-compatibility/2006">
+              <mc:Choice xmlns:v="urn:schemas-microsoft-com:vml" Requires="v">
+                <p:oleObj spid="_x0000_s9218" name="think-cell Slide" r:id="rId4" imgW="425" imgH="426" progId="TCLayout.ActiveDocument.1">
+                  <p:embed/>
+                </p:oleObj>
+              </mc:Choice>
+              <mc:Fallback>
+                <p:oleObj name="think-cell Slide" r:id="rId4" imgW="425" imgH="426" progId="TCLayout.ActiveDocument.1">
+                  <p:embed/>
+                  <p:pic>
+                    <p:nvPicPr>
+                      <p:cNvPr id="4" name="Object 3" hidden="1"/>
+                      <p:cNvPicPr/>
+                      <p:nvPr/>
+                    </p:nvPicPr>
+                    <p:blipFill>
+                      <a:blip r:embed="rId5"/>
+                      <a:stretch>
+                        <a:fillRect/>
+                      </a:stretch>
+                    </p:blipFill>
+                    <p:spPr>
+                      <a:xfrm>
+                        <a:off x="1588" y="1588"/>
+                        <a:ext cx="1587" cy="1587"/>
+                      </a:xfrm>
+                      <a:prstGeom prst="rect">
+                        <a:avLst/>
+                      </a:prstGeom>
+                    </p:spPr>
+                  </p:pic>
+                </p:oleObj>
+              </mc:Fallback>
+            </mc:AlternateContent>
+          </a:graphicData>
+        </a:graphic>
+      </p:graphicFrame>
+      <p:sp>
+        <p:nvSpPr>
+          <p:cNvPr id="11" name="Rectangle 10">
+            <a:extLst>
+              <a:ext uri="{FF2B5EF4-FFF2-40B4-BE49-F238E27FC236}">
+                <a16:creationId xmlns:a16="http://schemas.microsoft.com/office/drawing/2014/main" id="{123D8E40-FDBE-46A0-9A0B-123E9AA3D356}"/>
+              </a:ext>
+            </a:extLst>
+          </p:cNvPr>
+          <p:cNvSpPr/>
+          <p:nvPr userDrawn="1"/>
+        </p:nvSpPr>
+        <p:spPr>
+          <a:xfrm>
+            <a:off x="0" y="5029200"/>
+            <a:ext cx="12192000" cy="1828800"/>
+          </a:xfrm>
+          <a:prstGeom prst="rect">
+            <a:avLst/>
+          </a:prstGeom>
+          <a:solidFill>
+            <a:schemeClr val="bg1"/>
+          </a:solidFill>
+          <a:ln>
+            <a:noFill/>
+          </a:ln>
+        </p:spPr>
+        <p:style>
+          <a:lnRef idx="2">
+            <a:schemeClr val="accent1">
+              <a:shade val="50000"/>
+            </a:schemeClr>
+          </a:lnRef>
+          <a:fillRef idx="1">
+            <a:schemeClr val="accent1"/>
+          </a:fillRef>
+          <a:effectRef idx="0">
+            <a:schemeClr val="accent1"/>
+          </a:effectRef>
+          <a:fontRef idx="minor">
+            <a:schemeClr val="lt1"/>
+          </a:fontRef>
+        </p:style>
+        <p:txBody>
+          <a:bodyPr rtlCol="0" anchor="ctr"/>
+          <a:lstStyle/>
+          <a:p>
+            <a:pPr algn="ctr"/>
+            <a:endParaRPr lang="en-US"/>
+          </a:p>
+        </p:txBody>
+      </p:sp>
+      <p:sp>
+        <p:nvSpPr>
+          <p:cNvPr id="2" name="Title 1">
+            <a:extLst>
+              <a:ext uri="{FF2B5EF4-FFF2-40B4-BE49-F238E27FC236}">
+                <a16:creationId xmlns:a16="http://schemas.microsoft.com/office/drawing/2014/main" id="{EB5425CA-745D-4BC0-AA06-EBEF50EA738F}"/>
+              </a:ext>
+            </a:extLst>
+          </p:cNvPr>
+          <p:cNvSpPr>
+            <a:spLocks noGrp="1"/>
+          </p:cNvSpPr>
+          <p:nvPr>
+            <p:ph type="ctrTitle"/>
+          </p:nvPr>
+        </p:nvSpPr>
+        <p:spPr>
+          <a:xfrm>
+            <a:off x="300317" y="5549250"/>
+            <a:ext cx="11634508" cy="500137"/>
+          </a:xfrm>
+        </p:spPr>
+        <p:txBody>
+          <a:bodyPr wrap="square" lIns="15240" tIns="7620" rIns="15240" bIns="7620" anchor="b">
+            <a:spAutoFit/>
+          </a:bodyPr>
+          <a:lstStyle>
+            <a:lvl1pPr algn="ctr">
+              <a:defRPr sz="3500" b="1">
+                <a:solidFill>
+                  <a:schemeClr val="accent1"/>
+                </a:solidFill>
+              </a:defRPr>
+            </a:lvl1pPr>
+          </a:lstStyle>
+          <a:p>
+            <a:r>
+              <a:rPr lang="en-US"/>
+              <a:t>Click to edit Master title style</a:t>
+            </a:r>
+          </a:p>
+        </p:txBody>
+      </p:sp>
+      <p:sp>
+        <p:nvSpPr>
+          <p:cNvPr id="3" name="Subtitle 2">
+            <a:extLst>
+              <a:ext uri="{FF2B5EF4-FFF2-40B4-BE49-F238E27FC236}">
+                <a16:creationId xmlns:a16="http://schemas.microsoft.com/office/drawing/2014/main" id="{69084E31-0DDD-4236-AABB-65C91A25CE58}"/>
+              </a:ext>
+            </a:extLst>
+          </p:cNvPr>
+          <p:cNvSpPr>
+            <a:spLocks noGrp="1"/>
+          </p:cNvSpPr>
+          <p:nvPr>
+            <p:ph type="subTitle" idx="1"/>
+          </p:nvPr>
+        </p:nvSpPr>
+        <p:spPr>
+          <a:xfrm>
+            <a:off x="300317" y="6141462"/>
+            <a:ext cx="11634508" cy="264688"/>
+          </a:xfrm>
+        </p:spPr>
+        <p:txBody>
+          <a:bodyPr wrap="square" lIns="15240" tIns="7620" rIns="15240" bIns="7620">
+            <a:spAutoFit/>
+          </a:bodyPr>
+          <a:lstStyle>
+            <a:lvl1pPr marL="0" indent="0" algn="ctr">
+              <a:buNone/>
+              <a:defRPr sz="1800">
+                <a:solidFill>
+                  <a:schemeClr val="tx1"/>
+                </a:solidFill>
+              </a:defRPr>
+            </a:lvl1pPr>
+            <a:lvl2pPr marL="457200" indent="0" algn="ctr">
+              <a:buNone/>
+              <a:defRPr sz="2000"/>
+            </a:lvl2pPr>
+            <a:lvl3pPr marL="914400" indent="0" algn="ctr">
+              <a:buNone/>
+              <a:defRPr sz="1800"/>
+            </a:lvl3pPr>
+            <a:lvl4pPr marL="1371600" indent="0" algn="ctr">
+              <a:buNone/>
+              <a:defRPr sz="1600"/>
+            </a:lvl4pPr>
+            <a:lvl5pPr marL="1828800" indent="0" algn="ctr">
+              <a:buNone/>
+              <a:defRPr sz="1600"/>
+            </a:lvl5pPr>
+            <a:lvl6pPr marL="2286000" indent="0" algn="ctr">
+              <a:buNone/>
+              <a:defRPr sz="1600"/>
+            </a:lvl6pPr>
+            <a:lvl7pPr marL="2743200" indent="0" algn="ctr">
+              <a:buNone/>
+              <a:defRPr sz="1600"/>
+            </a:lvl7pPr>
+            <a:lvl8pPr marL="3200400" indent="0" algn="ctr">
+              <a:buNone/>
+              <a:defRPr sz="1600"/>
+            </a:lvl8pPr>
+            <a:lvl9pPr marL="3657600" indent="0" algn="ctr">
+              <a:buNone/>
+              <a:defRPr sz="1600"/>
+            </a:lvl9pPr>
+          </a:lstStyle>
+          <a:p>
+            <a:r>
+              <a:rPr lang="en-US"/>
+              <a:t>Click to edit Master subtitle style</a:t>
+            </a:r>
+          </a:p>
+        </p:txBody>
+      </p:sp>
+      <p:pic>
+        <p:nvPicPr>
+          <p:cNvPr id="9" name="Picture 8">
+            <a:extLst>
+              <a:ext uri="{FF2B5EF4-FFF2-40B4-BE49-F238E27FC236}">
+                <a16:creationId xmlns:a16="http://schemas.microsoft.com/office/drawing/2014/main" id="{CDF206B8-267D-4DDA-BFAC-7BB3AA75D2B2}"/>
+              </a:ext>
+            </a:extLst>
+          </p:cNvPr>
+          <p:cNvPicPr/>
+          <p:nvPr userDrawn="1"/>
+        </p:nvPicPr>
+        <p:blipFill rotWithShape="1">
+          <a:blip r:embed="rId6">
+            <a:extLst>
+              <a:ext uri="{28A0092B-C50C-407E-A947-70E740481C1C}">
+                <a14:useLocalDpi xmlns:a14="http://schemas.microsoft.com/office/drawing/2010/main" val="0"/>
+              </a:ext>
+            </a:extLst>
+          </a:blip>
+          <a:srcRect l="4423" t="4333" r="3217" b="7247"/>
+          <a:stretch/>
+        </p:blipFill>
+        <p:spPr bwMode="auto">
+          <a:xfrm>
+            <a:off x="928914" y="899880"/>
+            <a:ext cx="10000343" cy="4107543"/>
+          </a:xfrm>
+          <a:prstGeom prst="rect">
+            <a:avLst/>
+          </a:prstGeom>
+          <a:noFill/>
+          <a:ln>
+            <a:noFill/>
+          </a:ln>
+        </p:spPr>
+      </p:pic>
+    </p:spTree>
+    <p:extLst>
+      <p:ext uri="{BB962C8B-B14F-4D97-AF65-F5344CB8AC3E}">
+        <p14:creationId xmlns:p14="http://schemas.microsoft.com/office/powerpoint/2010/main" val="1573427292"/>
+      </p:ext>
+    </p:extLst>
+  </p:cSld>
+  <p:clrMapOvr>
+    <a:masterClrMapping/>
+  </p:clrMapOvr>
+</p:sldLayout>
+</file>
+
+<file path=ppt/slideLayouts/slideLayout6.xml><?xml version="1.0" encoding="utf-8"?>
 <p:sldLayout xmlns:a="http://schemas.openxmlformats.org/drawingml/2006/main" xmlns:r="http://schemas.openxmlformats.org/officeDocument/2006/relationships" xmlns:p="http://schemas.openxmlformats.org/presentationml/2006/main" preserve="1" userDrawn="1">
   <p:cSld name="6_Title Slide">
     <p:spTree>
@@ -2754,216 +3615,12 @@
           </a:p>
         </p:txBody>
       </p:sp>
-      <p:sp>
-        <p:nvSpPr>
-          <p:cNvPr id="6" name="TextBox 5">
+      <p:pic>
+        <p:nvPicPr>
+          <p:cNvPr id="11" name="Picture 10" descr="A logo with text on it&#10;&#10;Description automatically generated">
             <a:extLst>
               <a:ext uri="{FF2B5EF4-FFF2-40B4-BE49-F238E27FC236}">
-                <a16:creationId xmlns:a16="http://schemas.microsoft.com/office/drawing/2014/main" id="{52E4E2B9-ADBD-40B7-BB28-46FFE040B61C}"/>
-              </a:ext>
-            </a:extLst>
-          </p:cNvPr>
-          <p:cNvSpPr txBox="1"/>
-          <p:nvPr userDrawn="1"/>
-        </p:nvSpPr>
-        <p:spPr>
-          <a:xfrm flipH="1">
-            <a:off x="5820012" y="3184575"/>
-            <a:ext cx="1390988" cy="584775"/>
-          </a:xfrm>
-          <a:prstGeom prst="rect">
-            <a:avLst/>
-          </a:prstGeom>
-          <a:noFill/>
-        </p:spPr>
-        <p:txBody>
-          <a:bodyPr wrap="square" rtlCol="0">
-            <a:spAutoFit/>
-          </a:bodyPr>
-          <a:lstStyle/>
-          <a:p>
-            <a:r>
-              <a:rPr lang="en-US" sz="1600" b="1" dirty="0">
-                <a:solidFill>
-                  <a:schemeClr val="tx1"/>
-                </a:solidFill>
-                <a:latin typeface="+mj-lt"/>
-                <a:cs typeface="Aharoni" panose="02010803020104030203" pitchFamily="2" charset="-79"/>
-              </a:rPr>
-              <a:t>Partnering</a:t>
-            </a:r>
-            <a:br>
-              <a:rPr lang="en-US" sz="1600" b="1" dirty="0">
-                <a:solidFill>
-                  <a:schemeClr val="tx1"/>
-                </a:solidFill>
-                <a:latin typeface="+mj-lt"/>
-                <a:cs typeface="Aharoni" panose="02010803020104030203" pitchFamily="2" charset="-79"/>
-              </a:rPr>
-            </a:br>
-            <a:r>
-              <a:rPr lang="en-US" sz="1600" b="1" dirty="0">
-                <a:solidFill>
-                  <a:schemeClr val="tx1"/>
-                </a:solidFill>
-                <a:latin typeface="+mj-lt"/>
-                <a:cs typeface="Aharoni" panose="02010803020104030203" pitchFamily="2" charset="-79"/>
-              </a:rPr>
-              <a:t>Institutions</a:t>
-            </a:r>
-            <a:endParaRPr lang="en-US" sz="500" b="1" dirty="0">
-              <a:solidFill>
-                <a:schemeClr val="tx1"/>
-              </a:solidFill>
-              <a:latin typeface="+mj-lt"/>
-              <a:cs typeface="Aharoni" panose="02010803020104030203" pitchFamily="2" charset="-79"/>
-            </a:endParaRPr>
-          </a:p>
-        </p:txBody>
-      </p:sp>
-      <p:grpSp>
-        <p:nvGrpSpPr>
-          <p:cNvPr id="26" name="Group 25">
-            <a:extLst>
-              <a:ext uri="{FF2B5EF4-FFF2-40B4-BE49-F238E27FC236}">
-                <a16:creationId xmlns:a16="http://schemas.microsoft.com/office/drawing/2014/main" id="{20CB8E11-39A4-4E1E-A579-F3F237CFBB48}"/>
-              </a:ext>
-            </a:extLst>
-          </p:cNvPr>
-          <p:cNvGrpSpPr/>
-          <p:nvPr userDrawn="1"/>
-        </p:nvGrpSpPr>
-        <p:grpSpPr>
-          <a:xfrm>
-            <a:off x="7211001" y="0"/>
-            <a:ext cx="4980999" cy="6872041"/>
-            <a:chOff x="7210999" y="-376519"/>
-            <a:chExt cx="4981000" cy="6816521"/>
-          </a:xfrm>
-        </p:grpSpPr>
-        <p:grpSp>
-          <p:nvGrpSpPr>
-            <p:cNvPr id="22" name="Group 21">
-              <a:extLst>
-                <a:ext uri="{FF2B5EF4-FFF2-40B4-BE49-F238E27FC236}">
-                  <a16:creationId xmlns:a16="http://schemas.microsoft.com/office/drawing/2014/main" id="{553FEB1D-953F-4AD5-979E-64A2E1BFFAA3}"/>
-                </a:ext>
-              </a:extLst>
-            </p:cNvPr>
-            <p:cNvGrpSpPr/>
-            <p:nvPr userDrawn="1"/>
-          </p:nvGrpSpPr>
-          <p:grpSpPr>
-            <a:xfrm>
-              <a:off x="7210999" y="-376519"/>
-              <a:ext cx="4981000" cy="6242350"/>
-              <a:chOff x="7210999" y="-19320"/>
-              <a:chExt cx="4981000" cy="6242350"/>
-            </a:xfrm>
-          </p:grpSpPr>
-          <p:pic>
-            <p:nvPicPr>
-              <p:cNvPr id="9" name="Picture 8">
-                <a:extLst>
-                  <a:ext uri="{FF2B5EF4-FFF2-40B4-BE49-F238E27FC236}">
-                    <a16:creationId xmlns:a16="http://schemas.microsoft.com/office/drawing/2014/main" id="{B8A9B711-267A-4825-AFA4-306D33323A56}"/>
-                  </a:ext>
-                </a:extLst>
-              </p:cNvPr>
-              <p:cNvPicPr/>
-              <p:nvPr/>
-            </p:nvPicPr>
-            <p:blipFill rotWithShape="1">
-              <a:blip r:embed="rId2">
-                <a:extLst>
-                  <a:ext uri="{28A0092B-C50C-407E-A947-70E740481C1C}">
-                    <a14:useLocalDpi xmlns:a14="http://schemas.microsoft.com/office/drawing/2010/main" val="0"/>
-                  </a:ext>
-                </a:extLst>
-              </a:blip>
-              <a:srcRect b="3956"/>
-              <a:stretch/>
-            </p:blipFill>
-            <p:spPr bwMode="auto">
-              <a:xfrm>
-                <a:off x="7211001" y="1204009"/>
-                <a:ext cx="4980990" cy="5019021"/>
-              </a:xfrm>
-              <a:prstGeom prst="rect">
-                <a:avLst/>
-              </a:prstGeom>
-              <a:noFill/>
-              <a:ln>
-                <a:noFill/>
-              </a:ln>
-            </p:spPr>
-          </p:pic>
-          <p:pic>
-            <p:nvPicPr>
-              <p:cNvPr id="12" name="Picture 11">
-                <a:extLst>
-                  <a:ext uri="{FF2B5EF4-FFF2-40B4-BE49-F238E27FC236}">
-                    <a16:creationId xmlns:a16="http://schemas.microsoft.com/office/drawing/2014/main" id="{FDAB62FA-DA2E-47A7-B719-956966448716}"/>
-                  </a:ext>
-                </a:extLst>
-              </p:cNvPr>
-              <p:cNvPicPr>
-                <a:picLocks noChangeAspect="1"/>
-              </p:cNvPicPr>
-              <p:nvPr userDrawn="1"/>
-            </p:nvPicPr>
-            <p:blipFill rotWithShape="1">
-              <a:blip r:embed="rId3"/>
-              <a:srcRect t="8596" b="17335"/>
-              <a:stretch/>
-            </p:blipFill>
-            <p:spPr>
-              <a:xfrm>
-                <a:off x="7210999" y="-19320"/>
-                <a:ext cx="4981000" cy="1223329"/>
-              </a:xfrm>
-              <a:prstGeom prst="rect">
-                <a:avLst/>
-              </a:prstGeom>
-            </p:spPr>
-          </p:pic>
-        </p:grpSp>
-        <p:pic>
-          <p:nvPicPr>
-            <p:cNvPr id="24" name="Picture 23">
-              <a:extLst>
-                <a:ext uri="{FF2B5EF4-FFF2-40B4-BE49-F238E27FC236}">
-                  <a16:creationId xmlns:a16="http://schemas.microsoft.com/office/drawing/2014/main" id="{9B7456BD-03D3-41B8-957B-38CB1512A39A}"/>
-                </a:ext>
-              </a:extLst>
-            </p:cNvPr>
-            <p:cNvPicPr>
-              <a:picLocks noChangeAspect="1"/>
-            </p:cNvPicPr>
-            <p:nvPr userDrawn="1"/>
-          </p:nvPicPr>
-          <p:blipFill rotWithShape="1">
-            <a:blip r:embed="rId4"/>
-            <a:srcRect l="92684" t="16179" b="22966"/>
-            <a:stretch/>
-          </p:blipFill>
-          <p:spPr>
-            <a:xfrm>
-              <a:off x="11818960" y="5850942"/>
-              <a:ext cx="364397" cy="589060"/>
-            </a:xfrm>
-            <a:prstGeom prst="rect">
-              <a:avLst/>
-            </a:prstGeom>
-          </p:spPr>
-        </p:pic>
-      </p:grpSp>
-      <p:pic>
-        <p:nvPicPr>
-          <p:cNvPr id="7" name="Picture 6">
-            <a:extLst>
-              <a:ext uri="{FF2B5EF4-FFF2-40B4-BE49-F238E27FC236}">
-                <a16:creationId xmlns:a16="http://schemas.microsoft.com/office/drawing/2014/main" id="{257237D6-3BC4-49E6-A079-9EF58A6B17EA}"/>
+                <a16:creationId xmlns:a16="http://schemas.microsoft.com/office/drawing/2014/main" id="{12E4B5EB-8A3E-4659-A0CF-C7A5C2A9608C}"/>
               </a:ext>
             </a:extLst>
           </p:cNvPr>
@@ -2972,15 +3629,22 @@
           </p:cNvPicPr>
           <p:nvPr userDrawn="1"/>
         </p:nvPicPr>
-        <p:blipFill rotWithShape="1">
-          <a:blip r:embed="rId5"/>
-          <a:srcRect t="29710" b="25953"/>
-          <a:stretch/>
+        <p:blipFill>
+          <a:blip r:embed="rId2">
+            <a:extLst>
+              <a:ext uri="{28A0092B-C50C-407E-A947-70E740481C1C}">
+                <a14:useLocalDpi xmlns:a14="http://schemas.microsoft.com/office/drawing/2010/main" val="0"/>
+              </a:ext>
+            </a:extLst>
+          </a:blip>
+          <a:stretch>
+            <a:fillRect/>
+          </a:stretch>
         </p:blipFill>
         <p:spPr>
           <a:xfrm>
-            <a:off x="7210999" y="6276829"/>
-            <a:ext cx="4727891" cy="598922"/>
+            <a:off x="7576762" y="2617384"/>
+            <a:ext cx="3429000" cy="1304925"/>
           </a:xfrm>
           <a:prstGeom prst="rect">
             <a:avLst/>
@@ -2990,7 +3654,7 @@
     </p:spTree>
     <p:extLst>
       <p:ext uri="{BB962C8B-B14F-4D97-AF65-F5344CB8AC3E}">
-        <p14:creationId xmlns:p14="http://schemas.microsoft.com/office/powerpoint/2010/main" val="2924746223"/>
+        <p14:creationId xmlns:p14="http://schemas.microsoft.com/office/powerpoint/2010/main" val="3883160100"/>
       </p:ext>
     </p:extLst>
   </p:cSld>
@@ -3000,7 +3664,7 @@
 </p:sldLayout>
 </file>
 
-<file path=ppt/slideLayouts/slideLayout3.xml><?xml version="1.0" encoding="utf-8"?>
+<file path=ppt/slideLayouts/slideLayout7.xml><?xml version="1.0" encoding="utf-8"?>
 <p:sldLayout xmlns:a="http://schemas.openxmlformats.org/drawingml/2006/main" xmlns:r="http://schemas.openxmlformats.org/officeDocument/2006/relationships" xmlns:p="http://schemas.openxmlformats.org/presentationml/2006/main" type="obj" preserve="1">
   <p:cSld name="Title and Content">
     <p:spTree>
@@ -3031,7 +3695,7 @@
           </p:cNvGraphicFramePr>
           <p:nvPr userDrawn="1">
             <p:custDataLst>
-              <p:tags r:id="rId1"/>
+              <p:tags r:id="rId2"/>
             </p:custDataLst>
           </p:nvPr>
         </p:nvGraphicFramePr>
@@ -3043,12 +3707,12 @@
           <a:graphicData uri="http://schemas.openxmlformats.org/presentationml/2006/ole">
             <mc:AlternateContent xmlns:mc="http://schemas.openxmlformats.org/markup-compatibility/2006">
               <mc:Choice xmlns:v="urn:schemas-microsoft-com:vml" Requires="v">
-                <p:oleObj name="think-cell Slide" r:id="rId3" imgW="347" imgH="348" progId="TCLayout.ActiveDocument.1">
+                <p:oleObj spid="_x0000_s10242" name="think-cell Slide" r:id="rId4" imgW="347" imgH="348" progId="TCLayout.ActiveDocument.1">
                   <p:embed/>
                 </p:oleObj>
               </mc:Choice>
               <mc:Fallback>
-                <p:oleObj name="think-cell Slide" r:id="rId3" imgW="347" imgH="348" progId="TCLayout.ActiveDocument.1">
+                <p:oleObj name="think-cell Slide" r:id="rId4" imgW="347" imgH="348" progId="TCLayout.ActiveDocument.1">
                   <p:embed/>
                   <p:pic>
                     <p:nvPicPr>
@@ -3063,7 +3727,7 @@
                       <p:nvPr/>
                     </p:nvPicPr>
                     <p:blipFill>
-                      <a:blip r:embed="rId4"/>
+                      <a:blip r:embed="rId5"/>
                       <a:stretch>
                         <a:fillRect/>
                       </a:stretch>
@@ -3190,7 +3854,7 @@
           <a:p>
             <a:fld id="{C426BC5F-09C1-43F9-92E4-3807667E7453}" type="datetimeFigureOut">
               <a:rPr lang="en-US" smtClean="0"/>
-              <a:t>08-Sep-21</a:t>
+              <a:t>03-May-24</a:t>
             </a:fld>
             <a:endParaRPr lang="en-US" dirty="0"/>
           </a:p>
@@ -3224,7 +3888,7 @@
     </p:spTree>
     <p:extLst>
       <p:ext uri="{BB962C8B-B14F-4D97-AF65-F5344CB8AC3E}">
-        <p14:creationId xmlns:p14="http://schemas.microsoft.com/office/powerpoint/2010/main" val="1362967565"/>
+        <p14:creationId xmlns:p14="http://schemas.microsoft.com/office/powerpoint/2010/main" val="2745413743"/>
       </p:ext>
     </p:extLst>
   </p:cSld>
@@ -3234,7 +3898,7 @@
 </p:sldLayout>
 </file>
 
-<file path=ppt/slideLayouts/slideLayout4.xml><?xml version="1.0" encoding="utf-8"?>
+<file path=ppt/slideLayouts/slideLayout8.xml><?xml version="1.0" encoding="utf-8"?>
 <p:sldLayout xmlns:a="http://schemas.openxmlformats.org/drawingml/2006/main" xmlns:r="http://schemas.openxmlformats.org/officeDocument/2006/relationships" xmlns:p="http://schemas.openxmlformats.org/presentationml/2006/main" userDrawn="1">
   <p:cSld name="Helium_Break">
     <p:spTree>
@@ -4318,7 +4982,7 @@
     </p:spTree>
     <p:extLst>
       <p:ext uri="{BB962C8B-B14F-4D97-AF65-F5344CB8AC3E}">
-        <p14:creationId xmlns:p14="http://schemas.microsoft.com/office/powerpoint/2010/main" val="1975208394"/>
+        <p14:creationId xmlns:p14="http://schemas.microsoft.com/office/powerpoint/2010/main" val="3293276960"/>
       </p:ext>
     </p:extLst>
   </p:cSld>
@@ -4328,7 +4992,7 @@
 </p:sldLayout>
 </file>
 
-<file path=ppt/slideLayouts/slideLayout5.xml><?xml version="1.0" encoding="utf-8"?>
+<file path=ppt/slideLayouts/slideLayout9.xml><?xml version="1.0" encoding="utf-8"?>
 <p:sldLayout xmlns:a="http://schemas.openxmlformats.org/drawingml/2006/main" xmlns:r="http://schemas.openxmlformats.org/officeDocument/2006/relationships" xmlns:p="http://schemas.openxmlformats.org/presentationml/2006/main" userDrawn="1">
   <p:cSld name="1_Title">
     <p:spTree>
@@ -4416,7 +5080,7 @@
     </p:spTree>
     <p:extLst>
       <p:ext uri="{BB962C8B-B14F-4D97-AF65-F5344CB8AC3E}">
-        <p14:creationId xmlns:p14="http://schemas.microsoft.com/office/powerpoint/2010/main" val="4258322620"/>
+        <p14:creationId xmlns:p14="http://schemas.microsoft.com/office/powerpoint/2010/main" val="361270386"/>
       </p:ext>
     </p:extLst>
   </p:cSld>
@@ -4435,899 +5099,6 @@
       </p:transition>
     </mc:Fallback>
   </mc:AlternateContent>
-</p:sldLayout>
-</file>
-
-<file path=ppt/slideLayouts/slideLayout6.xml><?xml version="1.0" encoding="utf-8"?>
-<p:sldLayout xmlns:a="http://schemas.openxmlformats.org/drawingml/2006/main" xmlns:r="http://schemas.openxmlformats.org/officeDocument/2006/relationships" xmlns:p="http://schemas.openxmlformats.org/presentationml/2006/main" type="titleOnly">
-  <p:cSld name="Title Only">
-    <p:spTree>
-      <p:nvGrpSpPr>
-        <p:cNvPr id="1" name=""/>
-        <p:cNvGrpSpPr/>
-        <p:nvPr/>
-      </p:nvGrpSpPr>
-      <p:grpSpPr>
-        <a:xfrm>
-          <a:off x="0" y="0"/>
-          <a:ext cx="0" cy="0"/>
-          <a:chOff x="0" y="0"/>
-          <a:chExt cx="0" cy="0"/>
-        </a:xfrm>
-      </p:grpSpPr>
-      <p:graphicFrame>
-        <p:nvGraphicFramePr>
-          <p:cNvPr id="6" name="Object 5" hidden="1">
-            <a:extLst>
-              <a:ext uri="{FF2B5EF4-FFF2-40B4-BE49-F238E27FC236}">
-                <a16:creationId xmlns:a16="http://schemas.microsoft.com/office/drawing/2014/main" id="{FD46B626-92F4-449F-9587-B342F55F9C4B}"/>
-              </a:ext>
-            </a:extLst>
-          </p:cNvPr>
-          <p:cNvGraphicFramePr>
-            <a:graphicFrameLocks noChangeAspect="1"/>
-          </p:cNvGraphicFramePr>
-          <p:nvPr userDrawn="1">
-            <p:custDataLst>
-              <p:tags r:id="rId1"/>
-            </p:custDataLst>
-          </p:nvPr>
-        </p:nvGraphicFramePr>
-        <p:xfrm>
-          <a:off x="1588" y="1588"/>
-          <a:ext cx="1587" cy="1587"/>
-        </p:xfrm>
-        <a:graphic>
-          <a:graphicData uri="http://schemas.openxmlformats.org/presentationml/2006/ole">
-            <mc:AlternateContent xmlns:mc="http://schemas.openxmlformats.org/markup-compatibility/2006">
-              <mc:Choice xmlns:v="urn:schemas-microsoft-com:vml" Requires="v">
-                <p:oleObj name="think-cell Slide" r:id="rId3" imgW="347" imgH="348" progId="TCLayout.ActiveDocument.1">
-                  <p:embed/>
-                </p:oleObj>
-              </mc:Choice>
-              <mc:Fallback>
-                <p:oleObj name="think-cell Slide" r:id="rId3" imgW="347" imgH="348" progId="TCLayout.ActiveDocument.1">
-                  <p:embed/>
-                  <p:pic>
-                    <p:nvPicPr>
-                      <p:cNvPr id="6" name="Object 5" hidden="1">
-                        <a:extLst>
-                          <a:ext uri="{FF2B5EF4-FFF2-40B4-BE49-F238E27FC236}">
-                            <a16:creationId xmlns:a16="http://schemas.microsoft.com/office/drawing/2014/main" id="{FD46B626-92F4-449F-9587-B342F55F9C4B}"/>
-                          </a:ext>
-                        </a:extLst>
-                      </p:cNvPr>
-                      <p:cNvPicPr/>
-                      <p:nvPr/>
-                    </p:nvPicPr>
-                    <p:blipFill>
-                      <a:blip r:embed="rId4"/>
-                      <a:stretch>
-                        <a:fillRect/>
-                      </a:stretch>
-                    </p:blipFill>
-                    <p:spPr>
-                      <a:xfrm>
-                        <a:off x="1588" y="1588"/>
-                        <a:ext cx="1587" cy="1587"/>
-                      </a:xfrm>
-                      <a:prstGeom prst="rect">
-                        <a:avLst/>
-                      </a:prstGeom>
-                    </p:spPr>
-                  </p:pic>
-                </p:oleObj>
-              </mc:Fallback>
-            </mc:AlternateContent>
-          </a:graphicData>
-        </a:graphic>
-      </p:graphicFrame>
-      <p:sp>
-        <p:nvSpPr>
-          <p:cNvPr id="2" name="Title 1"/>
-          <p:cNvSpPr>
-            <a:spLocks noGrp="1"/>
-          </p:cNvSpPr>
-          <p:nvPr>
-            <p:ph type="title"/>
-          </p:nvPr>
-        </p:nvSpPr>
-        <p:spPr/>
-        <p:txBody>
-          <a:bodyPr/>
-          <a:lstStyle/>
-          <a:p>
-            <a:r>
-              <a:rPr lang="en-US" dirty="0"/>
-              <a:t>Click to edit Master title style</a:t>
-            </a:r>
-            <a:endParaRPr lang="en-GB" dirty="0"/>
-          </a:p>
-        </p:txBody>
-      </p:sp>
-      <p:sp>
-        <p:nvSpPr>
-          <p:cNvPr id="3" name="Date Placeholder 2"/>
-          <p:cNvSpPr>
-            <a:spLocks noGrp="1"/>
-          </p:cNvSpPr>
-          <p:nvPr>
-            <p:ph type="dt" sz="half" idx="10"/>
-          </p:nvPr>
-        </p:nvSpPr>
-        <p:spPr/>
-        <p:txBody>
-          <a:bodyPr/>
-          <a:lstStyle/>
-          <a:p>
-            <a:fld id="{92F64031-640B-4962-8CF9-EAD8AB4A604D}" type="datetimeFigureOut">
-              <a:rPr lang="en-GB" smtClean="0"/>
-              <a:t>08/09/2021</a:t>
-            </a:fld>
-            <a:endParaRPr lang="en-GB"/>
-          </a:p>
-        </p:txBody>
-      </p:sp>
-      <p:sp>
-        <p:nvSpPr>
-          <p:cNvPr id="4" name="Footer Placeholder 3"/>
-          <p:cNvSpPr>
-            <a:spLocks noGrp="1"/>
-          </p:cNvSpPr>
-          <p:nvPr>
-            <p:ph type="ftr" sz="quarter" idx="11"/>
-          </p:nvPr>
-        </p:nvSpPr>
-        <p:spPr/>
-        <p:txBody>
-          <a:bodyPr/>
-          <a:lstStyle/>
-          <a:p>
-            <a:endParaRPr lang="en-GB"/>
-          </a:p>
-        </p:txBody>
-      </p:sp>
-      <p:sp>
-        <p:nvSpPr>
-          <p:cNvPr id="5" name="Slide Number Placeholder 4"/>
-          <p:cNvSpPr>
-            <a:spLocks noGrp="1"/>
-          </p:cNvSpPr>
-          <p:nvPr>
-            <p:ph type="sldNum" sz="quarter" idx="12"/>
-          </p:nvPr>
-        </p:nvSpPr>
-        <p:spPr>
-          <a:xfrm>
-            <a:off x="8610600" y="6356350"/>
-            <a:ext cx="2743200" cy="365125"/>
-          </a:xfrm>
-          <a:prstGeom prst="rect">
-            <a:avLst/>
-          </a:prstGeom>
-        </p:spPr>
-        <p:txBody>
-          <a:bodyPr/>
-          <a:lstStyle/>
-          <a:p>
-            <a:fld id="{0D8F0A42-4B1E-4613-8C4D-AAA004DCF1D5}" type="slidenum">
-              <a:rPr lang="en-GB" smtClean="0"/>
-              <a:t>‹#›</a:t>
-            </a:fld>
-            <a:endParaRPr lang="en-GB"/>
-          </a:p>
-        </p:txBody>
-      </p:sp>
-    </p:spTree>
-    <p:extLst>
-      <p:ext uri="{BB962C8B-B14F-4D97-AF65-F5344CB8AC3E}">
-        <p14:creationId xmlns:p14="http://schemas.microsoft.com/office/powerpoint/2010/main" val="3072655499"/>
-      </p:ext>
-    </p:extLst>
-  </p:cSld>
-  <p:clrMapOvr>
-    <a:masterClrMapping/>
-  </p:clrMapOvr>
-</p:sldLayout>
-</file>
-
-<file path=ppt/slideLayouts/slideLayout7.xml><?xml version="1.0" encoding="utf-8"?>
-<p:sldLayout xmlns:a="http://schemas.openxmlformats.org/drawingml/2006/main" xmlns:r="http://schemas.openxmlformats.org/officeDocument/2006/relationships" xmlns:p="http://schemas.openxmlformats.org/presentationml/2006/main" type="title" preserve="1">
-  <p:cSld name="Title Slide">
-    <p:bg>
-      <p:bgRef idx="1001">
-        <a:schemeClr val="bg1"/>
-      </p:bgRef>
-    </p:bg>
-    <p:spTree>
-      <p:nvGrpSpPr>
-        <p:cNvPr id="1" name=""/>
-        <p:cNvGrpSpPr/>
-        <p:nvPr/>
-      </p:nvGrpSpPr>
-      <p:grpSpPr>
-        <a:xfrm>
-          <a:off x="0" y="0"/>
-          <a:ext cx="0" cy="0"/>
-          <a:chOff x="0" y="0"/>
-          <a:chExt cx="0" cy="0"/>
-        </a:xfrm>
-      </p:grpSpPr>
-      <p:graphicFrame>
-        <p:nvGraphicFramePr>
-          <p:cNvPr id="4" name="Object 3" hidden="1"/>
-          <p:cNvGraphicFramePr>
-            <a:graphicFrameLocks noChangeAspect="1"/>
-          </p:cNvGraphicFramePr>
-          <p:nvPr userDrawn="1">
-            <p:custDataLst>
-              <p:tags r:id="rId1"/>
-            </p:custDataLst>
-          </p:nvPr>
-        </p:nvGraphicFramePr>
-        <p:xfrm>
-          <a:off x="1588" y="1588"/>
-          <a:ext cx="1587" cy="1587"/>
-        </p:xfrm>
-        <a:graphic>
-          <a:graphicData uri="http://schemas.openxmlformats.org/presentationml/2006/ole">
-            <mc:AlternateContent xmlns:mc="http://schemas.openxmlformats.org/markup-compatibility/2006">
-              <mc:Choice xmlns:v="urn:schemas-microsoft-com:vml" Requires="v">
-                <p:oleObj name="think-cell Slide" r:id="rId3" imgW="425" imgH="426" progId="TCLayout.ActiveDocument.1">
-                  <p:embed/>
-                </p:oleObj>
-              </mc:Choice>
-              <mc:Fallback>
-                <p:oleObj name="think-cell Slide" r:id="rId3" imgW="425" imgH="426" progId="TCLayout.ActiveDocument.1">
-                  <p:embed/>
-                  <p:pic>
-                    <p:nvPicPr>
-                      <p:cNvPr id="4" name="Object 3" hidden="1"/>
-                      <p:cNvPicPr/>
-                      <p:nvPr/>
-                    </p:nvPicPr>
-                    <p:blipFill>
-                      <a:blip r:embed="rId4"/>
-                      <a:stretch>
-                        <a:fillRect/>
-                      </a:stretch>
-                    </p:blipFill>
-                    <p:spPr>
-                      <a:xfrm>
-                        <a:off x="1588" y="1588"/>
-                        <a:ext cx="1587" cy="1587"/>
-                      </a:xfrm>
-                      <a:prstGeom prst="rect">
-                        <a:avLst/>
-                      </a:prstGeom>
-                    </p:spPr>
-                  </p:pic>
-                </p:oleObj>
-              </mc:Fallback>
-            </mc:AlternateContent>
-          </a:graphicData>
-        </a:graphic>
-      </p:graphicFrame>
-      <p:sp>
-        <p:nvSpPr>
-          <p:cNvPr id="11" name="Rectangle 10">
-            <a:extLst>
-              <a:ext uri="{FF2B5EF4-FFF2-40B4-BE49-F238E27FC236}">
-                <a16:creationId xmlns:a16="http://schemas.microsoft.com/office/drawing/2014/main" id="{123D8E40-FDBE-46A0-9A0B-123E9AA3D356}"/>
-              </a:ext>
-            </a:extLst>
-          </p:cNvPr>
-          <p:cNvSpPr/>
-          <p:nvPr userDrawn="1"/>
-        </p:nvSpPr>
-        <p:spPr>
-          <a:xfrm>
-            <a:off x="0" y="5029200"/>
-            <a:ext cx="12192000" cy="1828800"/>
-          </a:xfrm>
-          <a:prstGeom prst="rect">
-            <a:avLst/>
-          </a:prstGeom>
-          <a:solidFill>
-            <a:schemeClr val="bg1"/>
-          </a:solidFill>
-          <a:ln>
-            <a:noFill/>
-          </a:ln>
-        </p:spPr>
-        <p:style>
-          <a:lnRef idx="2">
-            <a:schemeClr val="accent1">
-              <a:shade val="50000"/>
-            </a:schemeClr>
-          </a:lnRef>
-          <a:fillRef idx="1">
-            <a:schemeClr val="accent1"/>
-          </a:fillRef>
-          <a:effectRef idx="0">
-            <a:schemeClr val="accent1"/>
-          </a:effectRef>
-          <a:fontRef idx="minor">
-            <a:schemeClr val="lt1"/>
-          </a:fontRef>
-        </p:style>
-        <p:txBody>
-          <a:bodyPr rtlCol="0" anchor="ctr"/>
-          <a:lstStyle/>
-          <a:p>
-            <a:pPr algn="ctr"/>
-            <a:endParaRPr lang="en-US"/>
-          </a:p>
-        </p:txBody>
-      </p:sp>
-      <p:sp>
-        <p:nvSpPr>
-          <p:cNvPr id="2" name="Title 1">
-            <a:extLst>
-              <a:ext uri="{FF2B5EF4-FFF2-40B4-BE49-F238E27FC236}">
-                <a16:creationId xmlns:a16="http://schemas.microsoft.com/office/drawing/2014/main" id="{EB5425CA-745D-4BC0-AA06-EBEF50EA738F}"/>
-              </a:ext>
-            </a:extLst>
-          </p:cNvPr>
-          <p:cNvSpPr>
-            <a:spLocks noGrp="1"/>
-          </p:cNvSpPr>
-          <p:nvPr>
-            <p:ph type="ctrTitle"/>
-          </p:nvPr>
-        </p:nvSpPr>
-        <p:spPr>
-          <a:xfrm>
-            <a:off x="300317" y="5549250"/>
-            <a:ext cx="11634508" cy="500137"/>
-          </a:xfrm>
-        </p:spPr>
-        <p:txBody>
-          <a:bodyPr wrap="square" lIns="15240" tIns="7620" rIns="15240" bIns="7620" anchor="b">
-            <a:spAutoFit/>
-          </a:bodyPr>
-          <a:lstStyle>
-            <a:lvl1pPr algn="ctr">
-              <a:defRPr sz="3500" b="1">
-                <a:solidFill>
-                  <a:schemeClr val="accent1"/>
-                </a:solidFill>
-              </a:defRPr>
-            </a:lvl1pPr>
-          </a:lstStyle>
-          <a:p>
-            <a:r>
-              <a:rPr lang="en-US"/>
-              <a:t>Click to edit Master title style</a:t>
-            </a:r>
-          </a:p>
-        </p:txBody>
-      </p:sp>
-      <p:sp>
-        <p:nvSpPr>
-          <p:cNvPr id="3" name="Subtitle 2">
-            <a:extLst>
-              <a:ext uri="{FF2B5EF4-FFF2-40B4-BE49-F238E27FC236}">
-                <a16:creationId xmlns:a16="http://schemas.microsoft.com/office/drawing/2014/main" id="{69084E31-0DDD-4236-AABB-65C91A25CE58}"/>
-              </a:ext>
-            </a:extLst>
-          </p:cNvPr>
-          <p:cNvSpPr>
-            <a:spLocks noGrp="1"/>
-          </p:cNvSpPr>
-          <p:nvPr>
-            <p:ph type="subTitle" idx="1"/>
-          </p:nvPr>
-        </p:nvSpPr>
-        <p:spPr>
-          <a:xfrm>
-            <a:off x="300317" y="6141462"/>
-            <a:ext cx="11634508" cy="264688"/>
-          </a:xfrm>
-        </p:spPr>
-        <p:txBody>
-          <a:bodyPr wrap="square" lIns="15240" tIns="7620" rIns="15240" bIns="7620">
-            <a:spAutoFit/>
-          </a:bodyPr>
-          <a:lstStyle>
-            <a:lvl1pPr marL="0" indent="0" algn="ctr">
-              <a:buNone/>
-              <a:defRPr sz="1800">
-                <a:solidFill>
-                  <a:schemeClr val="tx1"/>
-                </a:solidFill>
-              </a:defRPr>
-            </a:lvl1pPr>
-            <a:lvl2pPr marL="457200" indent="0" algn="ctr">
-              <a:buNone/>
-              <a:defRPr sz="2000"/>
-            </a:lvl2pPr>
-            <a:lvl3pPr marL="914400" indent="0" algn="ctr">
-              <a:buNone/>
-              <a:defRPr sz="1800"/>
-            </a:lvl3pPr>
-            <a:lvl4pPr marL="1371600" indent="0" algn="ctr">
-              <a:buNone/>
-              <a:defRPr sz="1600"/>
-            </a:lvl4pPr>
-            <a:lvl5pPr marL="1828800" indent="0" algn="ctr">
-              <a:buNone/>
-              <a:defRPr sz="1600"/>
-            </a:lvl5pPr>
-            <a:lvl6pPr marL="2286000" indent="0" algn="ctr">
-              <a:buNone/>
-              <a:defRPr sz="1600"/>
-            </a:lvl6pPr>
-            <a:lvl7pPr marL="2743200" indent="0" algn="ctr">
-              <a:buNone/>
-              <a:defRPr sz="1600"/>
-            </a:lvl7pPr>
-            <a:lvl8pPr marL="3200400" indent="0" algn="ctr">
-              <a:buNone/>
-              <a:defRPr sz="1600"/>
-            </a:lvl8pPr>
-            <a:lvl9pPr marL="3657600" indent="0" algn="ctr">
-              <a:buNone/>
-              <a:defRPr sz="1600"/>
-            </a:lvl9pPr>
-          </a:lstStyle>
-          <a:p>
-            <a:r>
-              <a:rPr lang="en-US"/>
-              <a:t>Click to edit Master subtitle style</a:t>
-            </a:r>
-          </a:p>
-        </p:txBody>
-      </p:sp>
-      <p:pic>
-        <p:nvPicPr>
-          <p:cNvPr id="13" name="Picture 12">
-            <a:extLst>
-              <a:ext uri="{FF2B5EF4-FFF2-40B4-BE49-F238E27FC236}">
-                <a16:creationId xmlns:a16="http://schemas.microsoft.com/office/drawing/2014/main" id="{A6F6840C-DE8F-4983-AB01-20F2DF0D4848}"/>
-              </a:ext>
-            </a:extLst>
-          </p:cNvPr>
-          <p:cNvPicPr>
-            <a:picLocks noChangeAspect="1"/>
-          </p:cNvPicPr>
-          <p:nvPr userDrawn="1"/>
-        </p:nvPicPr>
-        <p:blipFill rotWithShape="1">
-          <a:blip r:embed="rId5"/>
-          <a:srcRect t="7027"/>
-          <a:stretch/>
-        </p:blipFill>
-        <p:spPr>
-          <a:xfrm>
-            <a:off x="48126" y="808613"/>
-            <a:ext cx="11998993" cy="5240774"/>
-          </a:xfrm>
-          <a:prstGeom prst="rect">
-            <a:avLst/>
-          </a:prstGeom>
-        </p:spPr>
-      </p:pic>
-    </p:spTree>
-    <p:extLst>
-      <p:ext uri="{BB962C8B-B14F-4D97-AF65-F5344CB8AC3E}">
-        <p14:creationId xmlns:p14="http://schemas.microsoft.com/office/powerpoint/2010/main" val="2450602093"/>
-      </p:ext>
-    </p:extLst>
-  </p:cSld>
-  <p:clrMapOvr>
-    <a:overrideClrMapping bg1="lt1" tx1="dk1" bg2="lt2" tx2="dk2" accent1="accent1" accent2="accent2" accent3="accent3" accent4="accent4" accent5="accent5" accent6="accent6" hlink="hlink" folHlink="folHlink"/>
-  </p:clrMapOvr>
-</p:sldLayout>
-</file>
-
-<file path=ppt/slideLayouts/slideLayout8.xml><?xml version="1.0" encoding="utf-8"?>
-<p:sldLayout xmlns:a="http://schemas.openxmlformats.org/drawingml/2006/main" xmlns:r="http://schemas.openxmlformats.org/officeDocument/2006/relationships" xmlns:p="http://schemas.openxmlformats.org/presentationml/2006/main" preserve="1" userDrawn="1">
-  <p:cSld name="7_Title Slide">
-    <p:spTree>
-      <p:nvGrpSpPr>
-        <p:cNvPr id="1" name=""/>
-        <p:cNvGrpSpPr/>
-        <p:nvPr/>
-      </p:nvGrpSpPr>
-      <p:grpSpPr>
-        <a:xfrm>
-          <a:off x="0" y="0"/>
-          <a:ext cx="0" cy="0"/>
-          <a:chOff x="0" y="0"/>
-          <a:chExt cx="0" cy="0"/>
-        </a:xfrm>
-      </p:grpSpPr>
-      <p:sp>
-        <p:nvSpPr>
-          <p:cNvPr id="4" name="Rectangle 3">
-            <a:extLst>
-              <a:ext uri="{FF2B5EF4-FFF2-40B4-BE49-F238E27FC236}">
-                <a16:creationId xmlns:a16="http://schemas.microsoft.com/office/drawing/2014/main" id="{31C53266-8226-4323-93D8-8635471CF311}"/>
-              </a:ext>
-            </a:extLst>
-          </p:cNvPr>
-          <p:cNvSpPr/>
-          <p:nvPr userDrawn="1"/>
-        </p:nvSpPr>
-        <p:spPr>
-          <a:xfrm>
-            <a:off x="0" y="-6"/>
-            <a:ext cx="12191996" cy="6858005"/>
-          </a:xfrm>
-          <a:prstGeom prst="rect">
-            <a:avLst/>
-          </a:prstGeom>
-          <a:solidFill>
-            <a:schemeClr val="accent1"/>
-          </a:solidFill>
-          <a:ln>
-            <a:noFill/>
-          </a:ln>
-        </p:spPr>
-        <p:style>
-          <a:lnRef idx="2">
-            <a:schemeClr val="accent1">
-              <a:shade val="50000"/>
-            </a:schemeClr>
-          </a:lnRef>
-          <a:fillRef idx="1">
-            <a:schemeClr val="accent1"/>
-          </a:fillRef>
-          <a:effectRef idx="0">
-            <a:schemeClr val="accent1"/>
-          </a:effectRef>
-          <a:fontRef idx="minor">
-            <a:schemeClr val="lt1"/>
-          </a:fontRef>
-        </p:style>
-        <p:txBody>
-          <a:bodyPr rtlCol="0" anchor="ctr"/>
-          <a:lstStyle/>
-          <a:p>
-            <a:pPr algn="ctr"/>
-            <a:endParaRPr lang="en-US"/>
-          </a:p>
-        </p:txBody>
-      </p:sp>
-      <p:sp>
-        <p:nvSpPr>
-          <p:cNvPr id="38" name="Arrow: Pentagon 37">
-            <a:extLst>
-              <a:ext uri="{FF2B5EF4-FFF2-40B4-BE49-F238E27FC236}">
-                <a16:creationId xmlns:a16="http://schemas.microsoft.com/office/drawing/2014/main" id="{9787AEAF-CECE-47AD-BC55-6A8FA3B19CEE}"/>
-              </a:ext>
-            </a:extLst>
-          </p:cNvPr>
-          <p:cNvSpPr/>
-          <p:nvPr userDrawn="1"/>
-        </p:nvSpPr>
-        <p:spPr>
-          <a:xfrm flipH="1">
-            <a:off x="5511800" y="-6"/>
-            <a:ext cx="6680196" cy="6877110"/>
-          </a:xfrm>
-          <a:prstGeom prst="homePlate">
-            <a:avLst>
-              <a:gd name="adj" fmla="val 26731"/>
-            </a:avLst>
-          </a:prstGeom>
-          <a:solidFill>
-            <a:schemeClr val="accent4"/>
-          </a:solidFill>
-          <a:ln>
-            <a:noFill/>
-          </a:ln>
-          <a:effectLst>
-            <a:outerShdw blurRad="266700" dist="38100" dir="10800000" algn="r" rotWithShape="0">
-              <a:prstClr val="black">
-                <a:alpha val="77000"/>
-              </a:prstClr>
-            </a:outerShdw>
-          </a:effectLst>
-        </p:spPr>
-        <p:style>
-          <a:lnRef idx="2">
-            <a:schemeClr val="accent1">
-              <a:shade val="50000"/>
-            </a:schemeClr>
-          </a:lnRef>
-          <a:fillRef idx="1">
-            <a:schemeClr val="accent1"/>
-          </a:fillRef>
-          <a:effectRef idx="0">
-            <a:schemeClr val="accent1"/>
-          </a:effectRef>
-          <a:fontRef idx="minor">
-            <a:schemeClr val="lt1"/>
-          </a:fontRef>
-        </p:style>
-        <p:txBody>
-          <a:bodyPr rtlCol="0" anchor="ctr"/>
-          <a:lstStyle/>
-          <a:p>
-            <a:pPr algn="ctr"/>
-            <a:endParaRPr lang="en-US"/>
-          </a:p>
-        </p:txBody>
-      </p:sp>
-      <p:pic>
-        <p:nvPicPr>
-          <p:cNvPr id="7" name="Picture 6">
-            <a:extLst>
-              <a:ext uri="{FF2B5EF4-FFF2-40B4-BE49-F238E27FC236}">
-                <a16:creationId xmlns:a16="http://schemas.microsoft.com/office/drawing/2014/main" id="{72A0BC6A-E73C-40BA-BB29-6604DE19F585}"/>
-              </a:ext>
-            </a:extLst>
-          </p:cNvPr>
-          <p:cNvPicPr/>
-          <p:nvPr userDrawn="1"/>
-        </p:nvPicPr>
-        <p:blipFill rotWithShape="1">
-          <a:blip r:embed="rId2" cstate="print">
-            <a:extLst>
-              <a:ext uri="{28A0092B-C50C-407E-A947-70E740481C1C}">
-                <a14:useLocalDpi xmlns:a14="http://schemas.microsoft.com/office/drawing/2010/main" val="0"/>
-              </a:ext>
-            </a:extLst>
-          </a:blip>
-          <a:srcRect l="4364" r="2644" b="1491"/>
-          <a:stretch/>
-        </p:blipFill>
-        <p:spPr>
-          <a:xfrm>
-            <a:off x="7786456" y="5591279"/>
-            <a:ext cx="4391025" cy="1281234"/>
-          </a:xfrm>
-          <a:prstGeom prst="rect">
-            <a:avLst/>
-          </a:prstGeom>
-        </p:spPr>
-      </p:pic>
-    </p:spTree>
-    <p:extLst>
-      <p:ext uri="{BB962C8B-B14F-4D97-AF65-F5344CB8AC3E}">
-        <p14:creationId xmlns:p14="http://schemas.microsoft.com/office/powerpoint/2010/main" val="3501480314"/>
-      </p:ext>
-    </p:extLst>
-  </p:cSld>
-  <p:clrMapOvr>
-    <a:masterClrMapping/>
-  </p:clrMapOvr>
-</p:sldLayout>
-</file>
-
-<file path=ppt/slideLayouts/slideLayout9.xml><?xml version="1.0" encoding="utf-8"?>
-<p:sldLayout xmlns:a="http://schemas.openxmlformats.org/drawingml/2006/main" xmlns:r="http://schemas.openxmlformats.org/officeDocument/2006/relationships" xmlns:p="http://schemas.openxmlformats.org/presentationml/2006/main" type="obj" preserve="1">
-  <p:cSld name="Title and Content">
-    <p:spTree>
-      <p:nvGrpSpPr>
-        <p:cNvPr id="1" name=""/>
-        <p:cNvGrpSpPr/>
-        <p:nvPr/>
-      </p:nvGrpSpPr>
-      <p:grpSpPr>
-        <a:xfrm>
-          <a:off x="0" y="0"/>
-          <a:ext cx="0" cy="0"/>
-          <a:chOff x="0" y="0"/>
-          <a:chExt cx="0" cy="0"/>
-        </a:xfrm>
-      </p:grpSpPr>
-      <p:graphicFrame>
-        <p:nvGraphicFramePr>
-          <p:cNvPr id="6" name="Object 5" hidden="1">
-            <a:extLst>
-              <a:ext uri="{FF2B5EF4-FFF2-40B4-BE49-F238E27FC236}">
-                <a16:creationId xmlns:a16="http://schemas.microsoft.com/office/drawing/2014/main" id="{262DE44B-329D-44C4-A098-54D67821F0BF}"/>
-              </a:ext>
-            </a:extLst>
-          </p:cNvPr>
-          <p:cNvGraphicFramePr>
-            <a:graphicFrameLocks noChangeAspect="1"/>
-          </p:cNvGraphicFramePr>
-          <p:nvPr userDrawn="1">
-            <p:custDataLst>
-              <p:tags r:id="rId1"/>
-            </p:custDataLst>
-          </p:nvPr>
-        </p:nvGraphicFramePr>
-        <p:xfrm>
-          <a:off x="1588" y="1588"/>
-          <a:ext cx="1587" cy="1587"/>
-        </p:xfrm>
-        <a:graphic>
-          <a:graphicData uri="http://schemas.openxmlformats.org/presentationml/2006/ole">
-            <mc:AlternateContent xmlns:mc="http://schemas.openxmlformats.org/markup-compatibility/2006">
-              <mc:Choice xmlns:v="urn:schemas-microsoft-com:vml" Requires="v">
-                <p:oleObj name="think-cell Slide" r:id="rId3" imgW="347" imgH="348" progId="TCLayout.ActiveDocument.1">
-                  <p:embed/>
-                </p:oleObj>
-              </mc:Choice>
-              <mc:Fallback>
-                <p:oleObj name="think-cell Slide" r:id="rId3" imgW="347" imgH="348" progId="TCLayout.ActiveDocument.1">
-                  <p:embed/>
-                  <p:pic>
-                    <p:nvPicPr>
-                      <p:cNvPr id="6" name="Object 5" hidden="1">
-                        <a:extLst>
-                          <a:ext uri="{FF2B5EF4-FFF2-40B4-BE49-F238E27FC236}">
-                            <a16:creationId xmlns:a16="http://schemas.microsoft.com/office/drawing/2014/main" id="{262DE44B-329D-44C4-A098-54D67821F0BF}"/>
-                          </a:ext>
-                        </a:extLst>
-                      </p:cNvPr>
-                      <p:cNvPicPr/>
-                      <p:nvPr/>
-                    </p:nvPicPr>
-                    <p:blipFill>
-                      <a:blip r:embed="rId4"/>
-                      <a:stretch>
-                        <a:fillRect/>
-                      </a:stretch>
-                    </p:blipFill>
-                    <p:spPr>
-                      <a:xfrm>
-                        <a:off x="1588" y="1588"/>
-                        <a:ext cx="1587" cy="1587"/>
-                      </a:xfrm>
-                      <a:prstGeom prst="rect">
-                        <a:avLst/>
-                      </a:prstGeom>
-                    </p:spPr>
-                  </p:pic>
-                </p:oleObj>
-              </mc:Fallback>
-            </mc:AlternateContent>
-          </a:graphicData>
-        </a:graphic>
-      </p:graphicFrame>
-      <p:sp>
-        <p:nvSpPr>
-          <p:cNvPr id="2" name="Title 1">
-            <a:extLst>
-              <a:ext uri="{FF2B5EF4-FFF2-40B4-BE49-F238E27FC236}">
-                <a16:creationId xmlns:a16="http://schemas.microsoft.com/office/drawing/2014/main" id="{5149EF36-F9CE-4647-B169-9B37B99036E8}"/>
-              </a:ext>
-            </a:extLst>
-          </p:cNvPr>
-          <p:cNvSpPr>
-            <a:spLocks noGrp="1"/>
-          </p:cNvSpPr>
-          <p:nvPr>
-            <p:ph type="title"/>
-          </p:nvPr>
-        </p:nvSpPr>
-        <p:spPr>
-          <a:xfrm>
-            <a:off x="324416" y="303636"/>
-            <a:ext cx="10470584" cy="403187"/>
-          </a:xfrm>
-        </p:spPr>
-        <p:txBody>
-          <a:bodyPr/>
-          <a:lstStyle/>
-          <a:p>
-            <a:r>
-              <a:rPr lang="en-US"/>
-              <a:t>Click to edit Master title style</a:t>
-            </a:r>
-          </a:p>
-        </p:txBody>
-      </p:sp>
-      <p:sp>
-        <p:nvSpPr>
-          <p:cNvPr id="3" name="Content Placeholder 2">
-            <a:extLst>
-              <a:ext uri="{FF2B5EF4-FFF2-40B4-BE49-F238E27FC236}">
-                <a16:creationId xmlns:a16="http://schemas.microsoft.com/office/drawing/2014/main" id="{2B1099A3-25D1-44D2-B255-78F583BF08A3}"/>
-              </a:ext>
-            </a:extLst>
-          </p:cNvPr>
-          <p:cNvSpPr>
-            <a:spLocks noGrp="1"/>
-          </p:cNvSpPr>
-          <p:nvPr>
-            <p:ph idx="1"/>
-          </p:nvPr>
-        </p:nvSpPr>
-        <p:spPr/>
-        <p:txBody>
-          <a:bodyPr/>
-          <a:lstStyle/>
-          <a:p>
-            <a:pPr lvl="0"/>
-            <a:r>
-              <a:rPr lang="en-US"/>
-              <a:t>Edit Master text styles</a:t>
-            </a:r>
-          </a:p>
-          <a:p>
-            <a:pPr lvl="1"/>
-            <a:r>
-              <a:rPr lang="en-US"/>
-              <a:t>Second level</a:t>
-            </a:r>
-          </a:p>
-          <a:p>
-            <a:pPr lvl="2"/>
-            <a:r>
-              <a:rPr lang="en-US"/>
-              <a:t>Third level</a:t>
-            </a:r>
-          </a:p>
-          <a:p>
-            <a:pPr lvl="3"/>
-            <a:r>
-              <a:rPr lang="en-US"/>
-              <a:t>Fourth level</a:t>
-            </a:r>
-          </a:p>
-        </p:txBody>
-      </p:sp>
-      <p:sp>
-        <p:nvSpPr>
-          <p:cNvPr id="4" name="Date Placeholder 3">
-            <a:extLst>
-              <a:ext uri="{FF2B5EF4-FFF2-40B4-BE49-F238E27FC236}">
-                <a16:creationId xmlns:a16="http://schemas.microsoft.com/office/drawing/2014/main" id="{4385C4C7-F6B0-48E4-ACEC-649CC0F49C64}"/>
-              </a:ext>
-            </a:extLst>
-          </p:cNvPr>
-          <p:cNvSpPr>
-            <a:spLocks noGrp="1"/>
-          </p:cNvSpPr>
-          <p:nvPr>
-            <p:ph type="dt" sz="half" idx="10"/>
-          </p:nvPr>
-        </p:nvSpPr>
-        <p:spPr/>
-        <p:txBody>
-          <a:bodyPr/>
-          <a:lstStyle/>
-          <a:p>
-            <a:fld id="{C426BC5F-09C1-43F9-92E4-3807667E7453}" type="datetimeFigureOut">
-              <a:rPr lang="en-US" smtClean="0"/>
-              <a:t>08-Sep-21</a:t>
-            </a:fld>
-            <a:endParaRPr lang="en-US"/>
-          </a:p>
-        </p:txBody>
-      </p:sp>
-      <p:sp>
-        <p:nvSpPr>
-          <p:cNvPr id="5" name="Footer Placeholder 4">
-            <a:extLst>
-              <a:ext uri="{FF2B5EF4-FFF2-40B4-BE49-F238E27FC236}">
-                <a16:creationId xmlns:a16="http://schemas.microsoft.com/office/drawing/2014/main" id="{ECDAD504-107D-4E14-8686-4209B335C8D1}"/>
-              </a:ext>
-            </a:extLst>
-          </p:cNvPr>
-          <p:cNvSpPr>
-            <a:spLocks noGrp="1"/>
-          </p:cNvSpPr>
-          <p:nvPr>
-            <p:ph type="ftr" sz="quarter" idx="11"/>
-          </p:nvPr>
-        </p:nvSpPr>
-        <p:spPr/>
-        <p:txBody>
-          <a:bodyPr/>
-          <a:lstStyle/>
-          <a:p>
-            <a:endParaRPr lang="en-US"/>
-          </a:p>
-        </p:txBody>
-      </p:sp>
-    </p:spTree>
-    <p:extLst>
-      <p:ext uri="{BB962C8B-B14F-4D97-AF65-F5344CB8AC3E}">
-        <p14:creationId xmlns:p14="http://schemas.microsoft.com/office/powerpoint/2010/main" val="2721967463"/>
-      </p:ext>
-    </p:extLst>
-  </p:cSld>
-  <p:clrMapOvr>
-    <a:masterClrMapping/>
-  </p:clrMapOvr>
 </p:sldLayout>
 </file>
 
@@ -5361,7 +5132,7 @@
           </p:cNvGraphicFramePr>
           <p:nvPr userDrawn="1">
             <p:custDataLst>
-              <p:tags r:id="rId8"/>
+              <p:tags r:id="rId7"/>
             </p:custDataLst>
           </p:nvPr>
         </p:nvGraphicFramePr>
@@ -5373,7 +5144,7 @@
           <a:graphicData uri="http://schemas.openxmlformats.org/presentationml/2006/ole">
             <mc:AlternateContent xmlns:mc="http://schemas.openxmlformats.org/markup-compatibility/2006">
               <mc:Choice xmlns:v="urn:schemas-microsoft-com:vml" Requires="v">
-                <p:oleObj name="think-cell Slide" r:id="rId9" imgW="425" imgH="426" progId="TCLayout.ActiveDocument.1">
+                <p:oleObj spid="_x0000_s5122" name="think-cell Slide" r:id="rId9" imgW="425" imgH="426" progId="TCLayout.ActiveDocument.1">
                   <p:embed/>
                 </p:oleObj>
               </mc:Choice>
@@ -5410,925 +5181,6 @@
       </p:graphicFrame>
       <p:sp>
         <p:nvSpPr>
-          <p:cNvPr id="20" name="Arrow: Pentagon 19">
-            <a:extLst>
-              <a:ext uri="{FF2B5EF4-FFF2-40B4-BE49-F238E27FC236}">
-                <a16:creationId xmlns:a16="http://schemas.microsoft.com/office/drawing/2014/main" id="{26CDDB92-D8A7-4813-8A72-784E3B907D60}"/>
-              </a:ext>
-            </a:extLst>
-          </p:cNvPr>
-          <p:cNvSpPr/>
-          <p:nvPr userDrawn="1"/>
-        </p:nvSpPr>
-        <p:spPr>
-          <a:xfrm flipH="1">
-            <a:off x="11746131" y="6324600"/>
-            <a:ext cx="445869" cy="343180"/>
-          </a:xfrm>
-          <a:prstGeom prst="homePlate">
-            <a:avLst>
-              <a:gd name="adj" fmla="val 33686"/>
-            </a:avLst>
-          </a:prstGeom>
-          <a:solidFill>
-            <a:srgbClr val="EB3237"/>
-          </a:solidFill>
-          <a:ln>
-            <a:noFill/>
-          </a:ln>
-        </p:spPr>
-        <p:style>
-          <a:lnRef idx="2">
-            <a:schemeClr val="accent1">
-              <a:shade val="50000"/>
-            </a:schemeClr>
-          </a:lnRef>
-          <a:fillRef idx="1">
-            <a:schemeClr val="accent1"/>
-          </a:fillRef>
-          <a:effectRef idx="0">
-            <a:schemeClr val="accent1"/>
-          </a:effectRef>
-          <a:fontRef idx="minor">
-            <a:schemeClr val="lt1"/>
-          </a:fontRef>
-        </p:style>
-        <p:txBody>
-          <a:bodyPr rtlCol="0" anchor="ctr"/>
-          <a:lstStyle/>
-          <a:p>
-            <a:pPr algn="ctr"/>
-            <a:endParaRPr lang="en-US">
-              <a:latin typeface="Gotham Light" panose="02000603030000020004" pitchFamily="2" charset="0"/>
-            </a:endParaRPr>
-          </a:p>
-        </p:txBody>
-      </p:sp>
-      <p:sp>
-        <p:nvSpPr>
-          <p:cNvPr id="2" name="Title Placeholder 1">
-            <a:extLst>
-              <a:ext uri="{FF2B5EF4-FFF2-40B4-BE49-F238E27FC236}">
-                <a16:creationId xmlns:a16="http://schemas.microsoft.com/office/drawing/2014/main" id="{B57DE2E4-39FD-4747-A53E-5C87FACD236D}"/>
-              </a:ext>
-            </a:extLst>
-          </p:cNvPr>
-          <p:cNvSpPr>
-            <a:spLocks noGrp="1"/>
-          </p:cNvSpPr>
-          <p:nvPr>
-            <p:ph type="title"/>
-          </p:nvPr>
-        </p:nvSpPr>
-        <p:spPr>
-          <a:xfrm>
-            <a:off x="324416" y="303636"/>
-            <a:ext cx="11543168" cy="403187"/>
-          </a:xfrm>
-          <a:prstGeom prst="rect">
-            <a:avLst/>
-          </a:prstGeom>
-        </p:spPr>
-        <p:txBody>
-          <a:bodyPr vert="horz" wrap="square" lIns="15240" tIns="7620" rIns="15240" bIns="7620" rtlCol="0" anchor="t" anchorCtr="0">
-            <a:spAutoFit/>
-          </a:bodyPr>
-          <a:lstStyle/>
-          <a:p>
-            <a:r>
-              <a:rPr lang="en-US"/>
-              <a:t>Click to edit Master title style</a:t>
-            </a:r>
-          </a:p>
-        </p:txBody>
-      </p:sp>
-      <p:sp>
-        <p:nvSpPr>
-          <p:cNvPr id="3" name="Text Placeholder 2">
-            <a:extLst>
-              <a:ext uri="{FF2B5EF4-FFF2-40B4-BE49-F238E27FC236}">
-                <a16:creationId xmlns:a16="http://schemas.microsoft.com/office/drawing/2014/main" id="{D56DB6E4-BFBD-4EDA-AE3B-7A8FD4D4DFA1}"/>
-              </a:ext>
-            </a:extLst>
-          </p:cNvPr>
-          <p:cNvSpPr>
-            <a:spLocks noGrp="1"/>
-          </p:cNvSpPr>
-          <p:nvPr>
-            <p:ph type="body" idx="1"/>
-          </p:nvPr>
-        </p:nvSpPr>
-        <p:spPr>
-          <a:xfrm>
-            <a:off x="324415" y="1145391"/>
-            <a:ext cx="11543169" cy="1094146"/>
-          </a:xfrm>
-          <a:prstGeom prst="rect">
-            <a:avLst/>
-          </a:prstGeom>
-        </p:spPr>
-        <p:txBody>
-          <a:bodyPr vert="horz" wrap="square" lIns="15240" tIns="7620" rIns="15240" bIns="7620" rtlCol="0">
-            <a:spAutoFit/>
-          </a:bodyPr>
-          <a:lstStyle/>
-          <a:p>
-            <a:pPr lvl="0"/>
-            <a:r>
-              <a:rPr lang="en-US"/>
-              <a:t>Edit Master text styles</a:t>
-            </a:r>
-          </a:p>
-          <a:p>
-            <a:pPr lvl="1"/>
-            <a:r>
-              <a:rPr lang="en-US"/>
-              <a:t>Second level</a:t>
-            </a:r>
-          </a:p>
-          <a:p>
-            <a:pPr lvl="2"/>
-            <a:r>
-              <a:rPr lang="en-US"/>
-              <a:t>Third level</a:t>
-            </a:r>
-          </a:p>
-          <a:p>
-            <a:pPr lvl="3"/>
-            <a:r>
-              <a:rPr lang="en-US"/>
-              <a:t>Fourth level</a:t>
-            </a:r>
-          </a:p>
-        </p:txBody>
-      </p:sp>
-      <p:sp>
-        <p:nvSpPr>
-          <p:cNvPr id="4" name="Date Placeholder 3">
-            <a:extLst>
-              <a:ext uri="{FF2B5EF4-FFF2-40B4-BE49-F238E27FC236}">
-                <a16:creationId xmlns:a16="http://schemas.microsoft.com/office/drawing/2014/main" id="{E1D16D1C-E046-4EF6-8CD8-783F9A8C582A}"/>
-              </a:ext>
-            </a:extLst>
-          </p:cNvPr>
-          <p:cNvSpPr>
-            <a:spLocks noGrp="1"/>
-          </p:cNvSpPr>
-          <p:nvPr>
-            <p:ph type="dt" sz="half" idx="2"/>
-          </p:nvPr>
-        </p:nvSpPr>
-        <p:spPr>
-          <a:xfrm>
-            <a:off x="324415" y="6538035"/>
-            <a:ext cx="11145393" cy="169277"/>
-          </a:xfrm>
-          <a:prstGeom prst="rect">
-            <a:avLst/>
-          </a:prstGeom>
-        </p:spPr>
-        <p:txBody>
-          <a:bodyPr vert="horz" wrap="square" lIns="15240" tIns="7620" rIns="15240" bIns="7620" rtlCol="0" anchor="ctr">
-            <a:spAutoFit/>
-          </a:bodyPr>
-          <a:lstStyle>
-            <a:lvl1pPr algn="l">
-              <a:defRPr sz="1000">
-                <a:solidFill>
-                  <a:schemeClr val="tx1"/>
-                </a:solidFill>
-                <a:latin typeface="Gotham Light" panose="02000603030000020004" pitchFamily="2" charset="0"/>
-              </a:defRPr>
-            </a:lvl1pPr>
-          </a:lstStyle>
-          <a:p>
-            <a:r>
-              <a:rPr lang="en-US"/>
-              <a:t>Source: </a:t>
-            </a:r>
-          </a:p>
-        </p:txBody>
-      </p:sp>
-      <p:sp>
-        <p:nvSpPr>
-          <p:cNvPr id="5" name="Footer Placeholder 4">
-            <a:extLst>
-              <a:ext uri="{FF2B5EF4-FFF2-40B4-BE49-F238E27FC236}">
-                <a16:creationId xmlns:a16="http://schemas.microsoft.com/office/drawing/2014/main" id="{1BCE2C20-B1D5-4BC6-A6CA-6FA9F0B51320}"/>
-              </a:ext>
-            </a:extLst>
-          </p:cNvPr>
-          <p:cNvSpPr>
-            <a:spLocks noGrp="1"/>
-          </p:cNvSpPr>
-          <p:nvPr>
-            <p:ph type="ftr" sz="quarter" idx="3"/>
-          </p:nvPr>
-        </p:nvSpPr>
-        <p:spPr>
-          <a:xfrm>
-            <a:off x="324415" y="6285068"/>
-            <a:ext cx="11145393" cy="169277"/>
-          </a:xfrm>
-          <a:prstGeom prst="rect">
-            <a:avLst/>
-          </a:prstGeom>
-        </p:spPr>
-        <p:txBody>
-          <a:bodyPr vert="horz" wrap="square" lIns="15240" tIns="7620" rIns="15240" bIns="7620" rtlCol="0" anchor="ctr">
-            <a:spAutoFit/>
-          </a:bodyPr>
-          <a:lstStyle>
-            <a:lvl1pPr algn="l">
-              <a:defRPr sz="1000">
-                <a:solidFill>
-                  <a:schemeClr val="tx1"/>
-                </a:solidFill>
-                <a:latin typeface="Gotham Light" panose="02000603030000020004" pitchFamily="2" charset="0"/>
-              </a:defRPr>
-            </a:lvl1pPr>
-          </a:lstStyle>
-          <a:p>
-            <a:r>
-              <a:rPr lang="en-US"/>
-              <a:t>Footnote:</a:t>
-            </a:r>
-          </a:p>
-        </p:txBody>
-      </p:sp>
-      <p:cxnSp>
-        <p:nvCxnSpPr>
-          <p:cNvPr id="10" name="Straight Connector 9">
-            <a:extLst>
-              <a:ext uri="{FF2B5EF4-FFF2-40B4-BE49-F238E27FC236}">
-                <a16:creationId xmlns:a16="http://schemas.microsoft.com/office/drawing/2014/main" id="{EA7873EB-6BAD-43C0-B870-0AE8D5E5C4CE}"/>
-              </a:ext>
-            </a:extLst>
-          </p:cNvPr>
-          <p:cNvCxnSpPr>
-            <a:cxnSpLocks/>
-            <a:stCxn id="20" idx="3"/>
-          </p:cNvCxnSpPr>
-          <p:nvPr userDrawn="1"/>
-        </p:nvCxnSpPr>
-        <p:spPr>
-          <a:xfrm flipH="1">
-            <a:off x="-4757" y="6496190"/>
-            <a:ext cx="11750888" cy="0"/>
-          </a:xfrm>
-          <a:prstGeom prst="line">
-            <a:avLst/>
-          </a:prstGeom>
-          <a:ln>
-            <a:solidFill>
-              <a:srgbClr val="EB3237"/>
-            </a:solidFill>
-          </a:ln>
-        </p:spPr>
-        <p:style>
-          <a:lnRef idx="1">
-            <a:schemeClr val="accent1"/>
-          </a:lnRef>
-          <a:fillRef idx="0">
-            <a:schemeClr val="accent1"/>
-          </a:fillRef>
-          <a:effectRef idx="0">
-            <a:schemeClr val="accent1"/>
-          </a:effectRef>
-          <a:fontRef idx="minor">
-            <a:schemeClr val="tx1"/>
-          </a:fontRef>
-        </p:style>
-      </p:cxnSp>
-      <p:sp>
-        <p:nvSpPr>
-          <p:cNvPr id="18" name="Rectangle 17">
-            <a:extLst>
-              <a:ext uri="{FF2B5EF4-FFF2-40B4-BE49-F238E27FC236}">
-                <a16:creationId xmlns:a16="http://schemas.microsoft.com/office/drawing/2014/main" id="{CF7D3A27-85EF-4023-A90F-B507F9C7BBC7}"/>
-              </a:ext>
-            </a:extLst>
-          </p:cNvPr>
-          <p:cNvSpPr/>
-          <p:nvPr userDrawn="1"/>
-        </p:nvSpPr>
-        <p:spPr>
-          <a:xfrm rot="5400000">
-            <a:off x="-117580" y="394613"/>
-            <a:ext cx="456392" cy="221232"/>
-          </a:xfrm>
-          <a:prstGeom prst="rect">
-            <a:avLst/>
-          </a:prstGeom>
-          <a:solidFill>
-            <a:schemeClr val="accent3">
-              <a:lumMod val="50000"/>
-            </a:schemeClr>
-          </a:solidFill>
-          <a:ln>
-            <a:noFill/>
-          </a:ln>
-          <a:effectLst/>
-        </p:spPr>
-        <p:style>
-          <a:lnRef idx="2">
-            <a:schemeClr val="accent1">
-              <a:shade val="50000"/>
-            </a:schemeClr>
-          </a:lnRef>
-          <a:fillRef idx="1">
-            <a:schemeClr val="accent1"/>
-          </a:fillRef>
-          <a:effectRef idx="0">
-            <a:schemeClr val="accent1"/>
-          </a:effectRef>
-          <a:fontRef idx="minor">
-            <a:schemeClr val="lt1"/>
-          </a:fontRef>
-        </p:style>
-        <p:txBody>
-          <a:bodyPr rot="0" spcFirstLastPara="0" vertOverflow="overflow" horzOverflow="overflow" vert="horz" wrap="square" lIns="91440" tIns="45720" rIns="91440" bIns="45720" numCol="1" spcCol="0" rtlCol="0" fromWordArt="0" anchor="ctr" anchorCtr="0" forceAA="0" compatLnSpc="1">
-            <a:prstTxWarp prst="textNoShape">
-              <a:avLst/>
-            </a:prstTxWarp>
-            <a:noAutofit/>
-          </a:bodyPr>
-          <a:lstStyle/>
-          <a:p>
-            <a:pPr lvl="0" algn="ctr"/>
-            <a:endParaRPr lang="en-US"/>
-          </a:p>
-        </p:txBody>
-      </p:sp>
-      <p:sp>
-        <p:nvSpPr>
-          <p:cNvPr id="22" name="Slide Number Placeholder 5">
-            <a:extLst>
-              <a:ext uri="{FF2B5EF4-FFF2-40B4-BE49-F238E27FC236}">
-                <a16:creationId xmlns:a16="http://schemas.microsoft.com/office/drawing/2014/main" id="{A6FFCF44-1256-40E2-AD34-39552A334BBE}"/>
-              </a:ext>
-            </a:extLst>
-          </p:cNvPr>
-          <p:cNvSpPr txBox="1">
-            <a:spLocks/>
-          </p:cNvSpPr>
-          <p:nvPr userDrawn="1"/>
-        </p:nvSpPr>
-        <p:spPr>
-          <a:xfrm>
-            <a:off x="11860437" y="6411552"/>
-            <a:ext cx="217256" cy="169277"/>
-          </a:xfrm>
-          <a:prstGeom prst="rect">
-            <a:avLst/>
-          </a:prstGeom>
-        </p:spPr>
-        <p:txBody>
-          <a:bodyPr vert="horz" wrap="square" lIns="15240" tIns="7620" rIns="15240" bIns="7620" rtlCol="0" anchor="ctr">
-            <a:spAutoFit/>
-          </a:bodyPr>
-          <a:lstStyle>
-            <a:defPPr>
-              <a:defRPr lang="en-US"/>
-            </a:defPPr>
-            <a:lvl1pPr marL="0" algn="l" defTabSz="914400" rtl="0" eaLnBrk="1" latinLnBrk="0" hangingPunct="1">
-              <a:defRPr sz="1000" kern="1200">
-                <a:solidFill>
-                  <a:schemeClr val="tx1"/>
-                </a:solidFill>
-                <a:latin typeface="+mn-lt"/>
-                <a:ea typeface="+mn-ea"/>
-                <a:cs typeface="+mn-cs"/>
-              </a:defRPr>
-            </a:lvl1pPr>
-            <a:lvl2pPr marL="457200" algn="l" defTabSz="914400" rtl="0" eaLnBrk="1" latinLnBrk="0" hangingPunct="1">
-              <a:defRPr sz="1800" kern="1200">
-                <a:solidFill>
-                  <a:schemeClr val="tx1"/>
-                </a:solidFill>
-                <a:latin typeface="+mn-lt"/>
-                <a:ea typeface="+mn-ea"/>
-                <a:cs typeface="+mn-cs"/>
-              </a:defRPr>
-            </a:lvl2pPr>
-            <a:lvl3pPr marL="914400" algn="l" defTabSz="914400" rtl="0" eaLnBrk="1" latinLnBrk="0" hangingPunct="1">
-              <a:defRPr sz="1800" kern="1200">
-                <a:solidFill>
-                  <a:schemeClr val="tx1"/>
-                </a:solidFill>
-                <a:latin typeface="+mn-lt"/>
-                <a:ea typeface="+mn-ea"/>
-                <a:cs typeface="+mn-cs"/>
-              </a:defRPr>
-            </a:lvl3pPr>
-            <a:lvl4pPr marL="1371600" algn="l" defTabSz="914400" rtl="0" eaLnBrk="1" latinLnBrk="0" hangingPunct="1">
-              <a:defRPr sz="1800" kern="1200">
-                <a:solidFill>
-                  <a:schemeClr val="tx1"/>
-                </a:solidFill>
-                <a:latin typeface="+mn-lt"/>
-                <a:ea typeface="+mn-ea"/>
-                <a:cs typeface="+mn-cs"/>
-              </a:defRPr>
-            </a:lvl4pPr>
-            <a:lvl5pPr marL="1828800" algn="l" defTabSz="914400" rtl="0" eaLnBrk="1" latinLnBrk="0" hangingPunct="1">
-              <a:defRPr sz="1800" kern="1200">
-                <a:solidFill>
-                  <a:schemeClr val="tx1"/>
-                </a:solidFill>
-                <a:latin typeface="+mn-lt"/>
-                <a:ea typeface="+mn-ea"/>
-                <a:cs typeface="+mn-cs"/>
-              </a:defRPr>
-            </a:lvl5pPr>
-            <a:lvl6pPr marL="2286000" algn="l" defTabSz="914400" rtl="0" eaLnBrk="1" latinLnBrk="0" hangingPunct="1">
-              <a:defRPr sz="1800" kern="1200">
-                <a:solidFill>
-                  <a:schemeClr val="tx1"/>
-                </a:solidFill>
-                <a:latin typeface="+mn-lt"/>
-                <a:ea typeface="+mn-ea"/>
-                <a:cs typeface="+mn-cs"/>
-              </a:defRPr>
-            </a:lvl6pPr>
-            <a:lvl7pPr marL="2743200" algn="l" defTabSz="914400" rtl="0" eaLnBrk="1" latinLnBrk="0" hangingPunct="1">
-              <a:defRPr sz="1800" kern="1200">
-                <a:solidFill>
-                  <a:schemeClr val="tx1"/>
-                </a:solidFill>
-                <a:latin typeface="+mn-lt"/>
-                <a:ea typeface="+mn-ea"/>
-                <a:cs typeface="+mn-cs"/>
-              </a:defRPr>
-            </a:lvl7pPr>
-            <a:lvl8pPr marL="3200400" algn="l" defTabSz="914400" rtl="0" eaLnBrk="1" latinLnBrk="0" hangingPunct="1">
-              <a:defRPr sz="1800" kern="1200">
-                <a:solidFill>
-                  <a:schemeClr val="tx1"/>
-                </a:solidFill>
-                <a:latin typeface="+mn-lt"/>
-                <a:ea typeface="+mn-ea"/>
-                <a:cs typeface="+mn-cs"/>
-              </a:defRPr>
-            </a:lvl8pPr>
-            <a:lvl9pPr marL="3657600" algn="l" defTabSz="914400" rtl="0" eaLnBrk="1" latinLnBrk="0" hangingPunct="1">
-              <a:defRPr sz="1800" kern="1200">
-                <a:solidFill>
-                  <a:schemeClr val="tx1"/>
-                </a:solidFill>
-                <a:latin typeface="+mn-lt"/>
-                <a:ea typeface="+mn-ea"/>
-                <a:cs typeface="+mn-cs"/>
-              </a:defRPr>
-            </a:lvl9pPr>
-          </a:lstStyle>
-          <a:p>
-            <a:fld id="{879058DB-30C9-4F64-8719-9EAD4E263111}" type="slidenum">
-              <a:rPr lang="en-US" smtClean="0">
-                <a:solidFill>
-                  <a:schemeClr val="bg1"/>
-                </a:solidFill>
-                <a:latin typeface="Gotham Light" panose="02000603030000020004" pitchFamily="2" charset="0"/>
-              </a:rPr>
-              <a:pPr/>
-              <a:t>‹#›</a:t>
-            </a:fld>
-            <a:endParaRPr lang="en-US">
-              <a:solidFill>
-                <a:schemeClr val="bg1"/>
-              </a:solidFill>
-              <a:latin typeface="Gotham Light" panose="02000603030000020004" pitchFamily="2" charset="0"/>
-            </a:endParaRPr>
-          </a:p>
-        </p:txBody>
-      </p:sp>
-      <p:pic>
-        <p:nvPicPr>
-          <p:cNvPr id="13" name="Picture 12">
-            <a:extLst>
-              <a:ext uri="{FF2B5EF4-FFF2-40B4-BE49-F238E27FC236}">
-                <a16:creationId xmlns:a16="http://schemas.microsoft.com/office/drawing/2014/main" id="{23304A6A-D15B-47E1-B072-1C47E2C76553}"/>
-              </a:ext>
-            </a:extLst>
-          </p:cNvPr>
-          <p:cNvPicPr/>
-          <p:nvPr userDrawn="1"/>
-        </p:nvPicPr>
-        <p:blipFill>
-          <a:blip r:embed="rId11" cstate="print">
-            <a:extLst>
-              <a:ext uri="{28A0092B-C50C-407E-A947-70E740481C1C}">
-                <a14:useLocalDpi xmlns:a14="http://schemas.microsoft.com/office/drawing/2010/main" val="0"/>
-              </a:ext>
-            </a:extLst>
-          </a:blip>
-          <a:stretch>
-            <a:fillRect/>
-          </a:stretch>
-        </p:blipFill>
-        <p:spPr>
-          <a:xfrm>
-            <a:off x="10755433" y="31710"/>
-            <a:ext cx="1428750" cy="596265"/>
-          </a:xfrm>
-          <a:prstGeom prst="rect">
-            <a:avLst/>
-          </a:prstGeom>
-        </p:spPr>
-      </p:pic>
-    </p:spTree>
-    <p:extLst>
-      <p:ext uri="{BB962C8B-B14F-4D97-AF65-F5344CB8AC3E}">
-        <p14:creationId xmlns:p14="http://schemas.microsoft.com/office/powerpoint/2010/main" val="2928327199"/>
-      </p:ext>
-    </p:extLst>
-  </p:cSld>
-  <p:clrMap bg1="lt1" tx1="dk1" bg2="lt2" tx2="dk2" accent1="accent1" accent2="accent2" accent3="accent3" accent4="accent4" accent5="accent5" accent6="accent6" hlink="hlink" folHlink="folHlink"/>
-  <p:sldLayoutIdLst>
-    <p:sldLayoutId id="2147483661" r:id="rId1"/>
-    <p:sldLayoutId id="2147483662" r:id="rId2"/>
-    <p:sldLayoutId id="2147483663" r:id="rId3"/>
-    <p:sldLayoutId id="2147483664" r:id="rId4"/>
-    <p:sldLayoutId id="2147483665" r:id="rId5"/>
-    <p:sldLayoutId id="2147483667" r:id="rId6"/>
-  </p:sldLayoutIdLst>
-  <p:txStyles>
-    <p:titleStyle>
-      <a:lvl1pPr algn="l" defTabSz="914400" rtl="0" eaLnBrk="1" latinLnBrk="0" hangingPunct="1">
-        <a:lnSpc>
-          <a:spcPct val="90000"/>
-        </a:lnSpc>
-        <a:spcBef>
-          <a:spcPct val="0"/>
-        </a:spcBef>
-        <a:buNone/>
-        <a:defRPr sz="2800" b="1" kern="1200">
-          <a:solidFill>
-            <a:srgbClr val="423C89"/>
-          </a:solidFill>
-          <a:latin typeface="Gotham Light" panose="02000603030000020004" pitchFamily="2" charset="0"/>
-          <a:ea typeface="+mj-ea"/>
-          <a:cs typeface="+mj-cs"/>
-        </a:defRPr>
-      </a:lvl1pPr>
-    </p:titleStyle>
-    <p:bodyStyle>
-      <a:lvl1pPr marL="228600" indent="-228600" algn="l" defTabSz="914400" rtl="0" eaLnBrk="1" latinLnBrk="0" hangingPunct="1">
-        <a:lnSpc>
-          <a:spcPct val="90000"/>
-        </a:lnSpc>
-        <a:spcBef>
-          <a:spcPts val="1000"/>
-        </a:spcBef>
-        <a:buClr>
-          <a:schemeClr val="accent1"/>
-        </a:buClr>
-        <a:buFont typeface="Calibri Light" panose="020F0302020204030204" pitchFamily="34" charset="0"/>
-        <a:buChar char="›"/>
-        <a:defRPr sz="1600" kern="1200">
-          <a:solidFill>
-            <a:schemeClr val="tx1"/>
-          </a:solidFill>
-          <a:latin typeface="Gotham Light" panose="02000603030000020004" pitchFamily="2" charset="0"/>
-          <a:ea typeface="+mn-ea"/>
-          <a:cs typeface="+mn-cs"/>
-        </a:defRPr>
-      </a:lvl1pPr>
-      <a:lvl2pPr marL="457200" indent="-228600" algn="l" defTabSz="914400" rtl="0" eaLnBrk="1" latinLnBrk="0" hangingPunct="1">
-        <a:lnSpc>
-          <a:spcPct val="90000"/>
-        </a:lnSpc>
-        <a:spcBef>
-          <a:spcPts val="500"/>
-        </a:spcBef>
-        <a:buClr>
-          <a:schemeClr val="accent1"/>
-        </a:buClr>
-        <a:buFont typeface="Calibri" panose="020F0502020204030204" pitchFamily="34" charset="0"/>
-        <a:buChar char="»"/>
-        <a:defRPr sz="1600" kern="1200">
-          <a:solidFill>
-            <a:schemeClr val="tx1"/>
-          </a:solidFill>
-          <a:latin typeface="Gotham Light" panose="02000603030000020004" pitchFamily="2" charset="0"/>
-          <a:ea typeface="+mn-ea"/>
-          <a:cs typeface="+mn-cs"/>
-        </a:defRPr>
-      </a:lvl2pPr>
-      <a:lvl3pPr marL="746125" indent="-228600" algn="l" defTabSz="914400" rtl="0" eaLnBrk="1" latinLnBrk="0" hangingPunct="1">
-        <a:lnSpc>
-          <a:spcPct val="90000"/>
-        </a:lnSpc>
-        <a:spcBef>
-          <a:spcPts val="500"/>
-        </a:spcBef>
-        <a:buClr>
-          <a:schemeClr val="accent1"/>
-        </a:buClr>
-        <a:buFont typeface="Calibri Light" panose="020F0302020204030204" pitchFamily="34" charset="0"/>
-        <a:buChar char="̶"/>
-        <a:defRPr sz="1600" kern="1200">
-          <a:solidFill>
-            <a:schemeClr val="tx1"/>
-          </a:solidFill>
-          <a:latin typeface="Gotham Light" panose="02000603030000020004" pitchFamily="2" charset="0"/>
-          <a:ea typeface="+mn-ea"/>
-          <a:cs typeface="+mn-cs"/>
-        </a:defRPr>
-      </a:lvl3pPr>
-      <a:lvl4pPr marL="974725" indent="-228600" algn="l" defTabSz="914400" rtl="0" eaLnBrk="1" latinLnBrk="0" hangingPunct="1">
-        <a:lnSpc>
-          <a:spcPct val="90000"/>
-        </a:lnSpc>
-        <a:spcBef>
-          <a:spcPts val="500"/>
-        </a:spcBef>
-        <a:buClr>
-          <a:schemeClr val="accent1"/>
-        </a:buClr>
-        <a:buFont typeface="Arial" panose="020B0604020202020204" pitchFamily="34" charset="0"/>
-        <a:buChar char="•"/>
-        <a:defRPr sz="1600" kern="1200">
-          <a:solidFill>
-            <a:schemeClr val="tx1"/>
-          </a:solidFill>
-          <a:latin typeface="Gotham Light" panose="02000603030000020004" pitchFamily="2" charset="0"/>
-          <a:ea typeface="+mn-ea"/>
-          <a:cs typeface="+mn-cs"/>
-        </a:defRPr>
-      </a:lvl4pPr>
-      <a:lvl5pPr marL="2057400" indent="-228600" algn="l" defTabSz="914400" rtl="0" eaLnBrk="1" latinLnBrk="0" hangingPunct="1">
-        <a:lnSpc>
-          <a:spcPct val="90000"/>
-        </a:lnSpc>
-        <a:spcBef>
-          <a:spcPts val="500"/>
-        </a:spcBef>
-        <a:buClr>
-          <a:schemeClr val="accent1"/>
-        </a:buClr>
-        <a:buFont typeface="Arial" panose="020B0604020202020204" pitchFamily="34" charset="0"/>
-        <a:buChar char="•"/>
-        <a:defRPr sz="1600" kern="1200">
-          <a:solidFill>
-            <a:schemeClr val="tx1"/>
-          </a:solidFill>
-          <a:latin typeface="+mn-lt"/>
-          <a:ea typeface="+mn-ea"/>
-          <a:cs typeface="+mn-cs"/>
-        </a:defRPr>
-      </a:lvl5pPr>
-      <a:lvl6pPr marL="2514600" indent="-228600" algn="l" defTabSz="914400" rtl="0" eaLnBrk="1" latinLnBrk="0" hangingPunct="1">
-        <a:lnSpc>
-          <a:spcPct val="90000"/>
-        </a:lnSpc>
-        <a:spcBef>
-          <a:spcPts val="500"/>
-        </a:spcBef>
-        <a:buFont typeface="Arial" panose="020B0604020202020204" pitchFamily="34" charset="0"/>
-        <a:buChar char="•"/>
-        <a:defRPr sz="1800" kern="1200">
-          <a:solidFill>
-            <a:schemeClr val="tx1"/>
-          </a:solidFill>
-          <a:latin typeface="+mn-lt"/>
-          <a:ea typeface="+mn-ea"/>
-          <a:cs typeface="+mn-cs"/>
-        </a:defRPr>
-      </a:lvl6pPr>
-      <a:lvl7pPr marL="2971800" indent="-228600" algn="l" defTabSz="914400" rtl="0" eaLnBrk="1" latinLnBrk="0" hangingPunct="1">
-        <a:lnSpc>
-          <a:spcPct val="90000"/>
-        </a:lnSpc>
-        <a:spcBef>
-          <a:spcPts val="500"/>
-        </a:spcBef>
-        <a:buFont typeface="Arial" panose="020B0604020202020204" pitchFamily="34" charset="0"/>
-        <a:buChar char="•"/>
-        <a:defRPr sz="1800" kern="1200">
-          <a:solidFill>
-            <a:schemeClr val="tx1"/>
-          </a:solidFill>
-          <a:latin typeface="+mn-lt"/>
-          <a:ea typeface="+mn-ea"/>
-          <a:cs typeface="+mn-cs"/>
-        </a:defRPr>
-      </a:lvl7pPr>
-      <a:lvl8pPr marL="3429000" indent="-228600" algn="l" defTabSz="914400" rtl="0" eaLnBrk="1" latinLnBrk="0" hangingPunct="1">
-        <a:lnSpc>
-          <a:spcPct val="90000"/>
-        </a:lnSpc>
-        <a:spcBef>
-          <a:spcPts val="500"/>
-        </a:spcBef>
-        <a:buFont typeface="Arial" panose="020B0604020202020204" pitchFamily="34" charset="0"/>
-        <a:buChar char="•"/>
-        <a:defRPr sz="1800" kern="1200">
-          <a:solidFill>
-            <a:schemeClr val="tx1"/>
-          </a:solidFill>
-          <a:latin typeface="+mn-lt"/>
-          <a:ea typeface="+mn-ea"/>
-          <a:cs typeface="+mn-cs"/>
-        </a:defRPr>
-      </a:lvl8pPr>
-      <a:lvl9pPr marL="3886200" indent="-228600" algn="l" defTabSz="914400" rtl="0" eaLnBrk="1" latinLnBrk="0" hangingPunct="1">
-        <a:lnSpc>
-          <a:spcPct val="90000"/>
-        </a:lnSpc>
-        <a:spcBef>
-          <a:spcPts val="500"/>
-        </a:spcBef>
-        <a:buFont typeface="Arial" panose="020B0604020202020204" pitchFamily="34" charset="0"/>
-        <a:buChar char="•"/>
-        <a:defRPr sz="1800" kern="1200">
-          <a:solidFill>
-            <a:schemeClr val="tx1"/>
-          </a:solidFill>
-          <a:latin typeface="+mn-lt"/>
-          <a:ea typeface="+mn-ea"/>
-          <a:cs typeface="+mn-cs"/>
-        </a:defRPr>
-      </a:lvl9pPr>
-    </p:bodyStyle>
-    <p:otherStyle>
-      <a:defPPr>
-        <a:defRPr lang="en-US"/>
-      </a:defPPr>
-      <a:lvl1pPr marL="0" algn="l" defTabSz="914400" rtl="0" eaLnBrk="1" latinLnBrk="0" hangingPunct="1">
-        <a:defRPr sz="1800" kern="1200">
-          <a:solidFill>
-            <a:schemeClr val="tx1"/>
-          </a:solidFill>
-          <a:latin typeface="+mn-lt"/>
-          <a:ea typeface="+mn-ea"/>
-          <a:cs typeface="+mn-cs"/>
-        </a:defRPr>
-      </a:lvl1pPr>
-      <a:lvl2pPr marL="457200" algn="l" defTabSz="914400" rtl="0" eaLnBrk="1" latinLnBrk="0" hangingPunct="1">
-        <a:defRPr sz="1800" kern="1200">
-          <a:solidFill>
-            <a:schemeClr val="tx1"/>
-          </a:solidFill>
-          <a:latin typeface="+mn-lt"/>
-          <a:ea typeface="+mn-ea"/>
-          <a:cs typeface="+mn-cs"/>
-        </a:defRPr>
-      </a:lvl2pPr>
-      <a:lvl3pPr marL="914400" algn="l" defTabSz="914400" rtl="0" eaLnBrk="1" latinLnBrk="0" hangingPunct="1">
-        <a:defRPr sz="1800" kern="1200">
-          <a:solidFill>
-            <a:schemeClr val="tx1"/>
-          </a:solidFill>
-          <a:latin typeface="+mn-lt"/>
-          <a:ea typeface="+mn-ea"/>
-          <a:cs typeface="+mn-cs"/>
-        </a:defRPr>
-      </a:lvl3pPr>
-      <a:lvl4pPr marL="1371600" algn="l" defTabSz="914400" rtl="0" eaLnBrk="1" latinLnBrk="0" hangingPunct="1">
-        <a:defRPr sz="1800" kern="1200">
-          <a:solidFill>
-            <a:schemeClr val="tx1"/>
-          </a:solidFill>
-          <a:latin typeface="+mn-lt"/>
-          <a:ea typeface="+mn-ea"/>
-          <a:cs typeface="+mn-cs"/>
-        </a:defRPr>
-      </a:lvl4pPr>
-      <a:lvl5pPr marL="1828800" algn="l" defTabSz="914400" rtl="0" eaLnBrk="1" latinLnBrk="0" hangingPunct="1">
-        <a:defRPr sz="1800" kern="1200">
-          <a:solidFill>
-            <a:schemeClr val="tx1"/>
-          </a:solidFill>
-          <a:latin typeface="+mn-lt"/>
-          <a:ea typeface="+mn-ea"/>
-          <a:cs typeface="+mn-cs"/>
-        </a:defRPr>
-      </a:lvl5pPr>
-      <a:lvl6pPr marL="2286000" algn="l" defTabSz="914400" rtl="0" eaLnBrk="1" latinLnBrk="0" hangingPunct="1">
-        <a:defRPr sz="1800" kern="1200">
-          <a:solidFill>
-            <a:schemeClr val="tx1"/>
-          </a:solidFill>
-          <a:latin typeface="+mn-lt"/>
-          <a:ea typeface="+mn-ea"/>
-          <a:cs typeface="+mn-cs"/>
-        </a:defRPr>
-      </a:lvl6pPr>
-      <a:lvl7pPr marL="2743200" algn="l" defTabSz="914400" rtl="0" eaLnBrk="1" latinLnBrk="0" hangingPunct="1">
-        <a:defRPr sz="1800" kern="1200">
-          <a:solidFill>
-            <a:schemeClr val="tx1"/>
-          </a:solidFill>
-          <a:latin typeface="+mn-lt"/>
-          <a:ea typeface="+mn-ea"/>
-          <a:cs typeface="+mn-cs"/>
-        </a:defRPr>
-      </a:lvl7pPr>
-      <a:lvl8pPr marL="3200400" algn="l" defTabSz="914400" rtl="0" eaLnBrk="1" latinLnBrk="0" hangingPunct="1">
-        <a:defRPr sz="1800" kern="1200">
-          <a:solidFill>
-            <a:schemeClr val="tx1"/>
-          </a:solidFill>
-          <a:latin typeface="+mn-lt"/>
-          <a:ea typeface="+mn-ea"/>
-          <a:cs typeface="+mn-cs"/>
-        </a:defRPr>
-      </a:lvl8pPr>
-      <a:lvl9pPr marL="3657600" algn="l" defTabSz="914400" rtl="0" eaLnBrk="1" latinLnBrk="0" hangingPunct="1">
-        <a:defRPr sz="1800" kern="1200">
-          <a:solidFill>
-            <a:schemeClr val="tx1"/>
-          </a:solidFill>
-          <a:latin typeface="+mn-lt"/>
-          <a:ea typeface="+mn-ea"/>
-          <a:cs typeface="+mn-cs"/>
-        </a:defRPr>
-      </a:lvl9pPr>
-    </p:otherStyle>
-  </p:txStyles>
-</p:sldMaster>
-</file>
-
-<file path=ppt/slideMasters/slideMaster2.xml><?xml version="1.0" encoding="utf-8"?>
-<p:sldMaster xmlns:a="http://schemas.openxmlformats.org/drawingml/2006/main" xmlns:r="http://schemas.openxmlformats.org/officeDocument/2006/relationships" xmlns:p="http://schemas.openxmlformats.org/presentationml/2006/main">
-  <p:cSld>
-    <p:bg>
-      <p:bgRef idx="1001">
-        <a:schemeClr val="bg1"/>
-      </p:bgRef>
-    </p:bg>
-    <p:spTree>
-      <p:nvGrpSpPr>
-        <p:cNvPr id="1" name=""/>
-        <p:cNvGrpSpPr/>
-        <p:nvPr/>
-      </p:nvGrpSpPr>
-      <p:grpSpPr>
-        <a:xfrm>
-          <a:off x="0" y="0"/>
-          <a:ext cx="0" cy="0"/>
-          <a:chOff x="0" y="0"/>
-          <a:chExt cx="0" cy="0"/>
-        </a:xfrm>
-      </p:grpSpPr>
-      <p:graphicFrame>
-        <p:nvGraphicFramePr>
-          <p:cNvPr id="6" name="Object 5" hidden="1"/>
-          <p:cNvGraphicFramePr>
-            <a:graphicFrameLocks noChangeAspect="1"/>
-          </p:cNvGraphicFramePr>
-          <p:nvPr userDrawn="1">
-            <p:custDataLst>
-              <p:tags r:id="rId6"/>
-            </p:custDataLst>
-          </p:nvPr>
-        </p:nvGraphicFramePr>
-        <p:xfrm>
-          <a:off x="1588" y="1588"/>
-          <a:ext cx="1587" cy="1587"/>
-        </p:xfrm>
-        <a:graphic>
-          <a:graphicData uri="http://schemas.openxmlformats.org/presentationml/2006/ole">
-            <mc:AlternateContent xmlns:mc="http://schemas.openxmlformats.org/markup-compatibility/2006">
-              <mc:Choice xmlns:v="urn:schemas-microsoft-com:vml" Requires="v">
-                <p:oleObj name="think-cell Slide" r:id="rId8" imgW="425" imgH="426" progId="TCLayout.ActiveDocument.1">
-                  <p:embed/>
-                </p:oleObj>
-              </mc:Choice>
-              <mc:Fallback>
-                <p:oleObj name="think-cell Slide" r:id="rId8" imgW="425" imgH="426" progId="TCLayout.ActiveDocument.1">
-                  <p:embed/>
-                  <p:pic>
-                    <p:nvPicPr>
-                      <p:cNvPr id="6" name="Object 5" hidden="1"/>
-                      <p:cNvPicPr/>
-                      <p:nvPr/>
-                    </p:nvPicPr>
-                    <p:blipFill>
-                      <a:blip r:embed="rId9"/>
-                      <a:stretch>
-                        <a:fillRect/>
-                      </a:stretch>
-                    </p:blipFill>
-                    <p:spPr>
-                      <a:xfrm>
-                        <a:off x="1588" y="1588"/>
-                        <a:ext cx="1587" cy="1587"/>
-                      </a:xfrm>
-                      <a:prstGeom prst="rect">
-                        <a:avLst/>
-                      </a:prstGeom>
-                    </p:spPr>
-                  </p:pic>
-                </p:oleObj>
-              </mc:Fallback>
-            </mc:AlternateContent>
-          </a:graphicData>
-        </a:graphic>
-      </p:graphicFrame>
-      <p:sp>
-        <p:nvSpPr>
           <p:cNvPr id="7" name="Rectangle 6" hidden="1">
             <a:extLst>
               <a:ext uri="{FF2B5EF4-FFF2-40B4-BE49-F238E27FC236}">
@@ -6339,7 +5191,7 @@
           <p:cNvSpPr/>
           <p:nvPr userDrawn="1">
             <p:custDataLst>
-              <p:tags r:id="rId7"/>
+              <p:tags r:id="rId8"/>
             </p:custDataLst>
           </p:nvPr>
         </p:nvSpPr>
@@ -6878,40 +5730,6 @@
           </a:p>
         </p:txBody>
       </p:sp>
-      <p:pic>
-        <p:nvPicPr>
-          <p:cNvPr id="14" name="Picture 13">
-            <a:extLst>
-              <a:ext uri="{FF2B5EF4-FFF2-40B4-BE49-F238E27FC236}">
-                <a16:creationId xmlns:a16="http://schemas.microsoft.com/office/drawing/2014/main" id="{FDFCD0C7-445F-4A14-9C86-5CF981271CEE}"/>
-              </a:ext>
-            </a:extLst>
-          </p:cNvPr>
-          <p:cNvPicPr/>
-          <p:nvPr userDrawn="1"/>
-        </p:nvPicPr>
-        <p:blipFill>
-          <a:blip r:embed="rId10" cstate="print">
-            <a:extLst>
-              <a:ext uri="{28A0092B-C50C-407E-A947-70E740481C1C}">
-                <a14:useLocalDpi xmlns:a14="http://schemas.microsoft.com/office/drawing/2010/main" val="0"/>
-              </a:ext>
-            </a:extLst>
-          </a:blip>
-          <a:stretch>
-            <a:fillRect/>
-          </a:stretch>
-        </p:blipFill>
-        <p:spPr>
-          <a:xfrm>
-            <a:off x="10736027" y="18414"/>
-            <a:ext cx="1428750" cy="596265"/>
-          </a:xfrm>
-          <a:prstGeom prst="rect">
-            <a:avLst/>
-          </a:prstGeom>
-        </p:spPr>
-      </p:pic>
     </p:spTree>
     <p:extLst>
       <p:ext uri="{BB962C8B-B14F-4D97-AF65-F5344CB8AC3E}">
@@ -6925,6 +5743,891 @@
     <p:sldLayoutId id="2147483674" r:id="rId2"/>
     <p:sldLayoutId id="2147483671" r:id="rId3"/>
     <p:sldLayoutId id="2147483673" r:id="rId4"/>
+  </p:sldLayoutIdLst>
+  <p:txStyles>
+    <p:titleStyle>
+      <a:lvl1pPr algn="l" defTabSz="914400" rtl="0" eaLnBrk="1" latinLnBrk="0" hangingPunct="1">
+        <a:lnSpc>
+          <a:spcPct val="90000"/>
+        </a:lnSpc>
+        <a:spcBef>
+          <a:spcPct val="0"/>
+        </a:spcBef>
+        <a:buNone/>
+        <a:defRPr sz="2800" b="1" kern="1200">
+          <a:solidFill>
+            <a:srgbClr val="423C89"/>
+          </a:solidFill>
+          <a:latin typeface="Gotham Light" panose="02000603030000020004" pitchFamily="2" charset="0"/>
+          <a:ea typeface="+mj-ea"/>
+          <a:cs typeface="+mj-cs"/>
+        </a:defRPr>
+      </a:lvl1pPr>
+    </p:titleStyle>
+    <p:bodyStyle>
+      <a:lvl1pPr marL="228600" indent="-228600" algn="l" defTabSz="914400" rtl="0" eaLnBrk="1" latinLnBrk="0" hangingPunct="1">
+        <a:lnSpc>
+          <a:spcPct val="90000"/>
+        </a:lnSpc>
+        <a:spcBef>
+          <a:spcPts val="1000"/>
+        </a:spcBef>
+        <a:buClr>
+          <a:schemeClr val="accent1"/>
+        </a:buClr>
+        <a:buFont typeface="Calibri Light" panose="020F0302020204030204" pitchFamily="34" charset="0"/>
+        <a:buChar char="›"/>
+        <a:defRPr sz="1600" kern="1200">
+          <a:solidFill>
+            <a:schemeClr val="tx1"/>
+          </a:solidFill>
+          <a:latin typeface="Gotham Light" panose="02000603030000020004" pitchFamily="2" charset="0"/>
+          <a:ea typeface="+mn-ea"/>
+          <a:cs typeface="+mn-cs"/>
+        </a:defRPr>
+      </a:lvl1pPr>
+      <a:lvl2pPr marL="457200" indent="-228600" algn="l" defTabSz="914400" rtl="0" eaLnBrk="1" latinLnBrk="0" hangingPunct="1">
+        <a:lnSpc>
+          <a:spcPct val="90000"/>
+        </a:lnSpc>
+        <a:spcBef>
+          <a:spcPts val="500"/>
+        </a:spcBef>
+        <a:buClr>
+          <a:schemeClr val="accent1"/>
+        </a:buClr>
+        <a:buFont typeface="Calibri" panose="020F0502020204030204" pitchFamily="34" charset="0"/>
+        <a:buChar char="»"/>
+        <a:defRPr sz="1600" kern="1200">
+          <a:solidFill>
+            <a:schemeClr val="tx1"/>
+          </a:solidFill>
+          <a:latin typeface="Gotham Light" panose="02000603030000020004" pitchFamily="2" charset="0"/>
+          <a:ea typeface="+mn-ea"/>
+          <a:cs typeface="+mn-cs"/>
+        </a:defRPr>
+      </a:lvl2pPr>
+      <a:lvl3pPr marL="746125" indent="-228600" algn="l" defTabSz="914400" rtl="0" eaLnBrk="1" latinLnBrk="0" hangingPunct="1">
+        <a:lnSpc>
+          <a:spcPct val="90000"/>
+        </a:lnSpc>
+        <a:spcBef>
+          <a:spcPts val="500"/>
+        </a:spcBef>
+        <a:buClr>
+          <a:schemeClr val="accent1"/>
+        </a:buClr>
+        <a:buFont typeface="Calibri Light" panose="020F0302020204030204" pitchFamily="34" charset="0"/>
+        <a:buChar char="̶"/>
+        <a:defRPr sz="1600" kern="1200">
+          <a:solidFill>
+            <a:schemeClr val="tx1"/>
+          </a:solidFill>
+          <a:latin typeface="Gotham Light" panose="02000603030000020004" pitchFamily="2" charset="0"/>
+          <a:ea typeface="+mn-ea"/>
+          <a:cs typeface="+mn-cs"/>
+        </a:defRPr>
+      </a:lvl3pPr>
+      <a:lvl4pPr marL="974725" indent="-228600" algn="l" defTabSz="914400" rtl="0" eaLnBrk="1" latinLnBrk="0" hangingPunct="1">
+        <a:lnSpc>
+          <a:spcPct val="90000"/>
+        </a:lnSpc>
+        <a:spcBef>
+          <a:spcPts val="500"/>
+        </a:spcBef>
+        <a:buClr>
+          <a:schemeClr val="accent1"/>
+        </a:buClr>
+        <a:buFont typeface="Arial" panose="020B0604020202020204" pitchFamily="34" charset="0"/>
+        <a:buChar char="•"/>
+        <a:defRPr sz="1600" kern="1200">
+          <a:solidFill>
+            <a:schemeClr val="tx1"/>
+          </a:solidFill>
+          <a:latin typeface="Gotham Light" panose="02000603030000020004" pitchFamily="2" charset="0"/>
+          <a:ea typeface="+mn-ea"/>
+          <a:cs typeface="+mn-cs"/>
+        </a:defRPr>
+      </a:lvl4pPr>
+      <a:lvl5pPr marL="2057400" indent="-228600" algn="l" defTabSz="914400" rtl="0" eaLnBrk="1" latinLnBrk="0" hangingPunct="1">
+        <a:lnSpc>
+          <a:spcPct val="90000"/>
+        </a:lnSpc>
+        <a:spcBef>
+          <a:spcPts val="500"/>
+        </a:spcBef>
+        <a:buClr>
+          <a:schemeClr val="accent1"/>
+        </a:buClr>
+        <a:buFont typeface="Arial" panose="020B0604020202020204" pitchFamily="34" charset="0"/>
+        <a:buChar char="•"/>
+        <a:defRPr sz="1600" kern="1200">
+          <a:solidFill>
+            <a:schemeClr val="tx1"/>
+          </a:solidFill>
+          <a:latin typeface="+mn-lt"/>
+          <a:ea typeface="+mn-ea"/>
+          <a:cs typeface="+mn-cs"/>
+        </a:defRPr>
+      </a:lvl5pPr>
+      <a:lvl6pPr marL="2514600" indent="-228600" algn="l" defTabSz="914400" rtl="0" eaLnBrk="1" latinLnBrk="0" hangingPunct="1">
+        <a:lnSpc>
+          <a:spcPct val="90000"/>
+        </a:lnSpc>
+        <a:spcBef>
+          <a:spcPts val="500"/>
+        </a:spcBef>
+        <a:buFont typeface="Arial" panose="020B0604020202020204" pitchFamily="34" charset="0"/>
+        <a:buChar char="•"/>
+        <a:defRPr sz="1800" kern="1200">
+          <a:solidFill>
+            <a:schemeClr val="tx1"/>
+          </a:solidFill>
+          <a:latin typeface="+mn-lt"/>
+          <a:ea typeface="+mn-ea"/>
+          <a:cs typeface="+mn-cs"/>
+        </a:defRPr>
+      </a:lvl6pPr>
+      <a:lvl7pPr marL="2971800" indent="-228600" algn="l" defTabSz="914400" rtl="0" eaLnBrk="1" latinLnBrk="0" hangingPunct="1">
+        <a:lnSpc>
+          <a:spcPct val="90000"/>
+        </a:lnSpc>
+        <a:spcBef>
+          <a:spcPts val="500"/>
+        </a:spcBef>
+        <a:buFont typeface="Arial" panose="020B0604020202020204" pitchFamily="34" charset="0"/>
+        <a:buChar char="•"/>
+        <a:defRPr sz="1800" kern="1200">
+          <a:solidFill>
+            <a:schemeClr val="tx1"/>
+          </a:solidFill>
+          <a:latin typeface="+mn-lt"/>
+          <a:ea typeface="+mn-ea"/>
+          <a:cs typeface="+mn-cs"/>
+        </a:defRPr>
+      </a:lvl7pPr>
+      <a:lvl8pPr marL="3429000" indent="-228600" algn="l" defTabSz="914400" rtl="0" eaLnBrk="1" latinLnBrk="0" hangingPunct="1">
+        <a:lnSpc>
+          <a:spcPct val="90000"/>
+        </a:lnSpc>
+        <a:spcBef>
+          <a:spcPts val="500"/>
+        </a:spcBef>
+        <a:buFont typeface="Arial" panose="020B0604020202020204" pitchFamily="34" charset="0"/>
+        <a:buChar char="•"/>
+        <a:defRPr sz="1800" kern="1200">
+          <a:solidFill>
+            <a:schemeClr val="tx1"/>
+          </a:solidFill>
+          <a:latin typeface="+mn-lt"/>
+          <a:ea typeface="+mn-ea"/>
+          <a:cs typeface="+mn-cs"/>
+        </a:defRPr>
+      </a:lvl8pPr>
+      <a:lvl9pPr marL="3886200" indent="-228600" algn="l" defTabSz="914400" rtl="0" eaLnBrk="1" latinLnBrk="0" hangingPunct="1">
+        <a:lnSpc>
+          <a:spcPct val="90000"/>
+        </a:lnSpc>
+        <a:spcBef>
+          <a:spcPts val="500"/>
+        </a:spcBef>
+        <a:buFont typeface="Arial" panose="020B0604020202020204" pitchFamily="34" charset="0"/>
+        <a:buChar char="•"/>
+        <a:defRPr sz="1800" kern="1200">
+          <a:solidFill>
+            <a:schemeClr val="tx1"/>
+          </a:solidFill>
+          <a:latin typeface="+mn-lt"/>
+          <a:ea typeface="+mn-ea"/>
+          <a:cs typeface="+mn-cs"/>
+        </a:defRPr>
+      </a:lvl9pPr>
+    </p:bodyStyle>
+    <p:otherStyle>
+      <a:defPPr>
+        <a:defRPr lang="en-US"/>
+      </a:defPPr>
+      <a:lvl1pPr marL="0" algn="l" defTabSz="914400" rtl="0" eaLnBrk="1" latinLnBrk="0" hangingPunct="1">
+        <a:defRPr sz="1800" kern="1200">
+          <a:solidFill>
+            <a:schemeClr val="tx1"/>
+          </a:solidFill>
+          <a:latin typeface="+mn-lt"/>
+          <a:ea typeface="+mn-ea"/>
+          <a:cs typeface="+mn-cs"/>
+        </a:defRPr>
+      </a:lvl1pPr>
+      <a:lvl2pPr marL="457200" algn="l" defTabSz="914400" rtl="0" eaLnBrk="1" latinLnBrk="0" hangingPunct="1">
+        <a:defRPr sz="1800" kern="1200">
+          <a:solidFill>
+            <a:schemeClr val="tx1"/>
+          </a:solidFill>
+          <a:latin typeface="+mn-lt"/>
+          <a:ea typeface="+mn-ea"/>
+          <a:cs typeface="+mn-cs"/>
+        </a:defRPr>
+      </a:lvl2pPr>
+      <a:lvl3pPr marL="914400" algn="l" defTabSz="914400" rtl="0" eaLnBrk="1" latinLnBrk="0" hangingPunct="1">
+        <a:defRPr sz="1800" kern="1200">
+          <a:solidFill>
+            <a:schemeClr val="tx1"/>
+          </a:solidFill>
+          <a:latin typeface="+mn-lt"/>
+          <a:ea typeface="+mn-ea"/>
+          <a:cs typeface="+mn-cs"/>
+        </a:defRPr>
+      </a:lvl3pPr>
+      <a:lvl4pPr marL="1371600" algn="l" defTabSz="914400" rtl="0" eaLnBrk="1" latinLnBrk="0" hangingPunct="1">
+        <a:defRPr sz="1800" kern="1200">
+          <a:solidFill>
+            <a:schemeClr val="tx1"/>
+          </a:solidFill>
+          <a:latin typeface="+mn-lt"/>
+          <a:ea typeface="+mn-ea"/>
+          <a:cs typeface="+mn-cs"/>
+        </a:defRPr>
+      </a:lvl4pPr>
+      <a:lvl5pPr marL="1828800" algn="l" defTabSz="914400" rtl="0" eaLnBrk="1" latinLnBrk="0" hangingPunct="1">
+        <a:defRPr sz="1800" kern="1200">
+          <a:solidFill>
+            <a:schemeClr val="tx1"/>
+          </a:solidFill>
+          <a:latin typeface="+mn-lt"/>
+          <a:ea typeface="+mn-ea"/>
+          <a:cs typeface="+mn-cs"/>
+        </a:defRPr>
+      </a:lvl5pPr>
+      <a:lvl6pPr marL="2286000" algn="l" defTabSz="914400" rtl="0" eaLnBrk="1" latinLnBrk="0" hangingPunct="1">
+        <a:defRPr sz="1800" kern="1200">
+          <a:solidFill>
+            <a:schemeClr val="tx1"/>
+          </a:solidFill>
+          <a:latin typeface="+mn-lt"/>
+          <a:ea typeface="+mn-ea"/>
+          <a:cs typeface="+mn-cs"/>
+        </a:defRPr>
+      </a:lvl6pPr>
+      <a:lvl7pPr marL="2743200" algn="l" defTabSz="914400" rtl="0" eaLnBrk="1" latinLnBrk="0" hangingPunct="1">
+        <a:defRPr sz="1800" kern="1200">
+          <a:solidFill>
+            <a:schemeClr val="tx1"/>
+          </a:solidFill>
+          <a:latin typeface="+mn-lt"/>
+          <a:ea typeface="+mn-ea"/>
+          <a:cs typeface="+mn-cs"/>
+        </a:defRPr>
+      </a:lvl7pPr>
+      <a:lvl8pPr marL="3200400" algn="l" defTabSz="914400" rtl="0" eaLnBrk="1" latinLnBrk="0" hangingPunct="1">
+        <a:defRPr sz="1800" kern="1200">
+          <a:solidFill>
+            <a:schemeClr val="tx1"/>
+          </a:solidFill>
+          <a:latin typeface="+mn-lt"/>
+          <a:ea typeface="+mn-ea"/>
+          <a:cs typeface="+mn-cs"/>
+        </a:defRPr>
+      </a:lvl8pPr>
+      <a:lvl9pPr marL="3657600" algn="l" defTabSz="914400" rtl="0" eaLnBrk="1" latinLnBrk="0" hangingPunct="1">
+        <a:defRPr sz="1800" kern="1200">
+          <a:solidFill>
+            <a:schemeClr val="tx1"/>
+          </a:solidFill>
+          <a:latin typeface="+mn-lt"/>
+          <a:ea typeface="+mn-ea"/>
+          <a:cs typeface="+mn-cs"/>
+        </a:defRPr>
+      </a:lvl9pPr>
+    </p:otherStyle>
+  </p:txStyles>
+</p:sldMaster>
+</file>
+
+<file path=ppt/slideMasters/slideMaster2.xml><?xml version="1.0" encoding="utf-8"?>
+<p:sldMaster xmlns:a="http://schemas.openxmlformats.org/drawingml/2006/main" xmlns:r="http://schemas.openxmlformats.org/officeDocument/2006/relationships" xmlns:p="http://schemas.openxmlformats.org/presentationml/2006/main">
+  <p:cSld>
+    <p:bg>
+      <p:bgRef idx="1001">
+        <a:schemeClr val="bg1"/>
+      </p:bgRef>
+    </p:bg>
+    <p:spTree>
+      <p:nvGrpSpPr>
+        <p:cNvPr id="1" name=""/>
+        <p:cNvGrpSpPr/>
+        <p:nvPr/>
+      </p:nvGrpSpPr>
+      <p:grpSpPr>
+        <a:xfrm>
+          <a:off x="0" y="0"/>
+          <a:ext cx="0" cy="0"/>
+          <a:chOff x="0" y="0"/>
+          <a:chExt cx="0" cy="0"/>
+        </a:xfrm>
+      </p:grpSpPr>
+      <p:graphicFrame>
+        <p:nvGraphicFramePr>
+          <p:cNvPr id="6" name="Object 5" hidden="1"/>
+          <p:cNvGraphicFramePr>
+            <a:graphicFrameLocks noChangeAspect="1"/>
+          </p:cNvGraphicFramePr>
+          <p:nvPr userDrawn="1">
+            <p:custDataLst>
+              <p:tags r:id="rId9"/>
+            </p:custDataLst>
+          </p:nvPr>
+        </p:nvGraphicFramePr>
+        <p:xfrm>
+          <a:off x="1588" y="1588"/>
+          <a:ext cx="1587" cy="1587"/>
+        </p:xfrm>
+        <a:graphic>
+          <a:graphicData uri="http://schemas.openxmlformats.org/presentationml/2006/ole">
+            <mc:AlternateContent xmlns:mc="http://schemas.openxmlformats.org/markup-compatibility/2006">
+              <mc:Choice xmlns:v="urn:schemas-microsoft-com:vml" Requires="v">
+                <p:oleObj spid="_x0000_s8194" name="think-cell Slide" r:id="rId10" imgW="425" imgH="426" progId="TCLayout.ActiveDocument.1">
+                  <p:embed/>
+                </p:oleObj>
+              </mc:Choice>
+              <mc:Fallback>
+                <p:oleObj name="think-cell Slide" r:id="rId10" imgW="425" imgH="426" progId="TCLayout.ActiveDocument.1">
+                  <p:embed/>
+                  <p:pic>
+                    <p:nvPicPr>
+                      <p:cNvPr id="6" name="Object 5" hidden="1"/>
+                      <p:cNvPicPr/>
+                      <p:nvPr/>
+                    </p:nvPicPr>
+                    <p:blipFill>
+                      <a:blip r:embed="rId11"/>
+                      <a:stretch>
+                        <a:fillRect/>
+                      </a:stretch>
+                    </p:blipFill>
+                    <p:spPr>
+                      <a:xfrm>
+                        <a:off x="1588" y="1588"/>
+                        <a:ext cx="1587" cy="1587"/>
+                      </a:xfrm>
+                      <a:prstGeom prst="rect">
+                        <a:avLst/>
+                      </a:prstGeom>
+                    </p:spPr>
+                  </p:pic>
+                </p:oleObj>
+              </mc:Fallback>
+            </mc:AlternateContent>
+          </a:graphicData>
+        </a:graphic>
+      </p:graphicFrame>
+      <p:sp>
+        <p:nvSpPr>
+          <p:cNvPr id="20" name="Arrow: Pentagon 19">
+            <a:extLst>
+              <a:ext uri="{FF2B5EF4-FFF2-40B4-BE49-F238E27FC236}">
+                <a16:creationId xmlns:a16="http://schemas.microsoft.com/office/drawing/2014/main" id="{26CDDB92-D8A7-4813-8A72-784E3B907D60}"/>
+              </a:ext>
+            </a:extLst>
+          </p:cNvPr>
+          <p:cNvSpPr/>
+          <p:nvPr userDrawn="1"/>
+        </p:nvSpPr>
+        <p:spPr>
+          <a:xfrm flipH="1">
+            <a:off x="11746131" y="6324600"/>
+            <a:ext cx="445869" cy="343180"/>
+          </a:xfrm>
+          <a:prstGeom prst="homePlate">
+            <a:avLst>
+              <a:gd name="adj" fmla="val 33686"/>
+            </a:avLst>
+          </a:prstGeom>
+          <a:solidFill>
+            <a:srgbClr val="EB3237"/>
+          </a:solidFill>
+          <a:ln>
+            <a:noFill/>
+          </a:ln>
+        </p:spPr>
+        <p:style>
+          <a:lnRef idx="2">
+            <a:schemeClr val="accent1">
+              <a:shade val="50000"/>
+            </a:schemeClr>
+          </a:lnRef>
+          <a:fillRef idx="1">
+            <a:schemeClr val="accent1"/>
+          </a:fillRef>
+          <a:effectRef idx="0">
+            <a:schemeClr val="accent1"/>
+          </a:effectRef>
+          <a:fontRef idx="minor">
+            <a:schemeClr val="lt1"/>
+          </a:fontRef>
+        </p:style>
+        <p:txBody>
+          <a:bodyPr rtlCol="0" anchor="ctr"/>
+          <a:lstStyle/>
+          <a:p>
+            <a:pPr algn="ctr"/>
+            <a:endParaRPr lang="en-US">
+              <a:latin typeface="Gotham Light" panose="02000603030000020004" pitchFamily="2" charset="0"/>
+            </a:endParaRPr>
+          </a:p>
+        </p:txBody>
+      </p:sp>
+      <p:sp>
+        <p:nvSpPr>
+          <p:cNvPr id="2" name="Title Placeholder 1">
+            <a:extLst>
+              <a:ext uri="{FF2B5EF4-FFF2-40B4-BE49-F238E27FC236}">
+                <a16:creationId xmlns:a16="http://schemas.microsoft.com/office/drawing/2014/main" id="{B57DE2E4-39FD-4747-A53E-5C87FACD236D}"/>
+              </a:ext>
+            </a:extLst>
+          </p:cNvPr>
+          <p:cNvSpPr>
+            <a:spLocks noGrp="1"/>
+          </p:cNvSpPr>
+          <p:nvPr>
+            <p:ph type="title"/>
+          </p:nvPr>
+        </p:nvSpPr>
+        <p:spPr>
+          <a:xfrm>
+            <a:off x="324416" y="303636"/>
+            <a:ext cx="11543168" cy="403187"/>
+          </a:xfrm>
+          <a:prstGeom prst="rect">
+            <a:avLst/>
+          </a:prstGeom>
+        </p:spPr>
+        <p:txBody>
+          <a:bodyPr vert="horz" wrap="square" lIns="15240" tIns="7620" rIns="15240" bIns="7620" rtlCol="0" anchor="t" anchorCtr="0">
+            <a:spAutoFit/>
+          </a:bodyPr>
+          <a:lstStyle/>
+          <a:p>
+            <a:r>
+              <a:rPr lang="en-US"/>
+              <a:t>Click to edit Master title style</a:t>
+            </a:r>
+          </a:p>
+        </p:txBody>
+      </p:sp>
+      <p:sp>
+        <p:nvSpPr>
+          <p:cNvPr id="3" name="Text Placeholder 2">
+            <a:extLst>
+              <a:ext uri="{FF2B5EF4-FFF2-40B4-BE49-F238E27FC236}">
+                <a16:creationId xmlns:a16="http://schemas.microsoft.com/office/drawing/2014/main" id="{D56DB6E4-BFBD-4EDA-AE3B-7A8FD4D4DFA1}"/>
+              </a:ext>
+            </a:extLst>
+          </p:cNvPr>
+          <p:cNvSpPr>
+            <a:spLocks noGrp="1"/>
+          </p:cNvSpPr>
+          <p:nvPr>
+            <p:ph type="body" idx="1"/>
+          </p:nvPr>
+        </p:nvSpPr>
+        <p:spPr>
+          <a:xfrm>
+            <a:off x="324415" y="1145391"/>
+            <a:ext cx="11543169" cy="1094146"/>
+          </a:xfrm>
+          <a:prstGeom prst="rect">
+            <a:avLst/>
+          </a:prstGeom>
+        </p:spPr>
+        <p:txBody>
+          <a:bodyPr vert="horz" wrap="square" lIns="15240" tIns="7620" rIns="15240" bIns="7620" rtlCol="0">
+            <a:spAutoFit/>
+          </a:bodyPr>
+          <a:lstStyle/>
+          <a:p>
+            <a:pPr lvl="0"/>
+            <a:r>
+              <a:rPr lang="en-US"/>
+              <a:t>Edit Master text styles</a:t>
+            </a:r>
+          </a:p>
+          <a:p>
+            <a:pPr lvl="1"/>
+            <a:r>
+              <a:rPr lang="en-US"/>
+              <a:t>Second level</a:t>
+            </a:r>
+          </a:p>
+          <a:p>
+            <a:pPr lvl="2"/>
+            <a:r>
+              <a:rPr lang="en-US"/>
+              <a:t>Third level</a:t>
+            </a:r>
+          </a:p>
+          <a:p>
+            <a:pPr lvl="3"/>
+            <a:r>
+              <a:rPr lang="en-US"/>
+              <a:t>Fourth level</a:t>
+            </a:r>
+          </a:p>
+        </p:txBody>
+      </p:sp>
+      <p:sp>
+        <p:nvSpPr>
+          <p:cNvPr id="4" name="Date Placeholder 3">
+            <a:extLst>
+              <a:ext uri="{FF2B5EF4-FFF2-40B4-BE49-F238E27FC236}">
+                <a16:creationId xmlns:a16="http://schemas.microsoft.com/office/drawing/2014/main" id="{E1D16D1C-E046-4EF6-8CD8-783F9A8C582A}"/>
+              </a:ext>
+            </a:extLst>
+          </p:cNvPr>
+          <p:cNvSpPr>
+            <a:spLocks noGrp="1"/>
+          </p:cNvSpPr>
+          <p:nvPr>
+            <p:ph type="dt" sz="half" idx="2"/>
+          </p:nvPr>
+        </p:nvSpPr>
+        <p:spPr>
+          <a:xfrm>
+            <a:off x="324415" y="6538035"/>
+            <a:ext cx="11145393" cy="169277"/>
+          </a:xfrm>
+          <a:prstGeom prst="rect">
+            <a:avLst/>
+          </a:prstGeom>
+        </p:spPr>
+        <p:txBody>
+          <a:bodyPr vert="horz" wrap="square" lIns="15240" tIns="7620" rIns="15240" bIns="7620" rtlCol="0" anchor="ctr">
+            <a:spAutoFit/>
+          </a:bodyPr>
+          <a:lstStyle>
+            <a:lvl1pPr algn="l">
+              <a:defRPr sz="1000">
+                <a:solidFill>
+                  <a:schemeClr val="tx1"/>
+                </a:solidFill>
+                <a:latin typeface="Gotham Light" panose="02000603030000020004" pitchFamily="2" charset="0"/>
+              </a:defRPr>
+            </a:lvl1pPr>
+          </a:lstStyle>
+          <a:p>
+            <a:r>
+              <a:rPr lang="en-US"/>
+              <a:t>Source: </a:t>
+            </a:r>
+          </a:p>
+        </p:txBody>
+      </p:sp>
+      <p:sp>
+        <p:nvSpPr>
+          <p:cNvPr id="5" name="Footer Placeholder 4">
+            <a:extLst>
+              <a:ext uri="{FF2B5EF4-FFF2-40B4-BE49-F238E27FC236}">
+                <a16:creationId xmlns:a16="http://schemas.microsoft.com/office/drawing/2014/main" id="{1BCE2C20-B1D5-4BC6-A6CA-6FA9F0B51320}"/>
+              </a:ext>
+            </a:extLst>
+          </p:cNvPr>
+          <p:cNvSpPr>
+            <a:spLocks noGrp="1"/>
+          </p:cNvSpPr>
+          <p:nvPr>
+            <p:ph type="ftr" sz="quarter" idx="3"/>
+          </p:nvPr>
+        </p:nvSpPr>
+        <p:spPr>
+          <a:xfrm>
+            <a:off x="324415" y="6285068"/>
+            <a:ext cx="11145393" cy="169277"/>
+          </a:xfrm>
+          <a:prstGeom prst="rect">
+            <a:avLst/>
+          </a:prstGeom>
+        </p:spPr>
+        <p:txBody>
+          <a:bodyPr vert="horz" wrap="square" lIns="15240" tIns="7620" rIns="15240" bIns="7620" rtlCol="0" anchor="ctr">
+            <a:spAutoFit/>
+          </a:bodyPr>
+          <a:lstStyle>
+            <a:lvl1pPr algn="l">
+              <a:defRPr sz="1000">
+                <a:solidFill>
+                  <a:schemeClr val="tx1"/>
+                </a:solidFill>
+                <a:latin typeface="Gotham Light" panose="02000603030000020004" pitchFamily="2" charset="0"/>
+              </a:defRPr>
+            </a:lvl1pPr>
+          </a:lstStyle>
+          <a:p>
+            <a:r>
+              <a:rPr lang="en-US"/>
+              <a:t>Footnote:</a:t>
+            </a:r>
+          </a:p>
+        </p:txBody>
+      </p:sp>
+      <p:cxnSp>
+        <p:nvCxnSpPr>
+          <p:cNvPr id="10" name="Straight Connector 9">
+            <a:extLst>
+              <a:ext uri="{FF2B5EF4-FFF2-40B4-BE49-F238E27FC236}">
+                <a16:creationId xmlns:a16="http://schemas.microsoft.com/office/drawing/2014/main" id="{EA7873EB-6BAD-43C0-B870-0AE8D5E5C4CE}"/>
+              </a:ext>
+            </a:extLst>
+          </p:cNvPr>
+          <p:cNvCxnSpPr>
+            <a:cxnSpLocks/>
+            <a:stCxn id="20" idx="3"/>
+          </p:cNvCxnSpPr>
+          <p:nvPr userDrawn="1"/>
+        </p:nvCxnSpPr>
+        <p:spPr>
+          <a:xfrm flipH="1">
+            <a:off x="-4757" y="6496190"/>
+            <a:ext cx="11750888" cy="0"/>
+          </a:xfrm>
+          <a:prstGeom prst="line">
+            <a:avLst/>
+          </a:prstGeom>
+          <a:ln>
+            <a:solidFill>
+              <a:srgbClr val="EB3237"/>
+            </a:solidFill>
+          </a:ln>
+        </p:spPr>
+        <p:style>
+          <a:lnRef idx="1">
+            <a:schemeClr val="accent1"/>
+          </a:lnRef>
+          <a:fillRef idx="0">
+            <a:schemeClr val="accent1"/>
+          </a:fillRef>
+          <a:effectRef idx="0">
+            <a:schemeClr val="accent1"/>
+          </a:effectRef>
+          <a:fontRef idx="minor">
+            <a:schemeClr val="tx1"/>
+          </a:fontRef>
+        </p:style>
+      </p:cxnSp>
+      <p:sp>
+        <p:nvSpPr>
+          <p:cNvPr id="18" name="Rectangle 17">
+            <a:extLst>
+              <a:ext uri="{FF2B5EF4-FFF2-40B4-BE49-F238E27FC236}">
+                <a16:creationId xmlns:a16="http://schemas.microsoft.com/office/drawing/2014/main" id="{CF7D3A27-85EF-4023-A90F-B507F9C7BBC7}"/>
+              </a:ext>
+            </a:extLst>
+          </p:cNvPr>
+          <p:cNvSpPr/>
+          <p:nvPr userDrawn="1"/>
+        </p:nvSpPr>
+        <p:spPr>
+          <a:xfrm rot="5400000">
+            <a:off x="-117580" y="394613"/>
+            <a:ext cx="456392" cy="221232"/>
+          </a:xfrm>
+          <a:prstGeom prst="rect">
+            <a:avLst/>
+          </a:prstGeom>
+          <a:solidFill>
+            <a:schemeClr val="accent3">
+              <a:lumMod val="50000"/>
+            </a:schemeClr>
+          </a:solidFill>
+          <a:ln>
+            <a:noFill/>
+          </a:ln>
+          <a:effectLst/>
+        </p:spPr>
+        <p:style>
+          <a:lnRef idx="2">
+            <a:schemeClr val="accent1">
+              <a:shade val="50000"/>
+            </a:schemeClr>
+          </a:lnRef>
+          <a:fillRef idx="1">
+            <a:schemeClr val="accent1"/>
+          </a:fillRef>
+          <a:effectRef idx="0">
+            <a:schemeClr val="accent1"/>
+          </a:effectRef>
+          <a:fontRef idx="minor">
+            <a:schemeClr val="lt1"/>
+          </a:fontRef>
+        </p:style>
+        <p:txBody>
+          <a:bodyPr rot="0" spcFirstLastPara="0" vertOverflow="overflow" horzOverflow="overflow" vert="horz" wrap="square" lIns="91440" tIns="45720" rIns="91440" bIns="45720" numCol="1" spcCol="0" rtlCol="0" fromWordArt="0" anchor="ctr" anchorCtr="0" forceAA="0" compatLnSpc="1">
+            <a:prstTxWarp prst="textNoShape">
+              <a:avLst/>
+            </a:prstTxWarp>
+            <a:noAutofit/>
+          </a:bodyPr>
+          <a:lstStyle/>
+          <a:p>
+            <a:pPr lvl="0" algn="ctr"/>
+            <a:endParaRPr lang="en-US"/>
+          </a:p>
+        </p:txBody>
+      </p:sp>
+      <p:sp>
+        <p:nvSpPr>
+          <p:cNvPr id="22" name="Slide Number Placeholder 5">
+            <a:extLst>
+              <a:ext uri="{FF2B5EF4-FFF2-40B4-BE49-F238E27FC236}">
+                <a16:creationId xmlns:a16="http://schemas.microsoft.com/office/drawing/2014/main" id="{A6FFCF44-1256-40E2-AD34-39552A334BBE}"/>
+              </a:ext>
+            </a:extLst>
+          </p:cNvPr>
+          <p:cNvSpPr txBox="1">
+            <a:spLocks/>
+          </p:cNvSpPr>
+          <p:nvPr userDrawn="1"/>
+        </p:nvSpPr>
+        <p:spPr>
+          <a:xfrm>
+            <a:off x="11860437" y="6411552"/>
+            <a:ext cx="217256" cy="169277"/>
+          </a:xfrm>
+          <a:prstGeom prst="rect">
+            <a:avLst/>
+          </a:prstGeom>
+        </p:spPr>
+        <p:txBody>
+          <a:bodyPr vert="horz" wrap="square" lIns="15240" tIns="7620" rIns="15240" bIns="7620" rtlCol="0" anchor="ctr">
+            <a:spAutoFit/>
+          </a:bodyPr>
+          <a:lstStyle>
+            <a:defPPr>
+              <a:defRPr lang="en-US"/>
+            </a:defPPr>
+            <a:lvl1pPr marL="0" algn="l" defTabSz="914400" rtl="0" eaLnBrk="1" latinLnBrk="0" hangingPunct="1">
+              <a:defRPr sz="1000" kern="1200">
+                <a:solidFill>
+                  <a:schemeClr val="tx1"/>
+                </a:solidFill>
+                <a:latin typeface="+mn-lt"/>
+                <a:ea typeface="+mn-ea"/>
+                <a:cs typeface="+mn-cs"/>
+              </a:defRPr>
+            </a:lvl1pPr>
+            <a:lvl2pPr marL="457200" algn="l" defTabSz="914400" rtl="0" eaLnBrk="1" latinLnBrk="0" hangingPunct="1">
+              <a:defRPr sz="1800" kern="1200">
+                <a:solidFill>
+                  <a:schemeClr val="tx1"/>
+                </a:solidFill>
+                <a:latin typeface="+mn-lt"/>
+                <a:ea typeface="+mn-ea"/>
+                <a:cs typeface="+mn-cs"/>
+              </a:defRPr>
+            </a:lvl2pPr>
+            <a:lvl3pPr marL="914400" algn="l" defTabSz="914400" rtl="0" eaLnBrk="1" latinLnBrk="0" hangingPunct="1">
+              <a:defRPr sz="1800" kern="1200">
+                <a:solidFill>
+                  <a:schemeClr val="tx1"/>
+                </a:solidFill>
+                <a:latin typeface="+mn-lt"/>
+                <a:ea typeface="+mn-ea"/>
+                <a:cs typeface="+mn-cs"/>
+              </a:defRPr>
+            </a:lvl3pPr>
+            <a:lvl4pPr marL="1371600" algn="l" defTabSz="914400" rtl="0" eaLnBrk="1" latinLnBrk="0" hangingPunct="1">
+              <a:defRPr sz="1800" kern="1200">
+                <a:solidFill>
+                  <a:schemeClr val="tx1"/>
+                </a:solidFill>
+                <a:latin typeface="+mn-lt"/>
+                <a:ea typeface="+mn-ea"/>
+                <a:cs typeface="+mn-cs"/>
+              </a:defRPr>
+            </a:lvl4pPr>
+            <a:lvl5pPr marL="1828800" algn="l" defTabSz="914400" rtl="0" eaLnBrk="1" latinLnBrk="0" hangingPunct="1">
+              <a:defRPr sz="1800" kern="1200">
+                <a:solidFill>
+                  <a:schemeClr val="tx1"/>
+                </a:solidFill>
+                <a:latin typeface="+mn-lt"/>
+                <a:ea typeface="+mn-ea"/>
+                <a:cs typeface="+mn-cs"/>
+              </a:defRPr>
+            </a:lvl5pPr>
+            <a:lvl6pPr marL="2286000" algn="l" defTabSz="914400" rtl="0" eaLnBrk="1" latinLnBrk="0" hangingPunct="1">
+              <a:defRPr sz="1800" kern="1200">
+                <a:solidFill>
+                  <a:schemeClr val="tx1"/>
+                </a:solidFill>
+                <a:latin typeface="+mn-lt"/>
+                <a:ea typeface="+mn-ea"/>
+                <a:cs typeface="+mn-cs"/>
+              </a:defRPr>
+            </a:lvl6pPr>
+            <a:lvl7pPr marL="2743200" algn="l" defTabSz="914400" rtl="0" eaLnBrk="1" latinLnBrk="0" hangingPunct="1">
+              <a:defRPr sz="1800" kern="1200">
+                <a:solidFill>
+                  <a:schemeClr val="tx1"/>
+                </a:solidFill>
+                <a:latin typeface="+mn-lt"/>
+                <a:ea typeface="+mn-ea"/>
+                <a:cs typeface="+mn-cs"/>
+              </a:defRPr>
+            </a:lvl7pPr>
+            <a:lvl8pPr marL="3200400" algn="l" defTabSz="914400" rtl="0" eaLnBrk="1" latinLnBrk="0" hangingPunct="1">
+              <a:defRPr sz="1800" kern="1200">
+                <a:solidFill>
+                  <a:schemeClr val="tx1"/>
+                </a:solidFill>
+                <a:latin typeface="+mn-lt"/>
+                <a:ea typeface="+mn-ea"/>
+                <a:cs typeface="+mn-cs"/>
+              </a:defRPr>
+            </a:lvl8pPr>
+            <a:lvl9pPr marL="3657600" algn="l" defTabSz="914400" rtl="0" eaLnBrk="1" latinLnBrk="0" hangingPunct="1">
+              <a:defRPr sz="1800" kern="1200">
+                <a:solidFill>
+                  <a:schemeClr val="tx1"/>
+                </a:solidFill>
+                <a:latin typeface="+mn-lt"/>
+                <a:ea typeface="+mn-ea"/>
+                <a:cs typeface="+mn-cs"/>
+              </a:defRPr>
+            </a:lvl9pPr>
+          </a:lstStyle>
+          <a:p>
+            <a:fld id="{879058DB-30C9-4F64-8719-9EAD4E263111}" type="slidenum">
+              <a:rPr lang="en-US" smtClean="0">
+                <a:solidFill>
+                  <a:schemeClr val="bg1"/>
+                </a:solidFill>
+                <a:latin typeface="Gotham Light" panose="02000603030000020004" pitchFamily="2" charset="0"/>
+              </a:rPr>
+              <a:pPr/>
+              <a:t>‹#›</a:t>
+            </a:fld>
+            <a:endParaRPr lang="en-US">
+              <a:solidFill>
+                <a:schemeClr val="bg1"/>
+              </a:solidFill>
+              <a:latin typeface="Gotham Light" panose="02000603030000020004" pitchFamily="2" charset="0"/>
+            </a:endParaRPr>
+          </a:p>
+        </p:txBody>
+      </p:sp>
+    </p:spTree>
+    <p:extLst>
+      <p:ext uri="{BB962C8B-B14F-4D97-AF65-F5344CB8AC3E}">
+        <p14:creationId xmlns:p14="http://schemas.microsoft.com/office/powerpoint/2010/main" val="1734264494"/>
+      </p:ext>
+    </p:extLst>
+  </p:cSld>
+  <p:clrMap bg1="lt1" tx1="dk1" bg2="lt2" tx2="dk2" accent1="accent1" accent2="accent2" accent3="accent3" accent4="accent4" accent5="accent5" accent6="accent6" hlink="hlink" folHlink="folHlink"/>
+  <p:sldLayoutIdLst>
+    <p:sldLayoutId id="2147483676" r:id="rId1"/>
+    <p:sldLayoutId id="2147483677" r:id="rId2"/>
+    <p:sldLayoutId id="2147483678" r:id="rId3"/>
+    <p:sldLayoutId id="2147483679" r:id="rId4"/>
+    <p:sldLayoutId id="2147483680" r:id="rId5"/>
+    <p:sldLayoutId id="2147483681" r:id="rId6"/>
   </p:sldLayoutIdLst>
   <p:txStyles>
     <p:titleStyle>
@@ -7264,21 +6967,17 @@
       </p:pic>
       <p:sp>
         <p:nvSpPr>
-          <p:cNvPr id="4" name="Google Shape;40;p5">
-            <a:extLst>
-              <a:ext uri="{FF2B5EF4-FFF2-40B4-BE49-F238E27FC236}">
-                <a16:creationId xmlns:a16="http://schemas.microsoft.com/office/drawing/2014/main" id="{C9607DE2-A059-4BE3-9904-5486CE512E28}"/>
-              </a:ext>
-            </a:extLst>
-          </p:cNvPr>
+          <p:cNvPr id="40" name="Google Shape;40;p5"/>
           <p:cNvSpPr txBox="1">
-            <a:spLocks/>
+            <a:spLocks noGrp="1"/>
           </p:cNvSpPr>
-          <p:nvPr/>
+          <p:nvPr>
+            <p:ph type="ctrTitle" idx="4294967295"/>
+          </p:nvPr>
         </p:nvSpPr>
         <p:spPr>
           <a:xfrm>
-            <a:off x="34416" y="2246669"/>
+            <a:off x="0" y="2005781"/>
             <a:ext cx="5530645" cy="1652451"/>
           </a:xfrm>
           <a:prstGeom prst="rect">
@@ -7290,28 +6989,10 @@
           </a:ln>
         </p:spPr>
         <p:txBody>
-          <a:bodyPr spcFirstLastPara="1" vert="horz" wrap="square" lIns="15225" tIns="7600" rIns="15225" bIns="7600" rtlCol="0" anchor="b" anchorCtr="0">
+          <a:bodyPr spcFirstLastPara="1" wrap="square" lIns="15225" tIns="7600" rIns="15225" bIns="7600" anchor="b" anchorCtr="0">
             <a:noAutofit/>
           </a:bodyPr>
-          <a:lstStyle>
-            <a:lvl1pPr algn="l" defTabSz="914400" rtl="0" eaLnBrk="1" latinLnBrk="0" hangingPunct="1">
-              <a:lnSpc>
-                <a:spcPct val="90000"/>
-              </a:lnSpc>
-              <a:spcBef>
-                <a:spcPct val="0"/>
-              </a:spcBef>
-              <a:buNone/>
-              <a:defRPr sz="2800" b="1" kern="1200">
-                <a:solidFill>
-                  <a:srgbClr val="423C89"/>
-                </a:solidFill>
-                <a:latin typeface="Gotham Light" panose="02000603030000020004" pitchFamily="2" charset="0"/>
-                <a:ea typeface="+mj-ea"/>
-                <a:cs typeface="+mj-cs"/>
-              </a:defRPr>
-            </a:lvl1pPr>
-          </a:lstStyle>
+          <a:lstStyle/>
           <a:p>
             <a:pPr algn="ctr"/>
             <a:r>
@@ -7375,8 +7056,8 @@
         </p:nvSpPr>
         <p:spPr>
           <a:xfrm>
-            <a:off x="66351" y="6101561"/>
-            <a:ext cx="12193443" cy="624786"/>
+            <a:off x="6291786" y="2804214"/>
+            <a:ext cx="5545309" cy="624786"/>
           </a:xfrm>
         </p:spPr>
         <p:txBody>
@@ -8918,7 +8599,7 @@
 
 <file path=ppt/tags/tag2.xml><?xml version="1.0" encoding="utf-8"?>
 <p:tagLst xmlns:a="http://schemas.openxmlformats.org/drawingml/2006/main" xmlns:r="http://schemas.openxmlformats.org/officeDocument/2006/relationships" xmlns:p="http://schemas.openxmlformats.org/presentationml/2006/main">
-  <p:tag name="THINKCELLSHAPEDONOTDELETE" val="thinkcellActiveDocDoNotDelete"/>
+  <p:tag name="THINKCELLSHAPEDONOTDELETE" val="tUoffiZR5AfClmeIKvM80OQ"/>
 </p:tagLst>
 </file>
 
@@ -8942,7 +8623,7 @@
 
 <file path=ppt/tags/tag6.xml><?xml version="1.0" encoding="utf-8"?>
 <p:tagLst xmlns:a="http://schemas.openxmlformats.org/drawingml/2006/main" xmlns:r="http://schemas.openxmlformats.org/officeDocument/2006/relationships" xmlns:p="http://schemas.openxmlformats.org/presentationml/2006/main">
-  <p:tag name="THINKCELLSHAPEDONOTDELETE" val="tUoffiZR5AfClmeIKvM80OQ"/>
+  <p:tag name="THINKCELLSHAPEDONOTDELETE" val="thinkcellActiveDocDoNotDelete"/>
 </p:tagLst>
 </file>
 
@@ -8959,207 +8640,6 @@
 </file>
 
 <file path=ppt/theme/theme1.xml><?xml version="1.0" encoding="utf-8"?>
-<a:theme xmlns:a="http://schemas.openxmlformats.org/drawingml/2006/main" name="1_Office Theme">
-  <a:themeElements>
-    <a:clrScheme name="Custom 2">
-      <a:dk1>
-        <a:sysClr val="windowText" lastClr="000000"/>
-      </a:dk1>
-      <a:lt1>
-        <a:sysClr val="window" lastClr="FFFFFF"/>
-      </a:lt1>
-      <a:dk2>
-        <a:srgbClr val="595959"/>
-      </a:dk2>
-      <a:lt2>
-        <a:srgbClr val="E7E6E6"/>
-      </a:lt2>
-      <a:accent1>
-        <a:srgbClr val="165C7D"/>
-      </a:accent1>
-      <a:accent2>
-        <a:srgbClr val="93C90E"/>
-      </a:accent2>
-      <a:accent3>
-        <a:srgbClr val="77C5D5"/>
-      </a:accent3>
-      <a:accent4>
-        <a:srgbClr val="F39130"/>
-      </a:accent4>
-      <a:accent5>
-        <a:srgbClr val="919191"/>
-      </a:accent5>
-      <a:accent6>
-        <a:srgbClr val="F2F2F2"/>
-      </a:accent6>
-      <a:hlink>
-        <a:srgbClr val="165C7D"/>
-      </a:hlink>
-      <a:folHlink>
-        <a:srgbClr val="954F72"/>
-      </a:folHlink>
-    </a:clrScheme>
-    <a:fontScheme name="Custom 10">
-      <a:majorFont>
-        <a:latin typeface="Gotham Light"/>
-        <a:ea typeface=""/>
-        <a:cs typeface=""/>
-      </a:majorFont>
-      <a:minorFont>
-        <a:latin typeface="Gotham Light"/>
-        <a:ea typeface=""/>
-        <a:cs typeface=""/>
-      </a:minorFont>
-    </a:fontScheme>
-    <a:fmtScheme name="Office">
-      <a:fillStyleLst>
-        <a:solidFill>
-          <a:schemeClr val="phClr"/>
-        </a:solidFill>
-        <a:gradFill rotWithShape="1">
-          <a:gsLst>
-            <a:gs pos="0">
-              <a:schemeClr val="phClr">
-                <a:lumMod val="110000"/>
-                <a:satMod val="105000"/>
-                <a:tint val="67000"/>
-              </a:schemeClr>
-            </a:gs>
-            <a:gs pos="50000">
-              <a:schemeClr val="phClr">
-                <a:lumMod val="105000"/>
-                <a:satMod val="103000"/>
-                <a:tint val="73000"/>
-              </a:schemeClr>
-            </a:gs>
-            <a:gs pos="100000">
-              <a:schemeClr val="phClr">
-                <a:lumMod val="105000"/>
-                <a:satMod val="109000"/>
-                <a:tint val="81000"/>
-              </a:schemeClr>
-            </a:gs>
-          </a:gsLst>
-          <a:lin ang="5400000" scaled="0"/>
-        </a:gradFill>
-        <a:gradFill rotWithShape="1">
-          <a:gsLst>
-            <a:gs pos="0">
-              <a:schemeClr val="phClr">
-                <a:satMod val="103000"/>
-                <a:lumMod val="102000"/>
-                <a:tint val="94000"/>
-              </a:schemeClr>
-            </a:gs>
-            <a:gs pos="50000">
-              <a:schemeClr val="phClr">
-                <a:satMod val="110000"/>
-                <a:lumMod val="100000"/>
-                <a:shade val="100000"/>
-              </a:schemeClr>
-            </a:gs>
-            <a:gs pos="100000">
-              <a:schemeClr val="phClr">
-                <a:lumMod val="99000"/>
-                <a:satMod val="120000"/>
-                <a:shade val="78000"/>
-              </a:schemeClr>
-            </a:gs>
-          </a:gsLst>
-          <a:lin ang="5400000" scaled="0"/>
-        </a:gradFill>
-      </a:fillStyleLst>
-      <a:lnStyleLst>
-        <a:ln w="6350" cap="flat" cmpd="sng" algn="ctr">
-          <a:solidFill>
-            <a:schemeClr val="phClr"/>
-          </a:solidFill>
-          <a:prstDash val="solid"/>
-          <a:miter lim="800000"/>
-        </a:ln>
-        <a:ln w="12700" cap="flat" cmpd="sng" algn="ctr">
-          <a:solidFill>
-            <a:schemeClr val="phClr"/>
-          </a:solidFill>
-          <a:prstDash val="solid"/>
-          <a:miter lim="800000"/>
-        </a:ln>
-        <a:ln w="19050" cap="flat" cmpd="sng" algn="ctr">
-          <a:solidFill>
-            <a:schemeClr val="phClr"/>
-          </a:solidFill>
-          <a:prstDash val="solid"/>
-          <a:miter lim="800000"/>
-        </a:ln>
-      </a:lnStyleLst>
-      <a:effectStyleLst>
-        <a:effectStyle>
-          <a:effectLst/>
-        </a:effectStyle>
-        <a:effectStyle>
-          <a:effectLst/>
-        </a:effectStyle>
-        <a:effectStyle>
-          <a:effectLst>
-            <a:outerShdw blurRad="57150" dist="19050" dir="5400000" algn="ctr" rotWithShape="0">
-              <a:srgbClr val="000000">
-                <a:alpha val="63000"/>
-              </a:srgbClr>
-            </a:outerShdw>
-          </a:effectLst>
-        </a:effectStyle>
-      </a:effectStyleLst>
-      <a:bgFillStyleLst>
-        <a:solidFill>
-          <a:schemeClr val="phClr"/>
-        </a:solidFill>
-        <a:solidFill>
-          <a:schemeClr val="phClr">
-            <a:tint val="95000"/>
-            <a:satMod val="170000"/>
-          </a:schemeClr>
-        </a:solidFill>
-        <a:gradFill rotWithShape="1">
-          <a:gsLst>
-            <a:gs pos="0">
-              <a:schemeClr val="phClr">
-                <a:tint val="93000"/>
-                <a:satMod val="150000"/>
-                <a:shade val="98000"/>
-                <a:lumMod val="102000"/>
-              </a:schemeClr>
-            </a:gs>
-            <a:gs pos="50000">
-              <a:schemeClr val="phClr">
-                <a:tint val="98000"/>
-                <a:satMod val="130000"/>
-                <a:shade val="90000"/>
-                <a:lumMod val="103000"/>
-              </a:schemeClr>
-            </a:gs>
-            <a:gs pos="100000">
-              <a:schemeClr val="phClr">
-                <a:shade val="63000"/>
-                <a:satMod val="120000"/>
-              </a:schemeClr>
-            </a:gs>
-          </a:gsLst>
-          <a:lin ang="5400000" scaled="0"/>
-        </a:gradFill>
-      </a:bgFillStyleLst>
-    </a:fmtScheme>
-  </a:themeElements>
-  <a:objectDefaults/>
-  <a:extraClrSchemeLst/>
-  <a:extLst>
-    <a:ext uri="{05A4C25C-085E-4340-85A3-A5531E510DB2}">
-      <thm15:themeFamily xmlns:thm15="http://schemas.microsoft.com/office/thememl/2012/main" name="Office Theme" id="{62F939B6-93AF-4DB8-9C6B-D6C7DFDC589F}" vid="{4A3C46E8-61CC-4603-A589-7422A47A8E4A}"/>
-    </a:ext>
-  </a:extLst>
-</a:theme>
-</file>
-
-<file path=ppt/theme/theme2.xml><?xml version="1.0" encoding="utf-8"?>
 <a:theme xmlns:a="http://schemas.openxmlformats.org/drawingml/2006/main" name="2_Office Theme">
   <a:themeElements>
     <a:clrScheme name="Custom 2">
@@ -9392,6 +8872,207 @@
       </a:lstStyle>
     </a:txDef>
   </a:objectDefaults>
+  <a:extraClrSchemeLst/>
+  <a:extLst>
+    <a:ext uri="{05A4C25C-085E-4340-85A3-A5531E510DB2}">
+      <thm15:themeFamily xmlns:thm15="http://schemas.microsoft.com/office/thememl/2012/main" name="Office Theme" id="{62F939B6-93AF-4DB8-9C6B-D6C7DFDC589F}" vid="{4A3C46E8-61CC-4603-A589-7422A47A8E4A}"/>
+    </a:ext>
+  </a:extLst>
+</a:theme>
+</file>
+
+<file path=ppt/theme/theme2.xml><?xml version="1.0" encoding="utf-8"?>
+<a:theme xmlns:a="http://schemas.openxmlformats.org/drawingml/2006/main" name="1_Office Theme">
+  <a:themeElements>
+    <a:clrScheme name="Custom 2">
+      <a:dk1>
+        <a:sysClr val="windowText" lastClr="000000"/>
+      </a:dk1>
+      <a:lt1>
+        <a:sysClr val="window" lastClr="FFFFFF"/>
+      </a:lt1>
+      <a:dk2>
+        <a:srgbClr val="595959"/>
+      </a:dk2>
+      <a:lt2>
+        <a:srgbClr val="E7E6E6"/>
+      </a:lt2>
+      <a:accent1>
+        <a:srgbClr val="165C7D"/>
+      </a:accent1>
+      <a:accent2>
+        <a:srgbClr val="93C90E"/>
+      </a:accent2>
+      <a:accent3>
+        <a:srgbClr val="77C5D5"/>
+      </a:accent3>
+      <a:accent4>
+        <a:srgbClr val="F39130"/>
+      </a:accent4>
+      <a:accent5>
+        <a:srgbClr val="919191"/>
+      </a:accent5>
+      <a:accent6>
+        <a:srgbClr val="F2F2F2"/>
+      </a:accent6>
+      <a:hlink>
+        <a:srgbClr val="165C7D"/>
+      </a:hlink>
+      <a:folHlink>
+        <a:srgbClr val="954F72"/>
+      </a:folHlink>
+    </a:clrScheme>
+    <a:fontScheme name="Custom 10">
+      <a:majorFont>
+        <a:latin typeface="Gotham Light"/>
+        <a:ea typeface=""/>
+        <a:cs typeface=""/>
+      </a:majorFont>
+      <a:minorFont>
+        <a:latin typeface="Gotham Light"/>
+        <a:ea typeface=""/>
+        <a:cs typeface=""/>
+      </a:minorFont>
+    </a:fontScheme>
+    <a:fmtScheme name="Office">
+      <a:fillStyleLst>
+        <a:solidFill>
+          <a:schemeClr val="phClr"/>
+        </a:solidFill>
+        <a:gradFill rotWithShape="1">
+          <a:gsLst>
+            <a:gs pos="0">
+              <a:schemeClr val="phClr">
+                <a:lumMod val="110000"/>
+                <a:satMod val="105000"/>
+                <a:tint val="67000"/>
+              </a:schemeClr>
+            </a:gs>
+            <a:gs pos="50000">
+              <a:schemeClr val="phClr">
+                <a:lumMod val="105000"/>
+                <a:satMod val="103000"/>
+                <a:tint val="73000"/>
+              </a:schemeClr>
+            </a:gs>
+            <a:gs pos="100000">
+              <a:schemeClr val="phClr">
+                <a:lumMod val="105000"/>
+                <a:satMod val="109000"/>
+                <a:tint val="81000"/>
+              </a:schemeClr>
+            </a:gs>
+          </a:gsLst>
+          <a:lin ang="5400000" scaled="0"/>
+        </a:gradFill>
+        <a:gradFill rotWithShape="1">
+          <a:gsLst>
+            <a:gs pos="0">
+              <a:schemeClr val="phClr">
+                <a:satMod val="103000"/>
+                <a:lumMod val="102000"/>
+                <a:tint val="94000"/>
+              </a:schemeClr>
+            </a:gs>
+            <a:gs pos="50000">
+              <a:schemeClr val="phClr">
+                <a:satMod val="110000"/>
+                <a:lumMod val="100000"/>
+                <a:shade val="100000"/>
+              </a:schemeClr>
+            </a:gs>
+            <a:gs pos="100000">
+              <a:schemeClr val="phClr">
+                <a:lumMod val="99000"/>
+                <a:satMod val="120000"/>
+                <a:shade val="78000"/>
+              </a:schemeClr>
+            </a:gs>
+          </a:gsLst>
+          <a:lin ang="5400000" scaled="0"/>
+        </a:gradFill>
+      </a:fillStyleLst>
+      <a:lnStyleLst>
+        <a:ln w="6350" cap="flat" cmpd="sng" algn="ctr">
+          <a:solidFill>
+            <a:schemeClr val="phClr"/>
+          </a:solidFill>
+          <a:prstDash val="solid"/>
+          <a:miter lim="800000"/>
+        </a:ln>
+        <a:ln w="12700" cap="flat" cmpd="sng" algn="ctr">
+          <a:solidFill>
+            <a:schemeClr val="phClr"/>
+          </a:solidFill>
+          <a:prstDash val="solid"/>
+          <a:miter lim="800000"/>
+        </a:ln>
+        <a:ln w="19050" cap="flat" cmpd="sng" algn="ctr">
+          <a:solidFill>
+            <a:schemeClr val="phClr"/>
+          </a:solidFill>
+          <a:prstDash val="solid"/>
+          <a:miter lim="800000"/>
+        </a:ln>
+      </a:lnStyleLst>
+      <a:effectStyleLst>
+        <a:effectStyle>
+          <a:effectLst/>
+        </a:effectStyle>
+        <a:effectStyle>
+          <a:effectLst/>
+        </a:effectStyle>
+        <a:effectStyle>
+          <a:effectLst>
+            <a:outerShdw blurRad="57150" dist="19050" dir="5400000" algn="ctr" rotWithShape="0">
+              <a:srgbClr val="000000">
+                <a:alpha val="63000"/>
+              </a:srgbClr>
+            </a:outerShdw>
+          </a:effectLst>
+        </a:effectStyle>
+      </a:effectStyleLst>
+      <a:bgFillStyleLst>
+        <a:solidFill>
+          <a:schemeClr val="phClr"/>
+        </a:solidFill>
+        <a:solidFill>
+          <a:schemeClr val="phClr">
+            <a:tint val="95000"/>
+            <a:satMod val="170000"/>
+          </a:schemeClr>
+        </a:solidFill>
+        <a:gradFill rotWithShape="1">
+          <a:gsLst>
+            <a:gs pos="0">
+              <a:schemeClr val="phClr">
+                <a:tint val="93000"/>
+                <a:satMod val="150000"/>
+                <a:shade val="98000"/>
+                <a:lumMod val="102000"/>
+              </a:schemeClr>
+            </a:gs>
+            <a:gs pos="50000">
+              <a:schemeClr val="phClr">
+                <a:tint val="98000"/>
+                <a:satMod val="130000"/>
+                <a:shade val="90000"/>
+                <a:lumMod val="103000"/>
+              </a:schemeClr>
+            </a:gs>
+            <a:gs pos="100000">
+              <a:schemeClr val="phClr">
+                <a:shade val="63000"/>
+                <a:satMod val="120000"/>
+              </a:schemeClr>
+            </a:gs>
+          </a:gsLst>
+          <a:lin ang="5400000" scaled="0"/>
+        </a:gradFill>
+      </a:bgFillStyleLst>
+    </a:fmtScheme>
+  </a:themeElements>
+  <a:objectDefaults/>
   <a:extraClrSchemeLst/>
   <a:extLst>
     <a:ext uri="{05A4C25C-085E-4340-85A3-A5531E510DB2}">
@@ -9992,12 +9673,6 @@
 </file>
 
 <file path=customXml/item1.xml><?xml version="1.0" encoding="utf-8"?>
-<p:properties xmlns:p="http://schemas.microsoft.com/office/2006/metadata/properties" xmlns:xsi="http://www.w3.org/2001/XMLSchema-instance" xmlns:pc="http://schemas.microsoft.com/office/infopath/2007/PartnerControls">
-  <documentManagement/>
-</p:properties>
-</file>
-
-<file path=customXml/item2.xml><?xml version="1.0" encoding="utf-8"?>
 <ct:contentTypeSchema xmlns:ct="http://schemas.microsoft.com/office/2006/metadata/contentType" xmlns:ma="http://schemas.microsoft.com/office/2006/metadata/properties/metaAttributes" ct:_="" ma:_="" ma:contentTypeName="Document" ma:contentTypeID="0x010100319A35104FAE2A48B18B518F397B7CA4" ma:contentTypeVersion="11" ma:contentTypeDescription="Create a new document." ma:contentTypeScope="" ma:versionID="818dfa9a4b3d3bceb1a965a71e647ec2">
   <xsd:schema xmlns:xsd="http://www.w3.org/2001/XMLSchema" xmlns:xs="http://www.w3.org/2001/XMLSchema" xmlns:p="http://schemas.microsoft.com/office/2006/metadata/properties" xmlns:ns2="0931f5f7-8e4d-4a45-a9a6-891693687166" xmlns:ns3="ea0113d3-9d6b-407b-8175-bd70f3cf5591" targetNamespace="http://schemas.microsoft.com/office/2006/metadata/properties" ma:root="true" ma:fieldsID="449ed37a8757c5d6b7757d0e4c8f3a2b" ns2:_="" ns3:_="">
     <xsd:import namespace="0931f5f7-8e4d-4a45-a9a6-891693687166"/>
@@ -10208,6 +9883,12 @@
 </ct:contentTypeSchema>
 </file>
 
+<file path=customXml/item2.xml><?xml version="1.0" encoding="utf-8"?>
+<p:properties xmlns:p="http://schemas.microsoft.com/office/2006/metadata/properties" xmlns:xsi="http://www.w3.org/2001/XMLSchema-instance" xmlns:pc="http://schemas.microsoft.com/office/infopath/2007/PartnerControls">
+  <documentManagement/>
+</p:properties>
+</file>
+
 <file path=customXml/item3.xml><?xml version="1.0" encoding="utf-8"?>
 <?mso-contentType ?>
 <FormTemplates xmlns="http://schemas.microsoft.com/sharepoint/v3/contenttype/forms">
@@ -10218,15 +9899,6 @@
 </file>
 
 <file path=customXml/itemProps1.xml><?xml version="1.0" encoding="utf-8"?>
-<ds:datastoreItem xmlns:ds="http://schemas.openxmlformats.org/officeDocument/2006/customXml" ds:itemID="{C728879B-660B-4583-928D-55E828E68493}">
-  <ds:schemaRefs>
-    <ds:schemaRef ds:uri="http://schemas.microsoft.com/office/2006/metadata/properties"/>
-    <ds:schemaRef ds:uri="http://schemas.microsoft.com/office/infopath/2007/PartnerControls"/>
-  </ds:schemaRefs>
-</ds:datastoreItem>
-</file>
-
-<file path=customXml/itemProps2.xml><?xml version="1.0" encoding="utf-8"?>
 <ds:datastoreItem xmlns:ds="http://schemas.openxmlformats.org/officeDocument/2006/customXml" ds:itemID="{DF1A254C-4026-4073-B28E-6230090BFEFF}">
   <ds:schemaRefs>
     <ds:schemaRef ds:uri="http://schemas.microsoft.com/office/2006/metadata/contentType"/>
@@ -10245,6 +9917,15 @@
 </ds:datastoreItem>
 </file>
 
+<file path=customXml/itemProps2.xml><?xml version="1.0" encoding="utf-8"?>
+<ds:datastoreItem xmlns:ds="http://schemas.openxmlformats.org/officeDocument/2006/customXml" ds:itemID="{C728879B-660B-4583-928D-55E828E68493}">
+  <ds:schemaRefs>
+    <ds:schemaRef ds:uri="http://schemas.microsoft.com/office/2006/metadata/properties"/>
+    <ds:schemaRef ds:uri="http://schemas.microsoft.com/office/infopath/2007/PartnerControls"/>
+  </ds:schemaRefs>
+</ds:datastoreItem>
+</file>
+
 <file path=customXml/itemProps3.xml><?xml version="1.0" encoding="utf-8"?>
 <ds:datastoreItem xmlns:ds="http://schemas.openxmlformats.org/officeDocument/2006/customXml" ds:itemID="{950F9D87-7CA7-4A94-A5E5-A374AFD83891}">
   <ds:schemaRefs>

</xml_diff>